<commit_message>
Finish AFP loss study slide.
</commit_message>
<xml_diff>
--- a/Defense.pptx
+++ b/Defense.pptx
@@ -5,7 +5,7 @@
     <p:sldMasterId id="2147483829" r:id="rId1"/>
   </p:sldMasterIdLst>
   <p:notesMasterIdLst>
-    <p:notesMasterId r:id="rId9"/>
+    <p:notesMasterId r:id="rId15"/>
   </p:notesMasterIdLst>
   <p:sldIdLst>
     <p:sldId id="256" r:id="rId2"/>
@@ -15,6 +15,12 @@
     <p:sldId id="260" r:id="rId6"/>
     <p:sldId id="261" r:id="rId7"/>
     <p:sldId id="262" r:id="rId8"/>
+    <p:sldId id="263" r:id="rId9"/>
+    <p:sldId id="264" r:id="rId10"/>
+    <p:sldId id="265" r:id="rId11"/>
+    <p:sldId id="267" r:id="rId12"/>
+    <p:sldId id="268" r:id="rId13"/>
+    <p:sldId id="269" r:id="rId14"/>
   </p:sldIdLst>
   <p:sldSz cx="9144000" cy="6858000" type="screen4x3"/>
   <p:notesSz cx="7010400" cy="9296400"/>
@@ -686,6 +692,236 @@
 </p:notes>
 </file>
 
+<file path=ppt/notesSlides/notesSlide3.xml><?xml version="1.0" encoding="utf-8"?>
+<p:notes xmlns:a="http://schemas.openxmlformats.org/drawingml/2006/main" xmlns:r="http://schemas.openxmlformats.org/officeDocument/2006/relationships" xmlns:p="http://schemas.openxmlformats.org/presentationml/2006/main">
+  <p:cSld>
+    <p:spTree>
+      <p:nvGrpSpPr>
+        <p:cNvPr id="1" name=""/>
+        <p:cNvGrpSpPr/>
+        <p:nvPr/>
+      </p:nvGrpSpPr>
+      <p:grpSpPr>
+        <a:xfrm>
+          <a:off x="0" y="0"/>
+          <a:ext cx="0" cy="0"/>
+          <a:chOff x="0" y="0"/>
+          <a:chExt cx="0" cy="0"/>
+        </a:xfrm>
+      </p:grpSpPr>
+      <p:sp>
+        <p:nvSpPr>
+          <p:cNvPr id="2" name="Slide Image Placeholder 1"/>
+          <p:cNvSpPr>
+            <a:spLocks noGrp="1" noRot="1" noChangeAspect="1"/>
+          </p:cNvSpPr>
+          <p:nvPr>
+            <p:ph type="sldImg"/>
+          </p:nvPr>
+        </p:nvSpPr>
+        <p:spPr/>
+      </p:sp>
+      <p:sp>
+        <p:nvSpPr>
+          <p:cNvPr id="3" name="Notes Placeholder 2"/>
+          <p:cNvSpPr>
+            <a:spLocks noGrp="1"/>
+          </p:cNvSpPr>
+          <p:nvPr>
+            <p:ph type="body" idx="1"/>
+          </p:nvPr>
+        </p:nvSpPr>
+        <p:spPr/>
+        <p:txBody>
+          <a:bodyPr/>
+          <a:lstStyle/>
+          <a:p>
+            <a:r>
+              <a:rPr lang="en-US" dirty="0" smtClean="0"/>
+              <a:t>D: diffusion constant, \</a:t>
+            </a:r>
+            <a:r>
+              <a:rPr lang="en-US" dirty="0" err="1" smtClean="0"/>
+              <a:t>nablaBx</a:t>
+            </a:r>
+            <a:r>
+              <a:rPr lang="en-US" dirty="0" smtClean="0"/>
+              <a:t> and \</a:t>
+            </a:r>
+            <a:r>
+              <a:rPr lang="en-US" dirty="0" err="1" smtClean="0"/>
+              <a:t>nablaBy</a:t>
+            </a:r>
+            <a:r>
+              <a:rPr lang="en-US" dirty="0" smtClean="0"/>
+              <a:t> are the transverse magnetic field </a:t>
+            </a:r>
+            <a:r>
+              <a:rPr lang="en-US" dirty="0" err="1" smtClean="0"/>
+              <a:t>inhomogeneities</a:t>
+            </a:r>
+            <a:r>
+              <a:rPr lang="en-US" dirty="0" smtClean="0"/>
+              <a:t>, B0 is the holding field</a:t>
+            </a:r>
+          </a:p>
+          <a:p>
+            <a:r>
+              <a:rPr lang="en-US" dirty="0" smtClean="0"/>
+              <a:t>\rho</a:t>
+            </a:r>
+            <a:r>
+              <a:rPr lang="en-US" baseline="0" dirty="0" smtClean="0"/>
+              <a:t> is the so-called </a:t>
+            </a:r>
+            <a:r>
+              <a:rPr lang="en-US" baseline="0" dirty="0" err="1" smtClean="0"/>
+              <a:t>relaxivity</a:t>
+            </a:r>
+            <a:r>
+              <a:rPr lang="en-US" baseline="0" dirty="0" smtClean="0"/>
+              <a:t>, S/V: surface to volume ratio</a:t>
+            </a:r>
+            <a:endParaRPr lang="en-US" dirty="0"/>
+          </a:p>
+        </p:txBody>
+      </p:sp>
+      <p:sp>
+        <p:nvSpPr>
+          <p:cNvPr id="4" name="Slide Number Placeholder 3"/>
+          <p:cNvSpPr>
+            <a:spLocks noGrp="1"/>
+          </p:cNvSpPr>
+          <p:nvPr>
+            <p:ph type="sldNum" sz="quarter" idx="10"/>
+          </p:nvPr>
+        </p:nvSpPr>
+        <p:spPr/>
+        <p:txBody>
+          <a:bodyPr/>
+          <a:lstStyle/>
+          <a:p>
+            <a:fld id="{01076859-2DFE-F144-B26F-6FE911E490DF}" type="slidenum">
+              <a:rPr lang="en-US" smtClean="0"/>
+              <a:t>9</a:t>
+            </a:fld>
+            <a:endParaRPr lang="en-US"/>
+          </a:p>
+        </p:txBody>
+      </p:sp>
+    </p:spTree>
+    <p:extLst>
+      <p:ext uri="{BB962C8B-B14F-4D97-AF65-F5344CB8AC3E}">
+        <p14:creationId xmlns:p14="http://schemas.microsoft.com/office/powerpoint/2010/main" val="3938953974"/>
+      </p:ext>
+    </p:extLst>
+  </p:cSld>
+  <p:clrMapOvr>
+    <a:masterClrMapping/>
+  </p:clrMapOvr>
+</p:notes>
+</file>
+
+<file path=ppt/notesSlides/notesSlide4.xml><?xml version="1.0" encoding="utf-8"?>
+<p:notes xmlns:a="http://schemas.openxmlformats.org/drawingml/2006/main" xmlns:r="http://schemas.openxmlformats.org/officeDocument/2006/relationships" xmlns:p="http://schemas.openxmlformats.org/presentationml/2006/main">
+  <p:cSld>
+    <p:spTree>
+      <p:nvGrpSpPr>
+        <p:cNvPr id="1" name=""/>
+        <p:cNvGrpSpPr/>
+        <p:nvPr/>
+      </p:nvGrpSpPr>
+      <p:grpSpPr>
+        <a:xfrm>
+          <a:off x="0" y="0"/>
+          <a:ext cx="0" cy="0"/>
+          <a:chOff x="0" y="0"/>
+          <a:chExt cx="0" cy="0"/>
+        </a:xfrm>
+      </p:grpSpPr>
+      <p:sp>
+        <p:nvSpPr>
+          <p:cNvPr id="2" name="Slide Image Placeholder 1"/>
+          <p:cNvSpPr>
+            <a:spLocks noGrp="1" noRot="1" noChangeAspect="1"/>
+          </p:cNvSpPr>
+          <p:nvPr>
+            <p:ph type="sldImg"/>
+          </p:nvPr>
+        </p:nvSpPr>
+        <p:spPr/>
+      </p:sp>
+      <p:sp>
+        <p:nvSpPr>
+          <p:cNvPr id="3" name="Notes Placeholder 2"/>
+          <p:cNvSpPr>
+            <a:spLocks noGrp="1"/>
+          </p:cNvSpPr>
+          <p:nvPr>
+            <p:ph type="body" idx="1"/>
+          </p:nvPr>
+        </p:nvSpPr>
+        <p:spPr/>
+        <p:txBody>
+          <a:bodyPr/>
+          <a:lstStyle/>
+          <a:p>
+            <a:r>
+              <a:rPr lang="en-US" dirty="0" smtClean="0"/>
+              <a:t>X appears to be temperature dependent and </a:t>
+            </a:r>
+            <a:r>
+              <a:rPr lang="en-US" dirty="0" err="1" smtClean="0"/>
+              <a:t>rougly</a:t>
+            </a:r>
+            <a:r>
+              <a:rPr lang="en-US" dirty="0" smtClean="0"/>
+              <a:t> proportional to alkali density. X limits the maximally achievable 3He polarization</a:t>
+            </a:r>
+            <a:r>
+              <a:rPr lang="en-US" baseline="0" dirty="0" smtClean="0"/>
+              <a:t> even with infinite laser power.</a:t>
+            </a:r>
+            <a:endParaRPr lang="en-US" dirty="0"/>
+          </a:p>
+        </p:txBody>
+      </p:sp>
+      <p:sp>
+        <p:nvSpPr>
+          <p:cNvPr id="4" name="Slide Number Placeholder 3"/>
+          <p:cNvSpPr>
+            <a:spLocks noGrp="1"/>
+          </p:cNvSpPr>
+          <p:nvPr>
+            <p:ph type="sldNum" sz="quarter" idx="10"/>
+          </p:nvPr>
+        </p:nvSpPr>
+        <p:spPr/>
+        <p:txBody>
+          <a:bodyPr/>
+          <a:lstStyle/>
+          <a:p>
+            <a:fld id="{01076859-2DFE-F144-B26F-6FE911E490DF}" type="slidenum">
+              <a:rPr lang="en-US" smtClean="0"/>
+              <a:t>10</a:t>
+            </a:fld>
+            <a:endParaRPr lang="en-US"/>
+          </a:p>
+        </p:txBody>
+      </p:sp>
+    </p:spTree>
+    <p:extLst>
+      <p:ext uri="{BB962C8B-B14F-4D97-AF65-F5344CB8AC3E}">
+        <p14:creationId xmlns:p14="http://schemas.microsoft.com/office/powerpoint/2010/main" val="1489082449"/>
+      </p:ext>
+    </p:extLst>
+  </p:cSld>
+  <p:clrMapOvr>
+    <a:masterClrMapping/>
+  </p:clrMapOvr>
+</p:notes>
+</file>
+
 <file path=ppt/slideLayouts/slideLayout1.xml><?xml version="1.0" encoding="utf-8"?>
 <p:sldLayout xmlns:a="http://schemas.openxmlformats.org/drawingml/2006/main" xmlns:r="http://schemas.openxmlformats.org/officeDocument/2006/relationships" xmlns:p="http://schemas.openxmlformats.org/presentationml/2006/main" showMasterSp="0" type="title" preserve="1">
   <p:cSld name="Title Slide">
@@ -812,7 +1048,7 @@
             <a:fld id="{6AD8D91A-A2EE-4B54-B3C6-F6C67903BA9C}" type="datetime1">
               <a:rPr lang="en-US" smtClean="0"/>
               <a:pPr/>
-              <a:t>8/20/16</a:t>
+              <a:t>8/21/16</a:t>
             </a:fld>
             <a:endParaRPr lang="en-US" dirty="0"/>
           </a:p>
@@ -1447,7 +1683,7 @@
             <a:fld id="{B19785C6-EBAF-49D5-AD4D-BABF4DFAAD59}" type="datetime1">
               <a:rPr lang="en-US" smtClean="0"/>
               <a:pPr/>
-              <a:t>8/20/16</a:t>
+              <a:t>8/21/16</a:t>
             </a:fld>
             <a:endParaRPr lang="en-US"/>
           </a:p>
@@ -1726,7 +1962,7 @@
             <a:fld id="{6A404122-9A3A-4FD8-98B8-22631F32846C}" type="datetime1">
               <a:rPr lang="en-US" smtClean="0"/>
               <a:pPr/>
-              <a:t>8/20/16</a:t>
+              <a:t>8/21/16</a:t>
             </a:fld>
             <a:endParaRPr lang="en-US" dirty="0"/>
           </a:p>
@@ -1893,7 +2129,7 @@
             <a:fld id="{C259A7B8-0EC4-44C9-AFEF-25E144F11C06}" type="datetime1">
               <a:rPr lang="en-US" smtClean="0"/>
               <a:pPr/>
-              <a:t>8/20/16</a:t>
+              <a:t>8/21/16</a:t>
             </a:fld>
             <a:endParaRPr lang="en-US"/>
           </a:p>
@@ -2076,7 +2312,7 @@
             <a:fld id="{82BB47B5-C739-4DAE-AACD-CC58CA843AC4}" type="datetime1">
               <a:rPr lang="en-US" smtClean="0"/>
               <a:pPr/>
-              <a:t>8/20/16</a:t>
+              <a:t>8/21/16</a:t>
             </a:fld>
             <a:endParaRPr lang="en-US" dirty="0"/>
           </a:p>
@@ -2723,7 +2959,7 @@
             <a:fld id="{3E72AE48-94E6-46E0-BE32-5F0716DE9115}" type="datetime1">
               <a:rPr lang="en-US" smtClean="0"/>
               <a:pPr/>
-              <a:t>8/20/16</a:t>
+              <a:t>8/21/16</a:t>
             </a:fld>
             <a:endParaRPr lang="en-US"/>
           </a:p>
@@ -3151,7 +3387,7 @@
             <a:fld id="{0884C285-8BCE-48FC-97D9-E2837AF38351}" type="datetime1">
               <a:rPr lang="en-US" smtClean="0"/>
               <a:pPr/>
-              <a:t>8/20/16</a:t>
+              <a:t>8/21/16</a:t>
             </a:fld>
             <a:endParaRPr lang="en-US"/>
           </a:p>
@@ -3266,7 +3502,7 @@
             <a:fld id="{0E70D3E6-EF16-4488-94A4-211508FE4682}" type="datetime1">
               <a:rPr lang="en-US" smtClean="0"/>
               <a:pPr/>
-              <a:t>8/20/16</a:t>
+              <a:t>8/21/16</a:t>
             </a:fld>
             <a:endParaRPr lang="en-US"/>
           </a:p>
@@ -3449,7 +3685,7 @@
             <a:fld id="{7077FB3B-20DA-4D0E-BF16-8262B7156612}" type="datetime1">
               <a:rPr lang="en-US" smtClean="0"/>
               <a:pPr/>
-              <a:t>8/20/16</a:t>
+              <a:t>8/21/16</a:t>
             </a:fld>
             <a:endParaRPr lang="en-US"/>
           </a:p>
@@ -3717,7 +3953,7 @@
             <a:fld id="{8C273C2C-6BD0-40EC-8D8D-4D51F089C5EB}" type="datetime1">
               <a:rPr lang="en-US" smtClean="0"/>
               <a:pPr/>
-              <a:t>8/20/16</a:t>
+              <a:t>8/21/16</a:t>
             </a:fld>
             <a:endParaRPr lang="en-US"/>
           </a:p>
@@ -4189,7 +4425,7 @@
             <a:fld id="{2D377F5C-EDA7-4864-9756-35769B0E62CF}" type="datetime1">
               <a:rPr lang="en-US" smtClean="0"/>
               <a:pPr/>
-              <a:t>8/20/16</a:t>
+              <a:t>8/21/16</a:t>
             </a:fld>
             <a:endParaRPr lang="en-US"/>
           </a:p>
@@ -4751,7 +4987,7 @@
             <a:fld id="{88B99C93-F56F-46AB-9EB8-53614A95B15F}" type="datetime1">
               <a:rPr lang="en-US" smtClean="0"/>
               <a:pPr/>
-              <a:t>8/20/16</a:t>
+              <a:t>8/21/16</a:t>
             </a:fld>
             <a:endParaRPr lang="en-US" dirty="0"/>
           </a:p>
@@ -5336,6 +5572,1919 @@
 </p:sld>
 </file>
 
+<file path=ppt/slides/slide10.xml><?xml version="1.0" encoding="utf-8"?>
+<p:sld xmlns:a="http://schemas.openxmlformats.org/drawingml/2006/main" xmlns:r="http://schemas.openxmlformats.org/officeDocument/2006/relationships" xmlns:p="http://schemas.openxmlformats.org/presentationml/2006/main">
+  <p:cSld>
+    <p:spTree>
+      <p:nvGrpSpPr>
+        <p:cNvPr id="1" name=""/>
+        <p:cNvGrpSpPr/>
+        <p:nvPr/>
+      </p:nvGrpSpPr>
+      <p:grpSpPr>
+        <a:xfrm>
+          <a:off x="0" y="0"/>
+          <a:ext cx="0" cy="0"/>
+          <a:chOff x="0" y="0"/>
+          <a:chExt cx="0" cy="0"/>
+        </a:xfrm>
+      </p:grpSpPr>
+      <p:sp>
+        <p:nvSpPr>
+          <p:cNvPr id="2" name="Title 1"/>
+          <p:cNvSpPr>
+            <a:spLocks noGrp="1"/>
+          </p:cNvSpPr>
+          <p:nvPr>
+            <p:ph type="title"/>
+          </p:nvPr>
+        </p:nvSpPr>
+        <p:spPr/>
+        <p:txBody>
+          <a:bodyPr/>
+          <a:lstStyle/>
+          <a:p>
+            <a:r>
+              <a:rPr lang="en-US" dirty="0" smtClean="0"/>
+              <a:t>X Factor</a:t>
+            </a:r>
+            <a:endParaRPr lang="en-US" dirty="0"/>
+          </a:p>
+        </p:txBody>
+      </p:sp>
+      <p:sp>
+        <p:nvSpPr>
+          <p:cNvPr id="3" name="Content Placeholder 2"/>
+          <p:cNvSpPr>
+            <a:spLocks noGrp="1"/>
+          </p:cNvSpPr>
+          <p:nvPr>
+            <p:ph idx="1"/>
+          </p:nvPr>
+        </p:nvSpPr>
+        <p:spPr/>
+        <p:txBody>
+          <a:bodyPr>
+            <a:normAutofit lnSpcReduction="10000"/>
+          </a:bodyPr>
+          <a:lstStyle/>
+          <a:p>
+            <a:pPr marL="114300" indent="0">
+              <a:buNone/>
+            </a:pPr>
+            <a:r>
+              <a:rPr lang="en-US" dirty="0" smtClean="0"/>
+              <a:t>E. Babcock et al. reported evidence of a previously unrecognized spin relaxation mechanism (leave citation here?):</a:t>
+            </a:r>
+          </a:p>
+          <a:p>
+            <a:pPr marL="114300" indent="0">
+              <a:buNone/>
+            </a:pPr>
+            <a:endParaRPr lang="en-US" dirty="0"/>
+          </a:p>
+          <a:p>
+            <a:pPr marL="114300" indent="0">
+              <a:buNone/>
+            </a:pPr>
+            <a:endParaRPr lang="en-US" dirty="0" smtClean="0"/>
+          </a:p>
+          <a:p>
+            <a:pPr marL="114300" indent="0">
+              <a:buNone/>
+            </a:pPr>
+            <a:endParaRPr lang="en-US" dirty="0"/>
+          </a:p>
+          <a:p>
+            <a:pPr marL="114300" indent="0">
+              <a:buNone/>
+            </a:pPr>
+            <a:r>
+              <a:rPr lang="en-US" dirty="0" smtClean="0"/>
+              <a:t>With infinite laser power</a:t>
+            </a:r>
+          </a:p>
+          <a:p>
+            <a:pPr marL="114300" indent="0">
+              <a:buNone/>
+            </a:pPr>
+            <a:endParaRPr lang="en-US" dirty="0"/>
+          </a:p>
+          <a:p>
+            <a:pPr marL="114300" indent="0">
+              <a:buNone/>
+            </a:pPr>
+            <a:endParaRPr lang="en-US" dirty="0" smtClean="0"/>
+          </a:p>
+          <a:p>
+            <a:pPr marL="114300" indent="0">
+              <a:buNone/>
+            </a:pPr>
+            <a:endParaRPr lang="en-US" dirty="0"/>
+          </a:p>
+          <a:p>
+            <a:pPr marL="114300" indent="0">
+              <a:buNone/>
+            </a:pPr>
+            <a:r>
+              <a:rPr lang="en-US" dirty="0" smtClean="0"/>
+              <a:t>More on this later.</a:t>
+            </a:r>
+          </a:p>
+          <a:p>
+            <a:pPr marL="114300" indent="0">
+              <a:buNone/>
+            </a:pPr>
+            <a:endParaRPr lang="en-US" dirty="0"/>
+          </a:p>
+          <a:p>
+            <a:pPr marL="114300" indent="0">
+              <a:buNone/>
+            </a:pPr>
+            <a:endParaRPr lang="en-US" dirty="0"/>
+          </a:p>
+        </p:txBody>
+      </p:sp>
+      <p:pic>
+        <p:nvPicPr>
+          <p:cNvPr id="4" name="Picture 3" descr="pmaxwithx.png"/>
+          <p:cNvPicPr>
+            <a:picLocks noChangeAspect="1"/>
+          </p:cNvPicPr>
+          <p:nvPr/>
+        </p:nvPicPr>
+        <p:blipFill>
+          <a:blip r:embed="rId3">
+            <a:extLst>
+              <a:ext uri="{28A0092B-C50C-407E-A947-70E740481C1C}">
+                <a14:useLocalDpi xmlns:a14="http://schemas.microsoft.com/office/drawing/2010/main" val="0"/>
+              </a:ext>
+            </a:extLst>
+          </a:blip>
+          <a:stretch>
+            <a:fillRect/>
+          </a:stretch>
+        </p:blipFill>
+        <p:spPr>
+          <a:xfrm>
+            <a:off x="2755900" y="3035300"/>
+            <a:ext cx="3508877" cy="760666"/>
+          </a:xfrm>
+          <a:prstGeom prst="rect">
+            <a:avLst/>
+          </a:prstGeom>
+        </p:spPr>
+      </p:pic>
+      <p:pic>
+        <p:nvPicPr>
+          <p:cNvPr id="5" name="Picture 4" descr="pmax_inf_laser.png"/>
+          <p:cNvPicPr>
+            <a:picLocks noChangeAspect="1"/>
+          </p:cNvPicPr>
+          <p:nvPr/>
+        </p:nvPicPr>
+        <p:blipFill>
+          <a:blip r:embed="rId4">
+            <a:extLst>
+              <a:ext uri="{28A0092B-C50C-407E-A947-70E740481C1C}">
+                <a14:useLocalDpi xmlns:a14="http://schemas.microsoft.com/office/drawing/2010/main" val="0"/>
+              </a:ext>
+            </a:extLst>
+          </a:blip>
+          <a:stretch>
+            <a:fillRect/>
+          </a:stretch>
+        </p:blipFill>
+        <p:spPr>
+          <a:xfrm>
+            <a:off x="3314700" y="4658049"/>
+            <a:ext cx="2514600" cy="927100"/>
+          </a:xfrm>
+          <a:prstGeom prst="rect">
+            <a:avLst/>
+          </a:prstGeom>
+        </p:spPr>
+      </p:pic>
+    </p:spTree>
+    <p:extLst>
+      <p:ext uri="{BB962C8B-B14F-4D97-AF65-F5344CB8AC3E}">
+        <p14:creationId xmlns:p14="http://schemas.microsoft.com/office/powerpoint/2010/main" val="3994917762"/>
+      </p:ext>
+    </p:extLst>
+  </p:cSld>
+  <p:clrMapOvr>
+    <a:masterClrMapping/>
+  </p:clrMapOvr>
+</p:sld>
+</file>
+
+<file path=ppt/slides/slide11.xml><?xml version="1.0" encoding="utf-8"?>
+<p:sld xmlns:a="http://schemas.openxmlformats.org/drawingml/2006/main" xmlns:r="http://schemas.openxmlformats.org/officeDocument/2006/relationships" xmlns:p="http://schemas.openxmlformats.org/presentationml/2006/main">
+  <p:cSld>
+    <p:spTree>
+      <p:nvGrpSpPr>
+        <p:cNvPr id="1" name=""/>
+        <p:cNvGrpSpPr/>
+        <p:nvPr/>
+      </p:nvGrpSpPr>
+      <p:grpSpPr>
+        <a:xfrm>
+          <a:off x="0" y="0"/>
+          <a:ext cx="0" cy="0"/>
+          <a:chOff x="0" y="0"/>
+          <a:chExt cx="0" cy="0"/>
+        </a:xfrm>
+      </p:grpSpPr>
+      <p:sp>
+        <p:nvSpPr>
+          <p:cNvPr id="2" name="Rectangle 1"/>
+          <p:cNvSpPr/>
+          <p:nvPr/>
+        </p:nvSpPr>
+        <p:spPr>
+          <a:xfrm>
+            <a:off x="1437146" y="3316907"/>
+            <a:ext cx="1069474" cy="1029368"/>
+          </a:xfrm>
+          <a:prstGeom prst="rect">
+            <a:avLst/>
+          </a:prstGeom>
+          <a:solidFill>
+            <a:schemeClr val="bg1"/>
+          </a:solidFill>
+          <a:ln>
+            <a:solidFill>
+              <a:schemeClr val="tx1"/>
+            </a:solidFill>
+          </a:ln>
+        </p:spPr>
+        <p:style>
+          <a:lnRef idx="1">
+            <a:schemeClr val="accent1"/>
+          </a:lnRef>
+          <a:fillRef idx="3">
+            <a:schemeClr val="accent1"/>
+          </a:fillRef>
+          <a:effectRef idx="2">
+            <a:schemeClr val="accent1"/>
+          </a:effectRef>
+          <a:fontRef idx="minor">
+            <a:schemeClr val="lt1"/>
+          </a:fontRef>
+        </p:style>
+        <p:txBody>
+          <a:bodyPr rtlCol="0" anchor="ctr"/>
+          <a:lstStyle/>
+          <a:p>
+            <a:pPr algn="ctr"/>
+            <a:endParaRPr lang="en-US"/>
+          </a:p>
+        </p:txBody>
+      </p:sp>
+      <p:sp>
+        <p:nvSpPr>
+          <p:cNvPr id="3" name="Oval 2"/>
+          <p:cNvSpPr/>
+          <p:nvPr/>
+        </p:nvSpPr>
+        <p:spPr>
+          <a:xfrm>
+            <a:off x="1624302" y="3504062"/>
+            <a:ext cx="668422" cy="695158"/>
+          </a:xfrm>
+          <a:prstGeom prst="ellipse">
+            <a:avLst/>
+          </a:prstGeom>
+          <a:solidFill>
+            <a:srgbClr val="FFFFFF"/>
+          </a:solidFill>
+          <a:ln>
+            <a:solidFill>
+              <a:srgbClr val="000000"/>
+            </a:solidFill>
+          </a:ln>
+        </p:spPr>
+        <p:style>
+          <a:lnRef idx="1">
+            <a:schemeClr val="accent1"/>
+          </a:lnRef>
+          <a:fillRef idx="3">
+            <a:schemeClr val="accent1"/>
+          </a:fillRef>
+          <a:effectRef idx="2">
+            <a:schemeClr val="accent1"/>
+          </a:effectRef>
+          <a:fontRef idx="minor">
+            <a:schemeClr val="lt1"/>
+          </a:fontRef>
+        </p:style>
+        <p:txBody>
+          <a:bodyPr rtlCol="0" anchor="ctr"/>
+          <a:lstStyle/>
+          <a:p>
+            <a:pPr algn="ctr"/>
+            <a:endParaRPr lang="en-US"/>
+          </a:p>
+        </p:txBody>
+      </p:sp>
+      <p:sp>
+        <p:nvSpPr>
+          <p:cNvPr id="6" name="Oval 5"/>
+          <p:cNvSpPr/>
+          <p:nvPr/>
+        </p:nvSpPr>
+        <p:spPr>
+          <a:xfrm>
+            <a:off x="2865378" y="1744774"/>
+            <a:ext cx="491951" cy="4209542"/>
+          </a:xfrm>
+          <a:prstGeom prst="ellipse">
+            <a:avLst/>
+          </a:prstGeom>
+          <a:noFill/>
+          <a:ln w="57150" cmpd="sng">
+            <a:solidFill>
+              <a:srgbClr val="000000"/>
+            </a:solidFill>
+          </a:ln>
+        </p:spPr>
+        <p:style>
+          <a:lnRef idx="1">
+            <a:schemeClr val="accent1"/>
+          </a:lnRef>
+          <a:fillRef idx="3">
+            <a:schemeClr val="accent1"/>
+          </a:fillRef>
+          <a:effectRef idx="2">
+            <a:schemeClr val="accent1"/>
+          </a:effectRef>
+          <a:fontRef idx="minor">
+            <a:schemeClr val="lt1"/>
+          </a:fontRef>
+        </p:style>
+        <p:txBody>
+          <a:bodyPr rtlCol="0" anchor="ctr"/>
+          <a:lstStyle/>
+          <a:p>
+            <a:pPr algn="ctr"/>
+            <a:endParaRPr lang="en-US"/>
+          </a:p>
+        </p:txBody>
+      </p:sp>
+      <p:sp>
+        <p:nvSpPr>
+          <p:cNvPr id="7" name="Oval 6"/>
+          <p:cNvSpPr/>
+          <p:nvPr/>
+        </p:nvSpPr>
+        <p:spPr>
+          <a:xfrm>
+            <a:off x="563127" y="1744774"/>
+            <a:ext cx="491951" cy="4209542"/>
+          </a:xfrm>
+          <a:prstGeom prst="ellipse">
+            <a:avLst/>
+          </a:prstGeom>
+          <a:noFill/>
+          <a:ln w="57150" cmpd="sng">
+            <a:solidFill>
+              <a:srgbClr val="000000"/>
+            </a:solidFill>
+          </a:ln>
+        </p:spPr>
+        <p:style>
+          <a:lnRef idx="1">
+            <a:schemeClr val="accent1"/>
+          </a:lnRef>
+          <a:fillRef idx="3">
+            <a:schemeClr val="accent1"/>
+          </a:fillRef>
+          <a:effectRef idx="2">
+            <a:schemeClr val="accent1"/>
+          </a:effectRef>
+          <a:fontRef idx="minor">
+            <a:schemeClr val="lt1"/>
+          </a:fontRef>
+        </p:style>
+        <p:txBody>
+          <a:bodyPr rtlCol="0" anchor="ctr"/>
+          <a:lstStyle/>
+          <a:p>
+            <a:pPr algn="ctr"/>
+            <a:endParaRPr lang="en-US"/>
+          </a:p>
+        </p:txBody>
+      </p:sp>
+      <p:cxnSp>
+        <p:nvCxnSpPr>
+          <p:cNvPr id="8" name="Straight Arrow Connector 7"/>
+          <p:cNvCxnSpPr/>
+          <p:nvPr/>
+        </p:nvCxnSpPr>
+        <p:spPr>
+          <a:xfrm flipH="1">
+            <a:off x="954778" y="1400432"/>
+            <a:ext cx="551024" cy="560654"/>
+          </a:xfrm>
+          <a:prstGeom prst="straightConnector1">
+            <a:avLst/>
+          </a:prstGeom>
+          <a:ln>
+            <a:tailEnd type="arrow"/>
+          </a:ln>
+        </p:spPr>
+        <p:style>
+          <a:lnRef idx="2">
+            <a:schemeClr val="accent3"/>
+          </a:lnRef>
+          <a:fillRef idx="0">
+            <a:schemeClr val="accent3"/>
+          </a:fillRef>
+          <a:effectRef idx="1">
+            <a:schemeClr val="accent3"/>
+          </a:effectRef>
+          <a:fontRef idx="minor">
+            <a:schemeClr val="tx1"/>
+          </a:fontRef>
+        </p:style>
+      </p:cxnSp>
+      <p:cxnSp>
+        <p:nvCxnSpPr>
+          <p:cNvPr id="9" name="Straight Arrow Connector 8"/>
+          <p:cNvCxnSpPr/>
+          <p:nvPr/>
+        </p:nvCxnSpPr>
+        <p:spPr>
+          <a:xfrm>
+            <a:off x="2270461" y="1400432"/>
+            <a:ext cx="720766" cy="560654"/>
+          </a:xfrm>
+          <a:prstGeom prst="straightConnector1">
+            <a:avLst/>
+          </a:prstGeom>
+          <a:ln>
+            <a:tailEnd type="arrow"/>
+          </a:ln>
+        </p:spPr>
+        <p:style>
+          <a:lnRef idx="2">
+            <a:schemeClr val="accent3"/>
+          </a:lnRef>
+          <a:fillRef idx="0">
+            <a:schemeClr val="accent3"/>
+          </a:fillRef>
+          <a:effectRef idx="1">
+            <a:schemeClr val="accent3"/>
+          </a:effectRef>
+          <a:fontRef idx="minor">
+            <a:schemeClr val="tx1"/>
+          </a:fontRef>
+        </p:style>
+      </p:cxnSp>
+      <p:cxnSp>
+        <p:nvCxnSpPr>
+          <p:cNvPr id="10" name="Straight Arrow Connector 9"/>
+          <p:cNvCxnSpPr/>
+          <p:nvPr/>
+        </p:nvCxnSpPr>
+        <p:spPr>
+          <a:xfrm>
+            <a:off x="2185775" y="2234677"/>
+            <a:ext cx="213897" cy="1082230"/>
+          </a:xfrm>
+          <a:prstGeom prst="straightConnector1">
+            <a:avLst/>
+          </a:prstGeom>
+          <a:ln>
+            <a:tailEnd type="arrow"/>
+          </a:ln>
+        </p:spPr>
+        <p:style>
+          <a:lnRef idx="2">
+            <a:schemeClr val="accent3"/>
+          </a:lnRef>
+          <a:fillRef idx="0">
+            <a:schemeClr val="accent3"/>
+          </a:fillRef>
+          <a:effectRef idx="1">
+            <a:schemeClr val="accent3"/>
+          </a:effectRef>
+          <a:fontRef idx="minor">
+            <a:schemeClr val="tx1"/>
+          </a:fontRef>
+        </p:style>
+      </p:cxnSp>
+      <p:cxnSp>
+        <p:nvCxnSpPr>
+          <p:cNvPr id="11" name="Straight Arrow Connector 10"/>
+          <p:cNvCxnSpPr/>
+          <p:nvPr/>
+        </p:nvCxnSpPr>
+        <p:spPr>
+          <a:xfrm>
+            <a:off x="1727281" y="2762021"/>
+            <a:ext cx="179577" cy="742041"/>
+          </a:xfrm>
+          <a:prstGeom prst="straightConnector1">
+            <a:avLst/>
+          </a:prstGeom>
+          <a:ln>
+            <a:tailEnd type="arrow"/>
+          </a:ln>
+        </p:spPr>
+        <p:style>
+          <a:lnRef idx="2">
+            <a:schemeClr val="accent3"/>
+          </a:lnRef>
+          <a:fillRef idx="0">
+            <a:schemeClr val="accent3"/>
+          </a:fillRef>
+          <a:effectRef idx="1">
+            <a:schemeClr val="accent3"/>
+          </a:effectRef>
+          <a:fontRef idx="minor">
+            <a:schemeClr val="tx1"/>
+          </a:fontRef>
+        </p:style>
+      </p:cxnSp>
+      <p:cxnSp>
+        <p:nvCxnSpPr>
+          <p:cNvPr id="13" name="Straight Connector 12"/>
+          <p:cNvCxnSpPr/>
+          <p:nvPr/>
+        </p:nvCxnSpPr>
+        <p:spPr>
+          <a:xfrm>
+            <a:off x="2015092" y="4199220"/>
+            <a:ext cx="0" cy="365630"/>
+          </a:xfrm>
+          <a:prstGeom prst="line">
+            <a:avLst/>
+          </a:prstGeom>
+          <a:ln>
+            <a:solidFill>
+              <a:srgbClr val="000000"/>
+            </a:solidFill>
+          </a:ln>
+        </p:spPr>
+        <p:style>
+          <a:lnRef idx="2">
+            <a:schemeClr val="accent1"/>
+          </a:lnRef>
+          <a:fillRef idx="0">
+            <a:schemeClr val="accent1"/>
+          </a:fillRef>
+          <a:effectRef idx="1">
+            <a:schemeClr val="accent1"/>
+          </a:effectRef>
+          <a:fontRef idx="minor">
+            <a:schemeClr val="tx1"/>
+          </a:fontRef>
+        </p:style>
+      </p:cxnSp>
+      <p:cxnSp>
+        <p:nvCxnSpPr>
+          <p:cNvPr id="15" name="Straight Connector 14"/>
+          <p:cNvCxnSpPr/>
+          <p:nvPr/>
+        </p:nvCxnSpPr>
+        <p:spPr>
+          <a:xfrm>
+            <a:off x="1906858" y="4199220"/>
+            <a:ext cx="0" cy="365630"/>
+          </a:xfrm>
+          <a:prstGeom prst="line">
+            <a:avLst/>
+          </a:prstGeom>
+          <a:ln>
+            <a:solidFill>
+              <a:srgbClr val="000000"/>
+            </a:solidFill>
+          </a:ln>
+        </p:spPr>
+        <p:style>
+          <a:lnRef idx="2">
+            <a:schemeClr val="accent1"/>
+          </a:lnRef>
+          <a:fillRef idx="0">
+            <a:schemeClr val="accent1"/>
+          </a:fillRef>
+          <a:effectRef idx="1">
+            <a:schemeClr val="accent1"/>
+          </a:effectRef>
+          <a:fontRef idx="minor">
+            <a:schemeClr val="tx1"/>
+          </a:fontRef>
+        </p:style>
+      </p:cxnSp>
+      <p:cxnSp>
+        <p:nvCxnSpPr>
+          <p:cNvPr id="16" name="Straight Connector 15"/>
+          <p:cNvCxnSpPr/>
+          <p:nvPr/>
+        </p:nvCxnSpPr>
+        <p:spPr>
+          <a:xfrm>
+            <a:off x="1437146" y="4582006"/>
+            <a:ext cx="1069474" cy="0"/>
+          </a:xfrm>
+          <a:prstGeom prst="line">
+            <a:avLst/>
+          </a:prstGeom>
+          <a:ln>
+            <a:solidFill>
+              <a:srgbClr val="000000"/>
+            </a:solidFill>
+          </a:ln>
+        </p:spPr>
+        <p:style>
+          <a:lnRef idx="2">
+            <a:schemeClr val="accent1"/>
+          </a:lnRef>
+          <a:fillRef idx="0">
+            <a:schemeClr val="accent1"/>
+          </a:fillRef>
+          <a:effectRef idx="1">
+            <a:schemeClr val="accent1"/>
+          </a:effectRef>
+          <a:fontRef idx="minor">
+            <a:schemeClr val="tx1"/>
+          </a:fontRef>
+        </p:style>
+      </p:cxnSp>
+      <p:cxnSp>
+        <p:nvCxnSpPr>
+          <p:cNvPr id="19" name="Straight Connector 18"/>
+          <p:cNvCxnSpPr/>
+          <p:nvPr/>
+        </p:nvCxnSpPr>
+        <p:spPr>
+          <a:xfrm>
+            <a:off x="2506620" y="4564848"/>
+            <a:ext cx="0" cy="143374"/>
+          </a:xfrm>
+          <a:prstGeom prst="line">
+            <a:avLst/>
+          </a:prstGeom>
+          <a:ln>
+            <a:solidFill>
+              <a:srgbClr val="000000"/>
+            </a:solidFill>
+          </a:ln>
+        </p:spPr>
+        <p:style>
+          <a:lnRef idx="2">
+            <a:schemeClr val="accent1"/>
+          </a:lnRef>
+          <a:fillRef idx="0">
+            <a:schemeClr val="accent1"/>
+          </a:fillRef>
+          <a:effectRef idx="1">
+            <a:schemeClr val="accent1"/>
+          </a:effectRef>
+          <a:fontRef idx="minor">
+            <a:schemeClr val="tx1"/>
+          </a:fontRef>
+        </p:style>
+      </p:cxnSp>
+      <p:cxnSp>
+        <p:nvCxnSpPr>
+          <p:cNvPr id="23" name="Straight Connector 22"/>
+          <p:cNvCxnSpPr/>
+          <p:nvPr/>
+        </p:nvCxnSpPr>
+        <p:spPr>
+          <a:xfrm>
+            <a:off x="1435070" y="4700084"/>
+            <a:ext cx="1069474" cy="0"/>
+          </a:xfrm>
+          <a:prstGeom prst="line">
+            <a:avLst/>
+          </a:prstGeom>
+          <a:ln>
+            <a:solidFill>
+              <a:srgbClr val="000000"/>
+            </a:solidFill>
+          </a:ln>
+        </p:spPr>
+        <p:style>
+          <a:lnRef idx="2">
+            <a:schemeClr val="accent1"/>
+          </a:lnRef>
+          <a:fillRef idx="0">
+            <a:schemeClr val="accent1"/>
+          </a:fillRef>
+          <a:effectRef idx="1">
+            <a:schemeClr val="accent1"/>
+          </a:effectRef>
+          <a:fontRef idx="minor">
+            <a:schemeClr val="tx1"/>
+          </a:fontRef>
+        </p:style>
+      </p:cxnSp>
+      <p:cxnSp>
+        <p:nvCxnSpPr>
+          <p:cNvPr id="24" name="Straight Connector 23"/>
+          <p:cNvCxnSpPr/>
+          <p:nvPr/>
+        </p:nvCxnSpPr>
+        <p:spPr>
+          <a:xfrm>
+            <a:off x="1440376" y="4562799"/>
+            <a:ext cx="0" cy="143374"/>
+          </a:xfrm>
+          <a:prstGeom prst="line">
+            <a:avLst/>
+          </a:prstGeom>
+          <a:ln>
+            <a:solidFill>
+              <a:srgbClr val="000000"/>
+            </a:solidFill>
+          </a:ln>
+        </p:spPr>
+        <p:style>
+          <a:lnRef idx="2">
+            <a:schemeClr val="accent1"/>
+          </a:lnRef>
+          <a:fillRef idx="0">
+            <a:schemeClr val="accent1"/>
+          </a:fillRef>
+          <a:effectRef idx="1">
+            <a:schemeClr val="accent1"/>
+          </a:effectRef>
+          <a:fontRef idx="minor">
+            <a:schemeClr val="tx1"/>
+          </a:fontRef>
+        </p:style>
+      </p:cxnSp>
+      <p:sp>
+        <p:nvSpPr>
+          <p:cNvPr id="26" name="TextBox 25"/>
+          <p:cNvSpPr txBox="1"/>
+          <p:nvPr/>
+        </p:nvSpPr>
+        <p:spPr>
+          <a:xfrm>
+            <a:off x="1028838" y="1031100"/>
+            <a:ext cx="2198344" cy="369332"/>
+          </a:xfrm>
+          <a:prstGeom prst="rect">
+            <a:avLst/>
+          </a:prstGeom>
+          <a:noFill/>
+        </p:spPr>
+        <p:txBody>
+          <a:bodyPr wrap="square" rtlCol="0">
+            <a:spAutoFit/>
+          </a:bodyPr>
+          <a:lstStyle/>
+          <a:p>
+            <a:r>
+              <a:rPr lang="en-US" dirty="0" smtClean="0"/>
+              <a:t>Helmholtz Coil</a:t>
+            </a:r>
+            <a:endParaRPr lang="en-US" dirty="0"/>
+          </a:p>
+        </p:txBody>
+      </p:sp>
+      <p:sp>
+        <p:nvSpPr>
+          <p:cNvPr id="27" name="TextBox 26"/>
+          <p:cNvSpPr txBox="1"/>
+          <p:nvPr/>
+        </p:nvSpPr>
+        <p:spPr>
+          <a:xfrm>
+            <a:off x="1838202" y="1864901"/>
+            <a:ext cx="958520" cy="369332"/>
+          </a:xfrm>
+          <a:prstGeom prst="rect">
+            <a:avLst/>
+          </a:prstGeom>
+          <a:noFill/>
+        </p:spPr>
+        <p:txBody>
+          <a:bodyPr wrap="square" rtlCol="0">
+            <a:spAutoFit/>
+          </a:bodyPr>
+          <a:lstStyle/>
+          <a:p>
+            <a:r>
+              <a:rPr lang="en-US" dirty="0" smtClean="0"/>
+              <a:t>Oven</a:t>
+            </a:r>
+            <a:endParaRPr lang="en-US" dirty="0"/>
+          </a:p>
+        </p:txBody>
+      </p:sp>
+      <p:sp>
+        <p:nvSpPr>
+          <p:cNvPr id="28" name="TextBox 27"/>
+          <p:cNvSpPr txBox="1"/>
+          <p:nvPr/>
+        </p:nvSpPr>
+        <p:spPr>
+          <a:xfrm>
+            <a:off x="1055078" y="2419708"/>
+            <a:ext cx="1449466" cy="369332"/>
+          </a:xfrm>
+          <a:prstGeom prst="rect">
+            <a:avLst/>
+          </a:prstGeom>
+          <a:noFill/>
+        </p:spPr>
+        <p:txBody>
+          <a:bodyPr wrap="square" rtlCol="0">
+            <a:spAutoFit/>
+          </a:bodyPr>
+          <a:lstStyle/>
+          <a:p>
+            <a:r>
+              <a:rPr lang="en-US" dirty="0" smtClean="0"/>
+              <a:t>Target Cell</a:t>
+            </a:r>
+            <a:endParaRPr lang="en-US" dirty="0"/>
+          </a:p>
+        </p:txBody>
+      </p:sp>
+      <p:cxnSp>
+        <p:nvCxnSpPr>
+          <p:cNvPr id="30" name="Straight Arrow Connector 29"/>
+          <p:cNvCxnSpPr/>
+          <p:nvPr/>
+        </p:nvCxnSpPr>
+        <p:spPr>
+          <a:xfrm flipH="1">
+            <a:off x="3484246" y="3912723"/>
+            <a:ext cx="394767" cy="0"/>
+          </a:xfrm>
+          <a:prstGeom prst="straightConnector1">
+            <a:avLst/>
+          </a:prstGeom>
+          <a:ln>
+            <a:solidFill>
+              <a:srgbClr val="000000"/>
+            </a:solidFill>
+            <a:tailEnd type="arrow"/>
+          </a:ln>
+        </p:spPr>
+        <p:style>
+          <a:lnRef idx="2">
+            <a:schemeClr val="accent1"/>
+          </a:lnRef>
+          <a:fillRef idx="0">
+            <a:schemeClr val="accent1"/>
+          </a:fillRef>
+          <a:effectRef idx="1">
+            <a:schemeClr val="accent1"/>
+          </a:effectRef>
+          <a:fontRef idx="minor">
+            <a:schemeClr val="tx1"/>
+          </a:fontRef>
+        </p:style>
+      </p:cxnSp>
+      <p:cxnSp>
+        <p:nvCxnSpPr>
+          <p:cNvPr id="33" name="Straight Arrow Connector 32"/>
+          <p:cNvCxnSpPr/>
+          <p:nvPr/>
+        </p:nvCxnSpPr>
+        <p:spPr>
+          <a:xfrm flipV="1">
+            <a:off x="3879013" y="3504062"/>
+            <a:ext cx="0" cy="408661"/>
+          </a:xfrm>
+          <a:prstGeom prst="straightConnector1">
+            <a:avLst/>
+          </a:prstGeom>
+          <a:ln>
+            <a:solidFill>
+              <a:srgbClr val="000000"/>
+            </a:solidFill>
+            <a:tailEnd type="arrow"/>
+          </a:ln>
+        </p:spPr>
+        <p:style>
+          <a:lnRef idx="2">
+            <a:schemeClr val="accent1"/>
+          </a:lnRef>
+          <a:fillRef idx="0">
+            <a:schemeClr val="accent1"/>
+          </a:fillRef>
+          <a:effectRef idx="1">
+            <a:schemeClr val="accent1"/>
+          </a:effectRef>
+          <a:fontRef idx="minor">
+            <a:schemeClr val="tx1"/>
+          </a:fontRef>
+        </p:style>
+      </p:cxnSp>
+      <p:cxnSp>
+        <p:nvCxnSpPr>
+          <p:cNvPr id="35" name="Straight Arrow Connector 34"/>
+          <p:cNvCxnSpPr/>
+          <p:nvPr/>
+        </p:nvCxnSpPr>
+        <p:spPr>
+          <a:xfrm flipV="1">
+            <a:off x="3879013" y="3689628"/>
+            <a:ext cx="223129" cy="223095"/>
+          </a:xfrm>
+          <a:prstGeom prst="straightConnector1">
+            <a:avLst/>
+          </a:prstGeom>
+          <a:ln>
+            <a:solidFill>
+              <a:schemeClr val="tx1"/>
+            </a:solidFill>
+            <a:tailEnd type="arrow"/>
+          </a:ln>
+        </p:spPr>
+        <p:style>
+          <a:lnRef idx="2">
+            <a:schemeClr val="accent1"/>
+          </a:lnRef>
+          <a:fillRef idx="0">
+            <a:schemeClr val="accent1"/>
+          </a:fillRef>
+          <a:effectRef idx="1">
+            <a:schemeClr val="accent1"/>
+          </a:effectRef>
+          <a:fontRef idx="minor">
+            <a:schemeClr val="tx1"/>
+          </a:fontRef>
+        </p:style>
+      </p:cxnSp>
+      <p:sp>
+        <p:nvSpPr>
+          <p:cNvPr id="36" name="TextBox 35"/>
+          <p:cNvSpPr txBox="1"/>
+          <p:nvPr/>
+        </p:nvSpPr>
+        <p:spPr>
+          <a:xfrm>
+            <a:off x="3467082" y="3873161"/>
+            <a:ext cx="223129" cy="369332"/>
+          </a:xfrm>
+          <a:prstGeom prst="rect">
+            <a:avLst/>
+          </a:prstGeom>
+          <a:noFill/>
+        </p:spPr>
+        <p:txBody>
+          <a:bodyPr wrap="square" rtlCol="0">
+            <a:spAutoFit/>
+          </a:bodyPr>
+          <a:lstStyle/>
+          <a:p>
+            <a:r>
+              <a:rPr lang="en-US" dirty="0" smtClean="0"/>
+              <a:t>z</a:t>
+            </a:r>
+            <a:endParaRPr lang="en-US" dirty="0"/>
+          </a:p>
+        </p:txBody>
+      </p:sp>
+      <p:sp>
+        <p:nvSpPr>
+          <p:cNvPr id="37" name="TextBox 36"/>
+          <p:cNvSpPr txBox="1"/>
+          <p:nvPr/>
+        </p:nvSpPr>
+        <p:spPr>
+          <a:xfrm>
+            <a:off x="3690211" y="3179619"/>
+            <a:ext cx="188802" cy="369332"/>
+          </a:xfrm>
+          <a:prstGeom prst="rect">
+            <a:avLst/>
+          </a:prstGeom>
+          <a:noFill/>
+        </p:spPr>
+        <p:txBody>
+          <a:bodyPr wrap="square" rtlCol="0">
+            <a:spAutoFit/>
+          </a:bodyPr>
+          <a:lstStyle/>
+          <a:p>
+            <a:r>
+              <a:rPr lang="en-US" dirty="0" smtClean="0"/>
+              <a:t>x</a:t>
+            </a:r>
+            <a:endParaRPr lang="en-US" dirty="0"/>
+          </a:p>
+        </p:txBody>
+      </p:sp>
+      <p:sp>
+        <p:nvSpPr>
+          <p:cNvPr id="38" name="TextBox 37"/>
+          <p:cNvSpPr txBox="1"/>
+          <p:nvPr/>
+        </p:nvSpPr>
+        <p:spPr>
+          <a:xfrm>
+            <a:off x="4050650" y="3401096"/>
+            <a:ext cx="291784" cy="369332"/>
+          </a:xfrm>
+          <a:prstGeom prst="rect">
+            <a:avLst/>
+          </a:prstGeom>
+          <a:noFill/>
+        </p:spPr>
+        <p:txBody>
+          <a:bodyPr wrap="square" rtlCol="0">
+            <a:spAutoFit/>
+          </a:bodyPr>
+          <a:lstStyle/>
+          <a:p>
+            <a:r>
+              <a:rPr lang="en-US" dirty="0" smtClean="0"/>
+              <a:t>y</a:t>
+            </a:r>
+            <a:endParaRPr lang="en-US" dirty="0"/>
+          </a:p>
+        </p:txBody>
+      </p:sp>
+      <p:sp>
+        <p:nvSpPr>
+          <p:cNvPr id="39" name="TextBox 38"/>
+          <p:cNvSpPr txBox="1"/>
+          <p:nvPr/>
+        </p:nvSpPr>
+        <p:spPr>
+          <a:xfrm>
+            <a:off x="5269278" y="1864901"/>
+            <a:ext cx="2265618" cy="369332"/>
+          </a:xfrm>
+          <a:prstGeom prst="rect">
+            <a:avLst/>
+          </a:prstGeom>
+          <a:noFill/>
+        </p:spPr>
+        <p:txBody>
+          <a:bodyPr wrap="square" rtlCol="0">
+            <a:spAutoFit/>
+          </a:bodyPr>
+          <a:lstStyle/>
+          <a:p>
+            <a:r>
+              <a:rPr lang="en-US" dirty="0" smtClean="0"/>
+              <a:t>Holding Field:</a:t>
+            </a:r>
+            <a:endParaRPr lang="en-US" dirty="0"/>
+          </a:p>
+        </p:txBody>
+      </p:sp>
+      <p:sp>
+        <p:nvSpPr>
+          <p:cNvPr id="40" name="TextBox 39"/>
+          <p:cNvSpPr txBox="1"/>
+          <p:nvPr/>
+        </p:nvSpPr>
+        <p:spPr>
+          <a:xfrm>
+            <a:off x="5269278" y="2963120"/>
+            <a:ext cx="2265618" cy="369332"/>
+          </a:xfrm>
+          <a:prstGeom prst="rect">
+            <a:avLst/>
+          </a:prstGeom>
+          <a:noFill/>
+        </p:spPr>
+        <p:txBody>
+          <a:bodyPr wrap="square" rtlCol="0">
+            <a:spAutoFit/>
+          </a:bodyPr>
+          <a:lstStyle/>
+          <a:p>
+            <a:r>
+              <a:rPr lang="en-US" dirty="0" smtClean="0"/>
+              <a:t>RF field:</a:t>
+            </a:r>
+            <a:endParaRPr lang="en-US" dirty="0"/>
+          </a:p>
+        </p:txBody>
+      </p:sp>
+      <p:sp>
+        <p:nvSpPr>
+          <p:cNvPr id="46" name="Oval 45"/>
+          <p:cNvSpPr/>
+          <p:nvPr/>
+        </p:nvSpPr>
+        <p:spPr>
+          <a:xfrm rot="16200000">
+            <a:off x="1844201" y="4237113"/>
+            <a:ext cx="259272" cy="1373100"/>
+          </a:xfrm>
+          <a:prstGeom prst="ellipse">
+            <a:avLst/>
+          </a:prstGeom>
+          <a:noFill/>
+          <a:ln w="57150" cmpd="sng">
+            <a:solidFill>
+              <a:schemeClr val="accent5"/>
+            </a:solidFill>
+          </a:ln>
+        </p:spPr>
+        <p:style>
+          <a:lnRef idx="1">
+            <a:schemeClr val="accent1"/>
+          </a:lnRef>
+          <a:fillRef idx="3">
+            <a:schemeClr val="accent1"/>
+          </a:fillRef>
+          <a:effectRef idx="2">
+            <a:schemeClr val="accent1"/>
+          </a:effectRef>
+          <a:fontRef idx="minor">
+            <a:schemeClr val="lt1"/>
+          </a:fontRef>
+        </p:style>
+        <p:txBody>
+          <a:bodyPr rtlCol="0" anchor="ctr"/>
+          <a:lstStyle/>
+          <a:p>
+            <a:pPr algn="ctr"/>
+            <a:endParaRPr lang="en-US"/>
+          </a:p>
+        </p:txBody>
+      </p:sp>
+      <p:sp>
+        <p:nvSpPr>
+          <p:cNvPr id="47" name="Oval 46"/>
+          <p:cNvSpPr/>
+          <p:nvPr/>
+        </p:nvSpPr>
+        <p:spPr>
+          <a:xfrm rot="16200000">
+            <a:off x="1844201" y="2238015"/>
+            <a:ext cx="259272" cy="1373100"/>
+          </a:xfrm>
+          <a:prstGeom prst="ellipse">
+            <a:avLst/>
+          </a:prstGeom>
+          <a:noFill/>
+          <a:ln w="57150" cmpd="sng">
+            <a:solidFill>
+              <a:schemeClr val="accent5"/>
+            </a:solidFill>
+          </a:ln>
+        </p:spPr>
+        <p:style>
+          <a:lnRef idx="1">
+            <a:schemeClr val="accent1"/>
+          </a:lnRef>
+          <a:fillRef idx="3">
+            <a:schemeClr val="accent1"/>
+          </a:fillRef>
+          <a:effectRef idx="2">
+            <a:schemeClr val="accent1"/>
+          </a:effectRef>
+          <a:fontRef idx="minor">
+            <a:schemeClr val="lt1"/>
+          </a:fontRef>
+        </p:style>
+        <p:txBody>
+          <a:bodyPr rtlCol="0" anchor="ctr"/>
+          <a:lstStyle/>
+          <a:p>
+            <a:pPr algn="ctr"/>
+            <a:endParaRPr lang="en-US"/>
+          </a:p>
+        </p:txBody>
+      </p:sp>
+      <p:cxnSp>
+        <p:nvCxnSpPr>
+          <p:cNvPr id="49" name="Straight Arrow Connector 48"/>
+          <p:cNvCxnSpPr/>
+          <p:nvPr/>
+        </p:nvCxnSpPr>
+        <p:spPr>
+          <a:xfrm flipV="1">
+            <a:off x="1437146" y="5173428"/>
+            <a:ext cx="509290" cy="524054"/>
+          </a:xfrm>
+          <a:prstGeom prst="straightConnector1">
+            <a:avLst/>
+          </a:prstGeom>
+          <a:ln>
+            <a:tailEnd type="arrow"/>
+          </a:ln>
+        </p:spPr>
+        <p:style>
+          <a:lnRef idx="2">
+            <a:schemeClr val="accent3"/>
+          </a:lnRef>
+          <a:fillRef idx="0">
+            <a:schemeClr val="accent3"/>
+          </a:fillRef>
+          <a:effectRef idx="1">
+            <a:schemeClr val="accent3"/>
+          </a:effectRef>
+          <a:fontRef idx="minor">
+            <a:schemeClr val="tx1"/>
+          </a:fontRef>
+        </p:style>
+      </p:cxnSp>
+      <p:sp>
+        <p:nvSpPr>
+          <p:cNvPr id="52" name="TextBox 51"/>
+          <p:cNvSpPr txBox="1"/>
+          <p:nvPr/>
+        </p:nvSpPr>
+        <p:spPr>
+          <a:xfrm>
+            <a:off x="1149975" y="5697482"/>
+            <a:ext cx="1217257" cy="369332"/>
+          </a:xfrm>
+          <a:prstGeom prst="rect">
+            <a:avLst/>
+          </a:prstGeom>
+          <a:noFill/>
+        </p:spPr>
+        <p:txBody>
+          <a:bodyPr wrap="square" rtlCol="0">
+            <a:spAutoFit/>
+          </a:bodyPr>
+          <a:lstStyle/>
+          <a:p>
+            <a:r>
+              <a:rPr lang="en-US" dirty="0" smtClean="0"/>
+              <a:t>RF Coil</a:t>
+            </a:r>
+            <a:endParaRPr lang="en-US" dirty="0"/>
+          </a:p>
+        </p:txBody>
+      </p:sp>
+      <p:graphicFrame>
+        <p:nvGraphicFramePr>
+          <p:cNvPr id="53" name="Object 52"/>
+          <p:cNvGraphicFramePr>
+            <a:graphicFrameLocks noChangeAspect="1"/>
+          </p:cNvGraphicFramePr>
+          <p:nvPr>
+            <p:extLst>
+              <p:ext uri="{D42A27DB-BD31-4B8C-83A1-F6EECF244321}">
+                <p14:modId xmlns:p14="http://schemas.microsoft.com/office/powerpoint/2010/main" val="3640967134"/>
+              </p:ext>
+            </p:extLst>
+          </p:nvPr>
+        </p:nvGraphicFramePr>
+        <p:xfrm>
+          <a:off x="5263106" y="2340803"/>
+          <a:ext cx="1173310" cy="506656"/>
+        </p:xfrm>
+        <a:graphic>
+          <a:graphicData uri="http://schemas.openxmlformats.org/presentationml/2006/ole">
+            <mc:AlternateContent xmlns:mc="http://schemas.openxmlformats.org/markup-compatibility/2006">
+              <mc:Choice xmlns:v="urn:schemas-microsoft-com:vml" Requires="v">
+                <p:oleObj spid="_x0000_s3084" name="Equation" r:id="rId3" imgW="558800" imgH="241300" progId="Equation.3">
+                  <p:embed/>
+                </p:oleObj>
+              </mc:Choice>
+              <mc:Fallback>
+                <p:oleObj name="Equation" r:id="rId3" imgW="558800" imgH="241300" progId="Equation.3">
+                  <p:embed/>
+                  <p:pic>
+                    <p:nvPicPr>
+                      <p:cNvPr id="0" name=""/>
+                      <p:cNvPicPr/>
+                      <p:nvPr/>
+                    </p:nvPicPr>
+                    <p:blipFill>
+                      <a:blip r:embed="rId4"/>
+                      <a:stretch>
+                        <a:fillRect/>
+                      </a:stretch>
+                    </p:blipFill>
+                    <p:spPr>
+                      <a:xfrm>
+                        <a:off x="5263106" y="2340803"/>
+                        <a:ext cx="1173310" cy="506656"/>
+                      </a:xfrm>
+                      <a:prstGeom prst="rect">
+                        <a:avLst/>
+                      </a:prstGeom>
+                    </p:spPr>
+                  </p:pic>
+                </p:oleObj>
+              </mc:Fallback>
+            </mc:AlternateContent>
+          </a:graphicData>
+        </a:graphic>
+      </p:graphicFrame>
+      <p:graphicFrame>
+        <p:nvGraphicFramePr>
+          <p:cNvPr id="54" name="Object 53"/>
+          <p:cNvGraphicFramePr>
+            <a:graphicFrameLocks noChangeAspect="1"/>
+          </p:cNvGraphicFramePr>
+          <p:nvPr>
+            <p:extLst>
+              <p:ext uri="{D42A27DB-BD31-4B8C-83A1-F6EECF244321}">
+                <p14:modId xmlns:p14="http://schemas.microsoft.com/office/powerpoint/2010/main" val="3470125424"/>
+              </p:ext>
+            </p:extLst>
+          </p:nvPr>
+        </p:nvGraphicFramePr>
+        <p:xfrm>
+          <a:off x="5269278" y="3377341"/>
+          <a:ext cx="1974821" cy="455728"/>
+        </p:xfrm>
+        <a:graphic>
+          <a:graphicData uri="http://schemas.openxmlformats.org/presentationml/2006/ole">
+            <mc:AlternateContent xmlns:mc="http://schemas.openxmlformats.org/markup-compatibility/2006">
+              <mc:Choice xmlns:v="urn:schemas-microsoft-com:vml" Requires="v">
+                <p:oleObj spid="_x0000_s3085" name="Equation" r:id="rId5" imgW="990600" imgH="228600" progId="Equation.3">
+                  <p:embed/>
+                </p:oleObj>
+              </mc:Choice>
+              <mc:Fallback>
+                <p:oleObj name="Equation" r:id="rId5" imgW="990600" imgH="228600" progId="Equation.3">
+                  <p:embed/>
+                  <p:pic>
+                    <p:nvPicPr>
+                      <p:cNvPr id="0" name=""/>
+                      <p:cNvPicPr/>
+                      <p:nvPr/>
+                    </p:nvPicPr>
+                    <p:blipFill>
+                      <a:blip r:embed="rId6"/>
+                      <a:stretch>
+                        <a:fillRect/>
+                      </a:stretch>
+                    </p:blipFill>
+                    <p:spPr>
+                      <a:xfrm>
+                        <a:off x="5269278" y="3377341"/>
+                        <a:ext cx="1974821" cy="455728"/>
+                      </a:xfrm>
+                      <a:prstGeom prst="rect">
+                        <a:avLst/>
+                      </a:prstGeom>
+                    </p:spPr>
+                  </p:pic>
+                </p:oleObj>
+              </mc:Fallback>
+            </mc:AlternateContent>
+          </a:graphicData>
+        </a:graphic>
+      </p:graphicFrame>
+      <p:sp>
+        <p:nvSpPr>
+          <p:cNvPr id="56" name="TextBox 55"/>
+          <p:cNvSpPr txBox="1"/>
+          <p:nvPr/>
+        </p:nvSpPr>
+        <p:spPr>
+          <a:xfrm>
+            <a:off x="5269278" y="4057827"/>
+            <a:ext cx="2265618" cy="369332"/>
+          </a:xfrm>
+          <a:prstGeom prst="rect">
+            <a:avLst/>
+          </a:prstGeom>
+          <a:noFill/>
+        </p:spPr>
+        <p:txBody>
+          <a:bodyPr wrap="square" rtlCol="0">
+            <a:spAutoFit/>
+          </a:bodyPr>
+          <a:lstStyle/>
+          <a:p>
+            <a:r>
+              <a:rPr lang="en-US" dirty="0" smtClean="0"/>
+              <a:t>In rotating frame:</a:t>
+            </a:r>
+            <a:endParaRPr lang="en-US" dirty="0"/>
+          </a:p>
+        </p:txBody>
+      </p:sp>
+      <p:graphicFrame>
+        <p:nvGraphicFramePr>
+          <p:cNvPr id="57" name="Object 56"/>
+          <p:cNvGraphicFramePr>
+            <a:graphicFrameLocks noChangeAspect="1"/>
+          </p:cNvGraphicFramePr>
+          <p:nvPr>
+            <p:extLst>
+              <p:ext uri="{D42A27DB-BD31-4B8C-83A1-F6EECF244321}">
+                <p14:modId xmlns:p14="http://schemas.microsoft.com/office/powerpoint/2010/main" val="2215379781"/>
+              </p:ext>
+            </p:extLst>
+          </p:nvPr>
+        </p:nvGraphicFramePr>
+        <p:xfrm>
+          <a:off x="5276849" y="4562799"/>
+          <a:ext cx="2722273" cy="490500"/>
+        </p:xfrm>
+        <a:graphic>
+          <a:graphicData uri="http://schemas.openxmlformats.org/presentationml/2006/ole">
+            <mc:AlternateContent xmlns:mc="http://schemas.openxmlformats.org/markup-compatibility/2006">
+              <mc:Choice xmlns:v="urn:schemas-microsoft-com:vml" Requires="v">
+                <p:oleObj spid="_x0000_s3086" name="Equation" r:id="rId7" imgW="1409700" imgH="254000" progId="Equation.3">
+                  <p:embed/>
+                </p:oleObj>
+              </mc:Choice>
+              <mc:Fallback>
+                <p:oleObj name="Equation" r:id="rId7" imgW="1409700" imgH="254000" progId="Equation.3">
+                  <p:embed/>
+                  <p:pic>
+                    <p:nvPicPr>
+                      <p:cNvPr id="0" name=""/>
+                      <p:cNvPicPr/>
+                      <p:nvPr/>
+                    </p:nvPicPr>
+                    <p:blipFill>
+                      <a:blip r:embed="rId8"/>
+                      <a:stretch>
+                        <a:fillRect/>
+                      </a:stretch>
+                    </p:blipFill>
+                    <p:spPr>
+                      <a:xfrm>
+                        <a:off x="5276849" y="4562799"/>
+                        <a:ext cx="2722273" cy="490500"/>
+                      </a:xfrm>
+                      <a:prstGeom prst="rect">
+                        <a:avLst/>
+                      </a:prstGeom>
+                    </p:spPr>
+                  </p:pic>
+                </p:oleObj>
+              </mc:Fallback>
+            </mc:AlternateContent>
+          </a:graphicData>
+        </a:graphic>
+      </p:graphicFrame>
+      <p:sp>
+        <p:nvSpPr>
+          <p:cNvPr id="58" name="Title 1"/>
+          <p:cNvSpPr txBox="1">
+            <a:spLocks/>
+          </p:cNvSpPr>
+          <p:nvPr/>
+        </p:nvSpPr>
+        <p:spPr>
+          <a:xfrm>
+            <a:off x="426128" y="408372"/>
+            <a:ext cx="8260672" cy="1039427"/>
+          </a:xfrm>
+          <a:prstGeom prst="rect">
+            <a:avLst/>
+          </a:prstGeom>
+        </p:spPr>
+        <p:txBody>
+          <a:bodyPr/>
+          <a:lstStyle>
+            <a:lvl1pPr algn="ctr" defTabSz="914400" rtl="0" eaLnBrk="1" latinLnBrk="0" hangingPunct="1">
+              <a:spcBef>
+                <a:spcPct val="0"/>
+              </a:spcBef>
+              <a:buNone/>
+              <a:defRPr sz="3500" kern="1200" cap="all" baseline="0">
+                <a:solidFill>
+                  <a:schemeClr val="accent1">
+                    <a:lumMod val="75000"/>
+                  </a:schemeClr>
+                </a:solidFill>
+                <a:latin typeface="+mj-lt"/>
+                <a:ea typeface="+mj-ea"/>
+                <a:cs typeface="+mj-cs"/>
+              </a:defRPr>
+            </a:lvl1pPr>
+          </a:lstStyle>
+          <a:p>
+            <a:r>
+              <a:rPr lang="en-US" dirty="0" smtClean="0"/>
+              <a:t>Adiabatic fast passage (</a:t>
+            </a:r>
+            <a:r>
+              <a:rPr lang="en-US" dirty="0" err="1" smtClean="0"/>
+              <a:t>afp</a:t>
+            </a:r>
+            <a:r>
+              <a:rPr lang="en-US" dirty="0" smtClean="0"/>
+              <a:t>)</a:t>
+            </a:r>
+            <a:endParaRPr lang="en-US" dirty="0"/>
+          </a:p>
+        </p:txBody>
+      </p:sp>
+    </p:spTree>
+    <p:extLst>
+      <p:ext uri="{BB962C8B-B14F-4D97-AF65-F5344CB8AC3E}">
+        <p14:creationId xmlns:p14="http://schemas.microsoft.com/office/powerpoint/2010/main" val="50518249"/>
+      </p:ext>
+    </p:extLst>
+  </p:cSld>
+  <p:clrMapOvr>
+    <a:masterClrMapping/>
+  </p:clrMapOvr>
+</p:sld>
+</file>
+
+<file path=ppt/slides/slide12.xml><?xml version="1.0" encoding="utf-8"?>
+<p:sld xmlns:a="http://schemas.openxmlformats.org/drawingml/2006/main" xmlns:r="http://schemas.openxmlformats.org/officeDocument/2006/relationships" xmlns:p="http://schemas.openxmlformats.org/presentationml/2006/main">
+  <p:cSld>
+    <p:spTree>
+      <p:nvGrpSpPr>
+        <p:cNvPr id="1" name=""/>
+        <p:cNvGrpSpPr/>
+        <p:nvPr/>
+      </p:nvGrpSpPr>
+      <p:grpSpPr>
+        <a:xfrm>
+          <a:off x="0" y="0"/>
+          <a:ext cx="0" cy="0"/>
+          <a:chOff x="0" y="0"/>
+          <a:chExt cx="0" cy="0"/>
+        </a:xfrm>
+      </p:grpSpPr>
+      <p:sp>
+        <p:nvSpPr>
+          <p:cNvPr id="2" name="Title 1"/>
+          <p:cNvSpPr>
+            <a:spLocks noGrp="1"/>
+          </p:cNvSpPr>
+          <p:nvPr>
+            <p:ph type="title"/>
+          </p:nvPr>
+        </p:nvSpPr>
+        <p:spPr/>
+        <p:txBody>
+          <a:bodyPr/>
+          <a:lstStyle/>
+          <a:p>
+            <a:r>
+              <a:rPr lang="en-US" dirty="0" smtClean="0"/>
+              <a:t>Adiabatic fast passage</a:t>
+            </a:r>
+            <a:endParaRPr lang="en-US" dirty="0"/>
+          </a:p>
+        </p:txBody>
+      </p:sp>
+      <p:sp>
+        <p:nvSpPr>
+          <p:cNvPr id="3" name="Content Placeholder 2"/>
+          <p:cNvSpPr>
+            <a:spLocks noGrp="1"/>
+          </p:cNvSpPr>
+          <p:nvPr>
+            <p:ph idx="1"/>
+          </p:nvPr>
+        </p:nvSpPr>
+        <p:spPr/>
+        <p:txBody>
+          <a:bodyPr/>
+          <a:lstStyle/>
+          <a:p>
+            <a:pPr marL="114300" indent="0">
+              <a:buNone/>
+            </a:pPr>
+            <a:r>
+              <a:rPr lang="en-US" dirty="0" smtClean="0"/>
+              <a:t>During a field-sweeping AFP measurement</a:t>
+            </a:r>
+            <a:endParaRPr lang="en-US" dirty="0"/>
+          </a:p>
+        </p:txBody>
+      </p:sp>
+      <p:pic>
+        <p:nvPicPr>
+          <p:cNvPr id="4" name="Picture 3" descr="AFP.png"/>
+          <p:cNvPicPr>
+            <a:picLocks noChangeAspect="1"/>
+          </p:cNvPicPr>
+          <p:nvPr/>
+        </p:nvPicPr>
+        <p:blipFill>
+          <a:blip r:embed="rId2">
+            <a:extLst>
+              <a:ext uri="{28A0092B-C50C-407E-A947-70E740481C1C}">
+                <a14:useLocalDpi xmlns:a14="http://schemas.microsoft.com/office/drawing/2010/main" val="0"/>
+              </a:ext>
+            </a:extLst>
+          </a:blip>
+          <a:stretch>
+            <a:fillRect/>
+          </a:stretch>
+        </p:blipFill>
+        <p:spPr>
+          <a:xfrm>
+            <a:off x="234072" y="2762936"/>
+            <a:ext cx="3953890" cy="2974047"/>
+          </a:xfrm>
+          <a:prstGeom prst="rect">
+            <a:avLst/>
+          </a:prstGeom>
+        </p:spPr>
+      </p:pic>
+      <p:pic>
+        <p:nvPicPr>
+          <p:cNvPr id="5" name="Picture 4" descr="AFPSignal.png"/>
+          <p:cNvPicPr>
+            <a:picLocks noChangeAspect="1"/>
+          </p:cNvPicPr>
+          <p:nvPr/>
+        </p:nvPicPr>
+        <p:blipFill>
+          <a:blip r:embed="rId3">
+            <a:extLst>
+              <a:ext uri="{28A0092B-C50C-407E-A947-70E740481C1C}">
+                <a14:useLocalDpi xmlns:a14="http://schemas.microsoft.com/office/drawing/2010/main" val="0"/>
+              </a:ext>
+            </a:extLst>
+          </a:blip>
+          <a:stretch>
+            <a:fillRect/>
+          </a:stretch>
+        </p:blipFill>
+        <p:spPr>
+          <a:xfrm>
+            <a:off x="4383050" y="2762936"/>
+            <a:ext cx="4535490" cy="2974047"/>
+          </a:xfrm>
+          <a:prstGeom prst="rect">
+            <a:avLst/>
+          </a:prstGeom>
+        </p:spPr>
+      </p:pic>
+    </p:spTree>
+    <p:extLst>
+      <p:ext uri="{BB962C8B-B14F-4D97-AF65-F5344CB8AC3E}">
+        <p14:creationId xmlns:p14="http://schemas.microsoft.com/office/powerpoint/2010/main" val="1025181053"/>
+      </p:ext>
+    </p:extLst>
+  </p:cSld>
+  <p:clrMapOvr>
+    <a:masterClrMapping/>
+  </p:clrMapOvr>
+</p:sld>
+</file>
+
+<file path=ppt/slides/slide13.xml><?xml version="1.0" encoding="utf-8"?>
+<p:sld xmlns:a="http://schemas.openxmlformats.org/drawingml/2006/main" xmlns:r="http://schemas.openxmlformats.org/officeDocument/2006/relationships" xmlns:p="http://schemas.openxmlformats.org/presentationml/2006/main">
+  <p:cSld>
+    <p:spTree>
+      <p:nvGrpSpPr>
+        <p:cNvPr id="1" name=""/>
+        <p:cNvGrpSpPr/>
+        <p:nvPr/>
+      </p:nvGrpSpPr>
+      <p:grpSpPr>
+        <a:xfrm>
+          <a:off x="0" y="0"/>
+          <a:ext cx="0" cy="0"/>
+          <a:chOff x="0" y="0"/>
+          <a:chExt cx="0" cy="0"/>
+        </a:xfrm>
+      </p:grpSpPr>
+      <p:sp>
+        <p:nvSpPr>
+          <p:cNvPr id="2" name="Title 1"/>
+          <p:cNvSpPr>
+            <a:spLocks noGrp="1"/>
+          </p:cNvSpPr>
+          <p:nvPr>
+            <p:ph type="title"/>
+          </p:nvPr>
+        </p:nvSpPr>
+        <p:spPr/>
+        <p:txBody>
+          <a:bodyPr/>
+          <a:lstStyle/>
+          <a:p>
+            <a:r>
+              <a:rPr lang="en-US" dirty="0" smtClean="0"/>
+              <a:t>AFP losses</a:t>
+            </a:r>
+            <a:endParaRPr lang="en-US" dirty="0"/>
+          </a:p>
+        </p:txBody>
+      </p:sp>
+      <p:sp>
+        <p:nvSpPr>
+          <p:cNvPr id="3" name="Content Placeholder 2"/>
+          <p:cNvSpPr>
+            <a:spLocks noGrp="1"/>
+          </p:cNvSpPr>
+          <p:nvPr>
+            <p:ph idx="1"/>
+          </p:nvPr>
+        </p:nvSpPr>
+        <p:spPr>
+          <a:xfrm>
+            <a:off x="4965330" y="2419713"/>
+            <a:ext cx="3331702" cy="3706450"/>
+          </a:xfrm>
+        </p:spPr>
+        <p:txBody>
+          <a:bodyPr>
+            <a:normAutofit/>
+          </a:bodyPr>
+          <a:lstStyle/>
+          <a:p>
+            <a:pPr marL="114300" indent="0">
+              <a:buNone/>
+            </a:pPr>
+            <a:r>
+              <a:rPr lang="en-US" sz="1800" dirty="0" smtClean="0"/>
+              <a:t>Longitudinal spin-relaxation rate on resonance</a:t>
+            </a:r>
+          </a:p>
+          <a:p>
+            <a:pPr marL="114300" indent="0">
+              <a:buNone/>
+            </a:pPr>
+            <a:endParaRPr lang="en-US" sz="1800" dirty="0"/>
+          </a:p>
+          <a:p>
+            <a:pPr marL="114300" indent="0">
+              <a:buNone/>
+            </a:pPr>
+            <a:endParaRPr lang="en-US" sz="1800" dirty="0" smtClean="0"/>
+          </a:p>
+          <a:p>
+            <a:pPr marL="114300" indent="0">
+              <a:buNone/>
+            </a:pPr>
+            <a:endParaRPr lang="en-US" sz="1800" dirty="0"/>
+          </a:p>
+          <a:p>
+            <a:pPr marL="114300" indent="0">
+              <a:buNone/>
+            </a:pPr>
+            <a:r>
+              <a:rPr lang="en-US" sz="1800" dirty="0" smtClean="0"/>
+              <a:t>Fractional relaxation due to a single AFP flip</a:t>
+            </a:r>
+          </a:p>
+          <a:p>
+            <a:pPr marL="114300" indent="0">
+              <a:buNone/>
+            </a:pPr>
+            <a:endParaRPr lang="en-US" sz="1800" dirty="0"/>
+          </a:p>
+        </p:txBody>
+      </p:sp>
+      <p:graphicFrame>
+        <p:nvGraphicFramePr>
+          <p:cNvPr id="4" name="Object 3"/>
+          <p:cNvGraphicFramePr>
+            <a:graphicFrameLocks noChangeAspect="1"/>
+          </p:cNvGraphicFramePr>
+          <p:nvPr>
+            <p:extLst>
+              <p:ext uri="{D42A27DB-BD31-4B8C-83A1-F6EECF244321}">
+                <p14:modId xmlns:p14="http://schemas.microsoft.com/office/powerpoint/2010/main" val="2921238489"/>
+              </p:ext>
+            </p:extLst>
+          </p:nvPr>
+        </p:nvGraphicFramePr>
+        <p:xfrm>
+          <a:off x="5225980" y="3162299"/>
+          <a:ext cx="1164908" cy="698945"/>
+        </p:xfrm>
+        <a:graphic>
+          <a:graphicData uri="http://schemas.openxmlformats.org/presentationml/2006/ole">
+            <mc:AlternateContent xmlns:mc="http://schemas.openxmlformats.org/markup-compatibility/2006">
+              <mc:Choice xmlns:v="urn:schemas-microsoft-com:vml" Requires="v">
+                <p:oleObj spid="_x0000_s4099" name="Equation" r:id="rId3" imgW="889000" imgH="533400" progId="Equation.3">
+                  <p:embed/>
+                </p:oleObj>
+              </mc:Choice>
+              <mc:Fallback>
+                <p:oleObj name="Equation" r:id="rId3" imgW="889000" imgH="533400" progId="Equation.3">
+                  <p:embed/>
+                  <p:pic>
+                    <p:nvPicPr>
+                      <p:cNvPr id="0" name=""/>
+                      <p:cNvPicPr/>
+                      <p:nvPr/>
+                    </p:nvPicPr>
+                    <p:blipFill>
+                      <a:blip r:embed="rId4"/>
+                      <a:stretch>
+                        <a:fillRect/>
+                      </a:stretch>
+                    </p:blipFill>
+                    <p:spPr>
+                      <a:xfrm>
+                        <a:off x="5225980" y="3162299"/>
+                        <a:ext cx="1164908" cy="698945"/>
+                      </a:xfrm>
+                      <a:prstGeom prst="rect">
+                        <a:avLst/>
+                      </a:prstGeom>
+                    </p:spPr>
+                  </p:pic>
+                </p:oleObj>
+              </mc:Fallback>
+            </mc:AlternateContent>
+          </a:graphicData>
+        </a:graphic>
+      </p:graphicFrame>
+      <p:graphicFrame>
+        <p:nvGraphicFramePr>
+          <p:cNvPr id="5" name="Object 4"/>
+          <p:cNvGraphicFramePr>
+            <a:graphicFrameLocks noChangeAspect="1"/>
+          </p:cNvGraphicFramePr>
+          <p:nvPr>
+            <p:extLst>
+              <p:ext uri="{D42A27DB-BD31-4B8C-83A1-F6EECF244321}">
+                <p14:modId xmlns:p14="http://schemas.microsoft.com/office/powerpoint/2010/main" val="3918956748"/>
+              </p:ext>
+            </p:extLst>
+          </p:nvPr>
+        </p:nvGraphicFramePr>
+        <p:xfrm>
+          <a:off x="5219700" y="4813300"/>
+          <a:ext cx="3468688" cy="684213"/>
+        </p:xfrm>
+        <a:graphic>
+          <a:graphicData uri="http://schemas.openxmlformats.org/presentationml/2006/ole">
+            <mc:AlternateContent xmlns:mc="http://schemas.openxmlformats.org/markup-compatibility/2006">
+              <mc:Choice xmlns:v="urn:schemas-microsoft-com:vml" Requires="v">
+                <p:oleObj spid="_x0000_s4100" name="Equation" r:id="rId5" imgW="2247900" imgH="444500" progId="Equation.3">
+                  <p:embed/>
+                </p:oleObj>
+              </mc:Choice>
+              <mc:Fallback>
+                <p:oleObj name="Equation" r:id="rId5" imgW="2247900" imgH="444500" progId="Equation.3">
+                  <p:embed/>
+                  <p:pic>
+                    <p:nvPicPr>
+                      <p:cNvPr id="0" name=""/>
+                      <p:cNvPicPr/>
+                      <p:nvPr/>
+                    </p:nvPicPr>
+                    <p:blipFill>
+                      <a:blip r:embed="rId6"/>
+                      <a:stretch>
+                        <a:fillRect/>
+                      </a:stretch>
+                    </p:blipFill>
+                    <p:spPr>
+                      <a:xfrm>
+                        <a:off x="5219700" y="4813300"/>
+                        <a:ext cx="3468688" cy="684213"/>
+                      </a:xfrm>
+                      <a:prstGeom prst="rect">
+                        <a:avLst/>
+                      </a:prstGeom>
+                    </p:spPr>
+                  </p:pic>
+                </p:oleObj>
+              </mc:Fallback>
+            </mc:AlternateContent>
+          </a:graphicData>
+        </a:graphic>
+      </p:graphicFrame>
+      <p:pic>
+        <p:nvPicPr>
+          <p:cNvPr id="6" name="Picture 5" descr="AFPLossvsGradient.png"/>
+          <p:cNvPicPr>
+            <a:picLocks noChangeAspect="1"/>
+          </p:cNvPicPr>
+          <p:nvPr/>
+        </p:nvPicPr>
+        <p:blipFill>
+          <a:blip r:embed="rId7">
+            <a:extLst>
+              <a:ext uri="{28A0092B-C50C-407E-A947-70E740481C1C}">
+                <a14:useLocalDpi xmlns:a14="http://schemas.microsoft.com/office/drawing/2010/main" val="0"/>
+              </a:ext>
+            </a:extLst>
+          </a:blip>
+          <a:stretch>
+            <a:fillRect/>
+          </a:stretch>
+        </p:blipFill>
+        <p:spPr>
+          <a:xfrm>
+            <a:off x="175979" y="2041770"/>
+            <a:ext cx="4921661" cy="3872267"/>
+          </a:xfrm>
+          <a:prstGeom prst="rect">
+            <a:avLst/>
+          </a:prstGeom>
+        </p:spPr>
+      </p:pic>
+    </p:spTree>
+    <p:extLst>
+      <p:ext uri="{BB962C8B-B14F-4D97-AF65-F5344CB8AC3E}">
+        <p14:creationId xmlns:p14="http://schemas.microsoft.com/office/powerpoint/2010/main" val="650058701"/>
+      </p:ext>
+    </p:extLst>
+  </p:cSld>
+  <p:clrMapOvr>
+    <a:masterClrMapping/>
+  </p:clrMapOvr>
+</p:sld>
+</file>
+
 <file path=ppt/slides/slide2.xml><?xml version="1.0" encoding="utf-8"?>
 <p:sld xmlns:a="http://schemas.openxmlformats.org/drawingml/2006/main" xmlns:r="http://schemas.openxmlformats.org/officeDocument/2006/relationships" xmlns:p="http://schemas.openxmlformats.org/presentationml/2006/main">
   <p:cSld>
@@ -5420,8 +7569,13 @@
           <a:p>
             <a:r>
               <a:rPr lang="en-US" dirty="0" smtClean="0"/>
-              <a:t>Development of hybrid cells</a:t>
-            </a:r>
+              <a:t>Development of hybrid </a:t>
+            </a:r>
+            <a:r>
+              <a:rPr lang="en-US" dirty="0" smtClean="0"/>
+              <a:t>cells</a:t>
+            </a:r>
+            <a:endParaRPr lang="en-US" dirty="0" smtClean="0"/>
           </a:p>
           <a:p>
             <a:r>
@@ -6217,7 +8371,7 @@
           <a:graphicData uri="http://schemas.openxmlformats.org/presentationml/2006/ole">
             <mc:AlternateContent xmlns:mc="http://schemas.openxmlformats.org/markup-compatibility/2006">
               <mc:Choice xmlns:v="urn:schemas-microsoft-com:vml" Requires="v">
-                <p:oleObj spid="_x0000_s2059" name="Equation" r:id="rId4" imgW="114300" imgH="165100" progId="Equation.3">
+                <p:oleObj spid="_x0000_s2078" name="Equation" r:id="rId4" imgW="114300" imgH="165100" progId="Equation.3">
                   <p:embed/>
                 </p:oleObj>
               </mc:Choice>
@@ -6877,7 +9031,485 @@
           <a:bodyPr/>
           <a:lstStyle/>
           <a:p>
-            <a:endParaRPr lang="en-US"/>
+            <a:r>
+              <a:rPr lang="en-US" dirty="0" smtClean="0"/>
+              <a:t>Traditional </a:t>
+            </a:r>
+            <a:r>
+              <a:rPr lang="en-US" baseline="30000" dirty="0" smtClean="0"/>
+              <a:t>3</a:t>
+            </a:r>
+            <a:r>
+              <a:rPr lang="en-US" dirty="0" smtClean="0"/>
+              <a:t>He target cell</a:t>
+            </a:r>
+            <a:endParaRPr lang="en-US" dirty="0"/>
+          </a:p>
+        </p:txBody>
+      </p:sp>
+      <p:pic>
+        <p:nvPicPr>
+          <p:cNvPr id="4" name="Picture 4"/>
+          <p:cNvPicPr>
+            <a:picLocks noChangeAspect="1" noChangeArrowheads="1"/>
+          </p:cNvPicPr>
+          <p:nvPr/>
+        </p:nvPicPr>
+        <p:blipFill>
+          <a:blip r:embed="rId2">
+            <a:extLst>
+              <a:ext uri="{28A0092B-C50C-407E-A947-70E740481C1C}">
+                <a14:useLocalDpi xmlns:a14="http://schemas.microsoft.com/office/drawing/2010/main" val="0"/>
+              </a:ext>
+            </a:extLst>
+          </a:blip>
+          <a:srcRect/>
+          <a:stretch>
+            <a:fillRect/>
+          </a:stretch>
+        </p:blipFill>
+        <p:spPr bwMode="auto">
+          <a:xfrm>
+            <a:off x="1505513" y="1946858"/>
+            <a:ext cx="6019800" cy="4330700"/>
+          </a:xfrm>
+          <a:prstGeom prst="rect">
+            <a:avLst/>
+          </a:prstGeom>
+          <a:noFill/>
+          <a:extLst>
+            <a:ext uri="{909E8E84-426E-40dd-AFC4-6F175D3DCCD1}">
+              <a14:hiddenFill xmlns:a14="http://schemas.microsoft.com/office/drawing/2010/main">
+                <a:solidFill>
+                  <a:srgbClr val="FFFFFF"/>
+                </a:solidFill>
+              </a14:hiddenFill>
+            </a:ext>
+          </a:extLst>
+        </p:spPr>
+      </p:pic>
+      <p:cxnSp>
+        <p:nvCxnSpPr>
+          <p:cNvPr id="6" name="Straight Arrow Connector 5"/>
+          <p:cNvCxnSpPr/>
+          <p:nvPr/>
+        </p:nvCxnSpPr>
+        <p:spPr>
+          <a:xfrm flipH="1">
+            <a:off x="4668547" y="4135822"/>
+            <a:ext cx="1064153" cy="308900"/>
+          </a:xfrm>
+          <a:prstGeom prst="straightConnector1">
+            <a:avLst/>
+          </a:prstGeom>
+          <a:ln>
+            <a:solidFill>
+              <a:srgbClr val="3366FF"/>
+            </a:solidFill>
+            <a:tailEnd type="arrow"/>
+          </a:ln>
+        </p:spPr>
+        <p:style>
+          <a:lnRef idx="2">
+            <a:schemeClr val="accent1"/>
+          </a:lnRef>
+          <a:fillRef idx="0">
+            <a:schemeClr val="accent1"/>
+          </a:fillRef>
+          <a:effectRef idx="1">
+            <a:schemeClr val="accent1"/>
+          </a:effectRef>
+          <a:fontRef idx="minor">
+            <a:schemeClr val="tx1"/>
+          </a:fontRef>
+        </p:style>
+      </p:cxnSp>
+      <p:sp>
+        <p:nvSpPr>
+          <p:cNvPr id="7" name="TextBox 6"/>
+          <p:cNvSpPr txBox="1"/>
+          <p:nvPr/>
+        </p:nvSpPr>
+        <p:spPr>
+          <a:xfrm>
+            <a:off x="5732700" y="3895567"/>
+            <a:ext cx="1792613" cy="369332"/>
+          </a:xfrm>
+          <a:prstGeom prst="rect">
+            <a:avLst/>
+          </a:prstGeom>
+          <a:noFill/>
+        </p:spPr>
+        <p:txBody>
+          <a:bodyPr wrap="square" rtlCol="0">
+            <a:spAutoFit/>
+          </a:bodyPr>
+          <a:lstStyle/>
+          <a:p>
+            <a:r>
+              <a:rPr lang="en-US" dirty="0" smtClean="0">
+                <a:ln>
+                  <a:solidFill>
+                    <a:srgbClr val="3366FF"/>
+                  </a:solidFill>
+                </a:ln>
+              </a:rPr>
+              <a:t>Transfer Tube</a:t>
+            </a:r>
+            <a:endParaRPr lang="en-US" dirty="0">
+              <a:ln>
+                <a:solidFill>
+                  <a:srgbClr val="3366FF"/>
+                </a:solidFill>
+              </a:ln>
+            </a:endParaRPr>
+          </a:p>
+        </p:txBody>
+      </p:sp>
+      <p:sp>
+        <p:nvSpPr>
+          <p:cNvPr id="9" name="Frame 8"/>
+          <p:cNvSpPr/>
+          <p:nvPr/>
+        </p:nvSpPr>
+        <p:spPr>
+          <a:xfrm>
+            <a:off x="3346935" y="2359282"/>
+            <a:ext cx="2248453" cy="2102602"/>
+          </a:xfrm>
+          <a:prstGeom prst="frame">
+            <a:avLst>
+              <a:gd name="adj1" fmla="val 0"/>
+            </a:avLst>
+          </a:prstGeom>
+          <a:gradFill flip="none" rotWithShape="1">
+            <a:gsLst>
+              <a:gs pos="0">
+                <a:schemeClr val="accent5">
+                  <a:tint val="1000"/>
+                  <a:satMod val="100000"/>
+                  <a:alpha val="54000"/>
+                </a:schemeClr>
+              </a:gs>
+              <a:gs pos="68000">
+                <a:schemeClr val="accent5">
+                  <a:tint val="77000"/>
+                  <a:satMod val="100000"/>
+                  <a:alpha val="54000"/>
+                </a:schemeClr>
+              </a:gs>
+              <a:gs pos="81000">
+                <a:schemeClr val="accent5">
+                  <a:tint val="79000"/>
+                  <a:satMod val="100000"/>
+                  <a:alpha val="54000"/>
+                </a:schemeClr>
+              </a:gs>
+              <a:gs pos="86000">
+                <a:schemeClr val="accent5">
+                  <a:tint val="73000"/>
+                  <a:satMod val="100000"/>
+                  <a:alpha val="54000"/>
+                </a:schemeClr>
+              </a:gs>
+              <a:gs pos="100000">
+                <a:schemeClr val="accent5">
+                  <a:tint val="35000"/>
+                  <a:satMod val="100000"/>
+                  <a:alpha val="54000"/>
+                </a:schemeClr>
+              </a:gs>
+            </a:gsLst>
+            <a:lin ang="5400000" scaled="0"/>
+            <a:tileRect/>
+          </a:gradFill>
+          <a:ln/>
+        </p:spPr>
+        <p:style>
+          <a:lnRef idx="1">
+            <a:schemeClr val="accent5"/>
+          </a:lnRef>
+          <a:fillRef idx="2">
+            <a:schemeClr val="accent5"/>
+          </a:fillRef>
+          <a:effectRef idx="1">
+            <a:schemeClr val="accent5"/>
+          </a:effectRef>
+          <a:fontRef idx="minor">
+            <a:schemeClr val="dk1"/>
+          </a:fontRef>
+        </p:style>
+        <p:txBody>
+          <a:bodyPr rtlCol="0" anchor="ctr"/>
+          <a:lstStyle/>
+          <a:p>
+            <a:pPr algn="ctr"/>
+            <a:endParaRPr lang="en-US">
+              <a:ln>
+                <a:solidFill>
+                  <a:schemeClr val="tx1"/>
+                </a:solidFill>
+                <a:prstDash val="sysDash"/>
+              </a:ln>
+              <a:solidFill>
+                <a:schemeClr val="bg1"/>
+              </a:solidFill>
+            </a:endParaRPr>
+          </a:p>
+        </p:txBody>
+      </p:sp>
+      <p:cxnSp>
+        <p:nvCxnSpPr>
+          <p:cNvPr id="13" name="Straight Arrow Connector 12"/>
+          <p:cNvCxnSpPr/>
+          <p:nvPr/>
+        </p:nvCxnSpPr>
+        <p:spPr>
+          <a:xfrm>
+            <a:off x="2729039" y="2591324"/>
+            <a:ext cx="583568" cy="145502"/>
+          </a:xfrm>
+          <a:prstGeom prst="straightConnector1">
+            <a:avLst/>
+          </a:prstGeom>
+          <a:ln>
+            <a:tailEnd type="arrow"/>
+          </a:ln>
+        </p:spPr>
+        <p:style>
+          <a:lnRef idx="1">
+            <a:schemeClr val="accent5"/>
+          </a:lnRef>
+          <a:fillRef idx="0">
+            <a:schemeClr val="accent5"/>
+          </a:fillRef>
+          <a:effectRef idx="0">
+            <a:schemeClr val="accent5"/>
+          </a:effectRef>
+          <a:fontRef idx="minor">
+            <a:schemeClr val="tx1"/>
+          </a:fontRef>
+        </p:style>
+      </p:cxnSp>
+      <p:sp>
+        <p:nvSpPr>
+          <p:cNvPr id="14" name="TextBox 13"/>
+          <p:cNvSpPr txBox="1"/>
+          <p:nvPr/>
+        </p:nvSpPr>
+        <p:spPr>
+          <a:xfrm>
+            <a:off x="1716377" y="2213780"/>
+            <a:ext cx="1355938" cy="646331"/>
+          </a:xfrm>
+          <a:prstGeom prst="rect">
+            <a:avLst/>
+          </a:prstGeom>
+          <a:noFill/>
+        </p:spPr>
+        <p:txBody>
+          <a:bodyPr wrap="square" rtlCol="0">
+            <a:spAutoFit/>
+          </a:bodyPr>
+          <a:lstStyle/>
+          <a:p>
+            <a:r>
+              <a:rPr lang="en-US" dirty="0" smtClean="0">
+                <a:ln>
+                  <a:solidFill>
+                    <a:schemeClr val="accent5"/>
+                  </a:solidFill>
+                </a:ln>
+              </a:rPr>
+              <a:t>Forced-Air Oven</a:t>
+            </a:r>
+            <a:endParaRPr lang="en-US" dirty="0">
+              <a:ln>
+                <a:solidFill>
+                  <a:schemeClr val="accent5"/>
+                </a:solidFill>
+              </a:ln>
+            </a:endParaRPr>
+          </a:p>
+        </p:txBody>
+      </p:sp>
+    </p:spTree>
+    <p:extLst>
+      <p:ext uri="{BB962C8B-B14F-4D97-AF65-F5344CB8AC3E}">
+        <p14:creationId xmlns:p14="http://schemas.microsoft.com/office/powerpoint/2010/main" val="3995073109"/>
+      </p:ext>
+    </p:extLst>
+  </p:cSld>
+  <p:clrMapOvr>
+    <a:masterClrMapping/>
+  </p:clrMapOvr>
+</p:sld>
+</file>
+
+<file path=ppt/slides/slide8.xml><?xml version="1.0" encoding="utf-8"?>
+<p:sld xmlns:a="http://schemas.openxmlformats.org/drawingml/2006/main" xmlns:r="http://schemas.openxmlformats.org/officeDocument/2006/relationships" xmlns:p="http://schemas.openxmlformats.org/presentationml/2006/main">
+  <p:cSld>
+    <p:spTree>
+      <p:nvGrpSpPr>
+        <p:cNvPr id="1" name=""/>
+        <p:cNvGrpSpPr/>
+        <p:nvPr/>
+      </p:nvGrpSpPr>
+      <p:grpSpPr>
+        <a:xfrm>
+          <a:off x="0" y="0"/>
+          <a:ext cx="0" cy="0"/>
+          <a:chOff x="0" y="0"/>
+          <a:chExt cx="0" cy="0"/>
+        </a:xfrm>
+      </p:grpSpPr>
+      <p:sp>
+        <p:nvSpPr>
+          <p:cNvPr id="2" name="Title 1"/>
+          <p:cNvSpPr>
+            <a:spLocks noGrp="1"/>
+          </p:cNvSpPr>
+          <p:nvPr>
+            <p:ph type="title"/>
+          </p:nvPr>
+        </p:nvSpPr>
+        <p:spPr/>
+        <p:txBody>
+          <a:bodyPr>
+            <a:normAutofit fontScale="90000"/>
+          </a:bodyPr>
+          <a:lstStyle/>
+          <a:p>
+            <a:r>
+              <a:rPr lang="en-US" dirty="0" smtClean="0"/>
+              <a:t>SPIN-exchange optical pumping (</a:t>
+            </a:r>
+            <a:r>
+              <a:rPr lang="en-US" dirty="0" err="1" smtClean="0"/>
+              <a:t>seop</a:t>
+            </a:r>
+            <a:r>
+              <a:rPr lang="en-US" dirty="0" smtClean="0"/>
+              <a:t>)</a:t>
+            </a:r>
+            <a:endParaRPr lang="en-US" dirty="0"/>
+          </a:p>
+        </p:txBody>
+      </p:sp>
+      <p:pic>
+        <p:nvPicPr>
+          <p:cNvPr id="6" name="Content Placeholder 5" descr="op.png"/>
+          <p:cNvPicPr>
+            <a:picLocks noGrp="1" noChangeAspect="1"/>
+          </p:cNvPicPr>
+          <p:nvPr>
+            <p:ph sz="half" idx="1"/>
+          </p:nvPr>
+        </p:nvPicPr>
+        <p:blipFill>
+          <a:blip r:embed="rId2">
+            <a:extLst>
+              <a:ext uri="{28A0092B-C50C-407E-A947-70E740481C1C}">
+                <a14:useLocalDpi xmlns:a14="http://schemas.microsoft.com/office/drawing/2010/main" val="0"/>
+              </a:ext>
+            </a:extLst>
+          </a:blip>
+          <a:srcRect t="-19880" b="-19880"/>
+          <a:stretch>
+            <a:fillRect/>
+          </a:stretch>
+        </p:blipFill>
+        <p:spPr>
+          <a:xfrm>
+            <a:off x="426128" y="1447799"/>
+            <a:ext cx="4225254" cy="4678680"/>
+          </a:xfrm>
+        </p:spPr>
+      </p:pic>
+      <p:pic>
+        <p:nvPicPr>
+          <p:cNvPr id="7" name="Content Placeholder 6" descr="spin exchange.png"/>
+          <p:cNvPicPr>
+            <a:picLocks noGrp="1" noChangeAspect="1"/>
+          </p:cNvPicPr>
+          <p:nvPr>
+            <p:ph sz="half" idx="2"/>
+          </p:nvPr>
+        </p:nvPicPr>
+        <p:blipFill>
+          <a:blip r:embed="rId3">
+            <a:extLst>
+              <a:ext uri="{28A0092B-C50C-407E-A947-70E740481C1C}">
+                <a14:useLocalDpi xmlns:a14="http://schemas.microsoft.com/office/drawing/2010/main" val="0"/>
+              </a:ext>
+            </a:extLst>
+          </a:blip>
+          <a:srcRect t="-11079" b="-11079"/>
+          <a:stretch>
+            <a:fillRect/>
+          </a:stretch>
+        </p:blipFill>
+        <p:spPr>
+          <a:xfrm>
+            <a:off x="4857348" y="1719071"/>
+            <a:ext cx="3829452" cy="4132860"/>
+          </a:xfrm>
+        </p:spPr>
+      </p:pic>
+    </p:spTree>
+    <p:extLst>
+      <p:ext uri="{BB962C8B-B14F-4D97-AF65-F5344CB8AC3E}">
+        <p14:creationId xmlns:p14="http://schemas.microsoft.com/office/powerpoint/2010/main" val="1044450053"/>
+      </p:ext>
+    </p:extLst>
+  </p:cSld>
+  <p:clrMapOvr>
+    <a:masterClrMapping/>
+  </p:clrMapOvr>
+</p:sld>
+</file>
+
+<file path=ppt/slides/slide9.xml><?xml version="1.0" encoding="utf-8"?>
+<p:sld xmlns:a="http://schemas.openxmlformats.org/drawingml/2006/main" xmlns:r="http://schemas.openxmlformats.org/officeDocument/2006/relationships" xmlns:p="http://schemas.openxmlformats.org/presentationml/2006/main">
+  <p:cSld>
+    <p:spTree>
+      <p:nvGrpSpPr>
+        <p:cNvPr id="1" name=""/>
+        <p:cNvGrpSpPr/>
+        <p:nvPr/>
+      </p:nvGrpSpPr>
+      <p:grpSpPr>
+        <a:xfrm>
+          <a:off x="0" y="0"/>
+          <a:ext cx="0" cy="0"/>
+          <a:chOff x="0" y="0"/>
+          <a:chExt cx="0" cy="0"/>
+        </a:xfrm>
+      </p:grpSpPr>
+      <p:sp>
+        <p:nvSpPr>
+          <p:cNvPr id="2" name="Title 1"/>
+          <p:cNvSpPr>
+            <a:spLocks noGrp="1"/>
+          </p:cNvSpPr>
+          <p:nvPr>
+            <p:ph type="title"/>
+          </p:nvPr>
+        </p:nvSpPr>
+        <p:spPr/>
+        <p:txBody>
+          <a:bodyPr/>
+          <a:lstStyle/>
+          <a:p>
+            <a:r>
+              <a:rPr lang="en-US" baseline="30000" dirty="0" smtClean="0"/>
+              <a:t>3</a:t>
+            </a:r>
+            <a:r>
+              <a:rPr lang="en-US" dirty="0" smtClean="0"/>
+              <a:t>He spin Relaxation</a:t>
+            </a:r>
+            <a:endParaRPr lang="en-US" dirty="0"/>
           </a:p>
         </p:txBody>
       </p:sp>
@@ -6896,14 +9528,284 @@
           <a:bodyPr/>
           <a:lstStyle/>
           <a:p>
-            <a:endParaRPr lang="en-US"/>
-          </a:p>
-        </p:txBody>
-      </p:sp>
+            <a:pPr marL="114300" indent="0">
+              <a:buNone/>
+            </a:pPr>
+            <a:r>
+              <a:rPr lang="en-US" sz="2000" dirty="0" smtClean="0"/>
+              <a:t>The total relaxation of 3He nucleus spin polarization due to all processes except for spin exchange:</a:t>
+            </a:r>
+          </a:p>
+          <a:p>
+            <a:endParaRPr lang="en-US" dirty="0" smtClean="0"/>
+          </a:p>
+          <a:p>
+            <a:r>
+              <a:rPr lang="en-US" sz="2000" dirty="0" smtClean="0"/>
+              <a:t>Dipolar relaxation rate at 23C</a:t>
+            </a:r>
+          </a:p>
+          <a:p>
+            <a:endParaRPr lang="en-US" dirty="0"/>
+          </a:p>
+          <a:p>
+            <a:endParaRPr lang="en-US" sz="2000" dirty="0" smtClean="0"/>
+          </a:p>
+          <a:p>
+            <a:r>
+              <a:rPr lang="en-US" sz="2000" dirty="0" smtClean="0"/>
+              <a:t>Static field inhomogeneity</a:t>
+            </a:r>
+          </a:p>
+          <a:p>
+            <a:endParaRPr lang="en-US" dirty="0"/>
+          </a:p>
+          <a:p>
+            <a:endParaRPr lang="en-US" sz="2000" dirty="0" smtClean="0"/>
+          </a:p>
+          <a:p>
+            <a:r>
+              <a:rPr lang="en-US" sz="2000" dirty="0" smtClean="0"/>
+              <a:t>Wall relaxation</a:t>
+            </a:r>
+          </a:p>
+          <a:p>
+            <a:endParaRPr lang="en-US" dirty="0"/>
+          </a:p>
+        </p:txBody>
+      </p:sp>
+      <p:graphicFrame>
+        <p:nvGraphicFramePr>
+          <p:cNvPr id="4" name="Object 3"/>
+          <p:cNvGraphicFramePr>
+            <a:graphicFrameLocks noChangeAspect="1"/>
+          </p:cNvGraphicFramePr>
+          <p:nvPr>
+            <p:extLst>
+              <p:ext uri="{D42A27DB-BD31-4B8C-83A1-F6EECF244321}">
+                <p14:modId xmlns:p14="http://schemas.microsoft.com/office/powerpoint/2010/main" val="3941230306"/>
+              </p:ext>
+            </p:extLst>
+          </p:nvPr>
+        </p:nvGraphicFramePr>
+        <p:xfrm>
+          <a:off x="2382365" y="2394731"/>
+          <a:ext cx="3092880" cy="510751"/>
+        </p:xfrm>
+        <a:graphic>
+          <a:graphicData uri="http://schemas.openxmlformats.org/presentationml/2006/ole">
+            <mc:AlternateContent xmlns:mc="http://schemas.openxmlformats.org/markup-compatibility/2006">
+              <mc:Choice xmlns:v="urn:schemas-microsoft-com:vml" Requires="v">
+                <p:oleObj spid="_x0000_s1076" name="Equation" r:id="rId4" imgW="1384300" imgH="228600" progId="Equation.3">
+                  <p:embed/>
+                </p:oleObj>
+              </mc:Choice>
+              <mc:Fallback>
+                <p:oleObj name="Equation" r:id="rId4" imgW="1384300" imgH="228600" progId="Equation.3">
+                  <p:embed/>
+                  <p:pic>
+                    <p:nvPicPr>
+                      <p:cNvPr id="0" name=""/>
+                      <p:cNvPicPr/>
+                      <p:nvPr/>
+                    </p:nvPicPr>
+                    <p:blipFill>
+                      <a:blip r:embed="rId5"/>
+                      <a:stretch>
+                        <a:fillRect/>
+                      </a:stretch>
+                    </p:blipFill>
+                    <p:spPr>
+                      <a:xfrm>
+                        <a:off x="2382365" y="2394731"/>
+                        <a:ext cx="3092880" cy="510751"/>
+                      </a:xfrm>
+                      <a:prstGeom prst="rect">
+                        <a:avLst/>
+                      </a:prstGeom>
+                    </p:spPr>
+                  </p:pic>
+                </p:oleObj>
+              </mc:Fallback>
+            </mc:AlternateContent>
+          </a:graphicData>
+        </a:graphic>
+      </p:graphicFrame>
+      <p:graphicFrame>
+        <p:nvGraphicFramePr>
+          <p:cNvPr id="5" name="Object 4"/>
+          <p:cNvGraphicFramePr>
+            <a:graphicFrameLocks noChangeAspect="1"/>
+          </p:cNvGraphicFramePr>
+          <p:nvPr>
+            <p:extLst>
+              <p:ext uri="{D42A27DB-BD31-4B8C-83A1-F6EECF244321}">
+                <p14:modId xmlns:p14="http://schemas.microsoft.com/office/powerpoint/2010/main" val="1051463846"/>
+              </p:ext>
+            </p:extLst>
+          </p:nvPr>
+        </p:nvGraphicFramePr>
+        <p:xfrm>
+          <a:off x="2382364" y="3272795"/>
+          <a:ext cx="1953452" cy="686928"/>
+        </p:xfrm>
+        <a:graphic>
+          <a:graphicData uri="http://schemas.openxmlformats.org/presentationml/2006/ole">
+            <mc:AlternateContent xmlns:mc="http://schemas.openxmlformats.org/markup-compatibility/2006">
+              <mc:Choice xmlns:v="urn:schemas-microsoft-com:vml" Requires="v">
+                <p:oleObj spid="_x0000_s1077" name="Equation" r:id="rId6" imgW="1155700" imgH="406400" progId="Equation.3">
+                  <p:embed/>
+                </p:oleObj>
+              </mc:Choice>
+              <mc:Fallback>
+                <p:oleObj name="Equation" r:id="rId6" imgW="1155700" imgH="406400" progId="Equation.3">
+                  <p:embed/>
+                  <p:pic>
+                    <p:nvPicPr>
+                      <p:cNvPr id="0" name=""/>
+                      <p:cNvPicPr/>
+                      <p:nvPr/>
+                    </p:nvPicPr>
+                    <p:blipFill>
+                      <a:blip r:embed="rId7"/>
+                      <a:stretch>
+                        <a:fillRect/>
+                      </a:stretch>
+                    </p:blipFill>
+                    <p:spPr>
+                      <a:xfrm>
+                        <a:off x="2382364" y="3272795"/>
+                        <a:ext cx="1953452" cy="686928"/>
+                      </a:xfrm>
+                      <a:prstGeom prst="rect">
+                        <a:avLst/>
+                      </a:prstGeom>
+                    </p:spPr>
+                  </p:pic>
+                </p:oleObj>
+              </mc:Fallback>
+            </mc:AlternateContent>
+          </a:graphicData>
+        </a:graphic>
+      </p:graphicFrame>
+      <p:graphicFrame>
+        <p:nvGraphicFramePr>
+          <p:cNvPr id="6" name="Object 5"/>
+          <p:cNvGraphicFramePr>
+            <a:graphicFrameLocks noChangeAspect="1"/>
+          </p:cNvGraphicFramePr>
+          <p:nvPr>
+            <p:extLst>
+              <p:ext uri="{D42A27DB-BD31-4B8C-83A1-F6EECF244321}">
+                <p14:modId xmlns:p14="http://schemas.microsoft.com/office/powerpoint/2010/main" val="129856385"/>
+              </p:ext>
+            </p:extLst>
+          </p:nvPr>
+        </p:nvGraphicFramePr>
+        <p:xfrm>
+          <a:off x="2382363" y="4457620"/>
+          <a:ext cx="2760707" cy="896640"/>
+        </p:xfrm>
+        <a:graphic>
+          <a:graphicData uri="http://schemas.openxmlformats.org/presentationml/2006/ole">
+            <mc:AlternateContent xmlns:mc="http://schemas.openxmlformats.org/markup-compatibility/2006">
+              <mc:Choice xmlns:v="urn:schemas-microsoft-com:vml" Requires="v">
+                <p:oleObj spid="_x0000_s1078" name="Equation" r:id="rId8" imgW="1485900" imgH="482600" progId="Equation.3">
+                  <p:embed/>
+                </p:oleObj>
+              </mc:Choice>
+              <mc:Fallback>
+                <p:oleObj name="Equation" r:id="rId8" imgW="1485900" imgH="482600" progId="Equation.3">
+                  <p:embed/>
+                  <p:pic>
+                    <p:nvPicPr>
+                      <p:cNvPr id="0" name=""/>
+                      <p:cNvPicPr/>
+                      <p:nvPr/>
+                    </p:nvPicPr>
+                    <p:blipFill>
+                      <a:blip r:embed="rId9"/>
+                      <a:stretch>
+                        <a:fillRect/>
+                      </a:stretch>
+                    </p:blipFill>
+                    <p:spPr>
+                      <a:xfrm>
+                        <a:off x="2382363" y="4457620"/>
+                        <a:ext cx="2760707" cy="896640"/>
+                      </a:xfrm>
+                      <a:prstGeom prst="rect">
+                        <a:avLst/>
+                      </a:prstGeom>
+                    </p:spPr>
+                  </p:pic>
+                </p:oleObj>
+              </mc:Fallback>
+            </mc:AlternateContent>
+          </a:graphicData>
+        </a:graphic>
+      </p:graphicFrame>
+      <p:graphicFrame>
+        <p:nvGraphicFramePr>
+          <p:cNvPr id="7" name="Object 6"/>
+          <p:cNvGraphicFramePr>
+            <a:graphicFrameLocks noChangeAspect="1"/>
+          </p:cNvGraphicFramePr>
+          <p:nvPr>
+            <p:extLst>
+              <p:ext uri="{D42A27DB-BD31-4B8C-83A1-F6EECF244321}">
+                <p14:modId xmlns:p14="http://schemas.microsoft.com/office/powerpoint/2010/main" val="2646903418"/>
+              </p:ext>
+            </p:extLst>
+          </p:nvPr>
+        </p:nvGraphicFramePr>
+        <p:xfrm>
+          <a:off x="2382364" y="5740764"/>
+          <a:ext cx="1616795" cy="422854"/>
+        </p:xfrm>
+        <a:graphic>
+          <a:graphicData uri="http://schemas.openxmlformats.org/presentationml/2006/ole">
+            <mc:AlternateContent xmlns:mc="http://schemas.openxmlformats.org/markup-compatibility/2006">
+              <mc:Choice xmlns:v="urn:schemas-microsoft-com:vml" Requires="v">
+                <p:oleObj spid="_x0000_s1079" name="Equation" r:id="rId10" imgW="825500" imgH="215900" progId="Equation.3">
+                  <p:embed/>
+                </p:oleObj>
+              </mc:Choice>
+              <mc:Fallback>
+                <p:oleObj name="Equation" r:id="rId10" imgW="825500" imgH="215900" progId="Equation.3">
+                  <p:embed/>
+                  <p:pic>
+                    <p:nvPicPr>
+                      <p:cNvPr id="0" name=""/>
+                      <p:cNvPicPr/>
+                      <p:nvPr/>
+                    </p:nvPicPr>
+                    <p:blipFill>
+                      <a:blip r:embed="rId11"/>
+                      <a:stretch>
+                        <a:fillRect/>
+                      </a:stretch>
+                    </p:blipFill>
+                    <p:spPr>
+                      <a:xfrm>
+                        <a:off x="2382364" y="5740764"/>
+                        <a:ext cx="1616795" cy="422854"/>
+                      </a:xfrm>
+                      <a:prstGeom prst="rect">
+                        <a:avLst/>
+                      </a:prstGeom>
+                    </p:spPr>
+                  </p:pic>
+                </p:oleObj>
+              </mc:Fallback>
+            </mc:AlternateContent>
+          </a:graphicData>
+        </a:graphic>
+      </p:graphicFrame>
     </p:spTree>
     <p:extLst>
       <p:ext uri="{BB962C8B-B14F-4D97-AF65-F5344CB8AC3E}">
-        <p14:creationId xmlns:p14="http://schemas.microsoft.com/office/powerpoint/2010/main" val="3995073109"/>
+        <p14:creationId xmlns:p14="http://schemas.microsoft.com/office/powerpoint/2010/main" val="1003560714"/>
       </p:ext>
     </p:extLst>
   </p:cSld>

</xml_diff>

<commit_message>
Finish K-3He spin-exchange rate constant, about to start working on x factor slides.
</commit_message>
<xml_diff>
--- a/Defense.pptx
+++ b/Defense.pptx
@@ -5,7 +5,7 @@
     <p:sldMasterId id="2147483829" r:id="rId1"/>
   </p:sldMasterIdLst>
   <p:notesMasterIdLst>
-    <p:notesMasterId r:id="rId15"/>
+    <p:notesMasterId r:id="rId22"/>
   </p:notesMasterIdLst>
   <p:sldIdLst>
     <p:sldId id="256" r:id="rId2"/>
@@ -21,6 +21,13 @@
     <p:sldId id="267" r:id="rId12"/>
     <p:sldId id="268" r:id="rId13"/>
     <p:sldId id="269" r:id="rId14"/>
+    <p:sldId id="270" r:id="rId15"/>
+    <p:sldId id="271" r:id="rId16"/>
+    <p:sldId id="272" r:id="rId17"/>
+    <p:sldId id="273" r:id="rId18"/>
+    <p:sldId id="274" r:id="rId19"/>
+    <p:sldId id="275" r:id="rId20"/>
+    <p:sldId id="276" r:id="rId21"/>
   </p:sldIdLst>
   <p:sldSz cx="9144000" cy="6858000" type="screen4x3"/>
   <p:notesSz cx="7010400" cy="9296400"/>
@@ -913,6 +920,204 @@
     <p:extLst>
       <p:ext uri="{BB962C8B-B14F-4D97-AF65-F5344CB8AC3E}">
         <p14:creationId xmlns:p14="http://schemas.microsoft.com/office/powerpoint/2010/main" val="1489082449"/>
+      </p:ext>
+    </p:extLst>
+  </p:cSld>
+  <p:clrMapOvr>
+    <a:masterClrMapping/>
+  </p:clrMapOvr>
+</p:notes>
+</file>
+
+<file path=ppt/notesSlides/notesSlide5.xml><?xml version="1.0" encoding="utf-8"?>
+<p:notes xmlns:a="http://schemas.openxmlformats.org/drawingml/2006/main" xmlns:r="http://schemas.openxmlformats.org/officeDocument/2006/relationships" xmlns:p="http://schemas.openxmlformats.org/presentationml/2006/main">
+  <p:cSld>
+    <p:spTree>
+      <p:nvGrpSpPr>
+        <p:cNvPr id="1" name=""/>
+        <p:cNvGrpSpPr/>
+        <p:nvPr/>
+      </p:nvGrpSpPr>
+      <p:grpSpPr>
+        <a:xfrm>
+          <a:off x="0" y="0"/>
+          <a:ext cx="0" cy="0"/>
+          <a:chOff x="0" y="0"/>
+          <a:chExt cx="0" cy="0"/>
+        </a:xfrm>
+      </p:grpSpPr>
+      <p:sp>
+        <p:nvSpPr>
+          <p:cNvPr id="2" name="Slide Image Placeholder 1"/>
+          <p:cNvSpPr>
+            <a:spLocks noGrp="1" noRot="1" noChangeAspect="1"/>
+          </p:cNvSpPr>
+          <p:nvPr>
+            <p:ph type="sldImg"/>
+          </p:nvPr>
+        </p:nvSpPr>
+        <p:spPr/>
+      </p:sp>
+      <p:sp>
+        <p:nvSpPr>
+          <p:cNvPr id="3" name="Notes Placeholder 2"/>
+          <p:cNvSpPr>
+            <a:spLocks noGrp="1"/>
+          </p:cNvSpPr>
+          <p:nvPr>
+            <p:ph type="body" idx="1"/>
+          </p:nvPr>
+        </p:nvSpPr>
+        <p:spPr/>
+        <p:txBody>
+          <a:bodyPr/>
+          <a:lstStyle/>
+          <a:p>
+            <a:r>
+              <a:rPr lang="en-US" dirty="0" smtClean="0"/>
+              <a:t>3 parameter fit is done with equation</a:t>
+            </a:r>
+            <a:r>
+              <a:rPr lang="en-US" baseline="0" dirty="0" smtClean="0"/>
+              <a:t> for </a:t>
+            </a:r>
+            <a:r>
+              <a:rPr lang="en-US" dirty="0" smtClean="0"/>
+              <a:t>single-chambered target cell</a:t>
+            </a:r>
+          </a:p>
+          <a:p>
+            <a:r>
+              <a:rPr lang="en-US" dirty="0" smtClean="0"/>
+              <a:t>Y axis</a:t>
+            </a:r>
+            <a:r>
+              <a:rPr lang="en-US" baseline="0" dirty="0" smtClean="0"/>
+              <a:t> is polarization because the AFP signals have been calibrated with EPR</a:t>
+            </a:r>
+            <a:endParaRPr lang="en-US" dirty="0"/>
+          </a:p>
+        </p:txBody>
+      </p:sp>
+      <p:sp>
+        <p:nvSpPr>
+          <p:cNvPr id="4" name="Slide Number Placeholder 3"/>
+          <p:cNvSpPr>
+            <a:spLocks noGrp="1"/>
+          </p:cNvSpPr>
+          <p:nvPr>
+            <p:ph type="sldNum" sz="quarter" idx="10"/>
+          </p:nvPr>
+        </p:nvSpPr>
+        <p:spPr/>
+        <p:txBody>
+          <a:bodyPr/>
+          <a:lstStyle/>
+          <a:p>
+            <a:fld id="{01076859-2DFE-F144-B26F-6FE911E490DF}" type="slidenum">
+              <a:rPr lang="en-US" smtClean="0"/>
+              <a:t>16</a:t>
+            </a:fld>
+            <a:endParaRPr lang="en-US"/>
+          </a:p>
+        </p:txBody>
+      </p:sp>
+    </p:spTree>
+    <p:extLst>
+      <p:ext uri="{BB962C8B-B14F-4D97-AF65-F5344CB8AC3E}">
+        <p14:creationId xmlns:p14="http://schemas.microsoft.com/office/powerpoint/2010/main" val="178808721"/>
+      </p:ext>
+    </p:extLst>
+  </p:cSld>
+  <p:clrMapOvr>
+    <a:masterClrMapping/>
+  </p:clrMapOvr>
+</p:notes>
+</file>
+
+<file path=ppt/notesSlides/notesSlide6.xml><?xml version="1.0" encoding="utf-8"?>
+<p:notes xmlns:a="http://schemas.openxmlformats.org/drawingml/2006/main" xmlns:r="http://schemas.openxmlformats.org/officeDocument/2006/relationships" xmlns:p="http://schemas.openxmlformats.org/presentationml/2006/main">
+  <p:cSld>
+    <p:spTree>
+      <p:nvGrpSpPr>
+        <p:cNvPr id="1" name=""/>
+        <p:cNvGrpSpPr/>
+        <p:nvPr/>
+      </p:nvGrpSpPr>
+      <p:grpSpPr>
+        <a:xfrm>
+          <a:off x="0" y="0"/>
+          <a:ext cx="0" cy="0"/>
+          <a:chOff x="0" y="0"/>
+          <a:chExt cx="0" cy="0"/>
+        </a:xfrm>
+      </p:grpSpPr>
+      <p:sp>
+        <p:nvSpPr>
+          <p:cNvPr id="2" name="Slide Image Placeholder 1"/>
+          <p:cNvSpPr>
+            <a:spLocks noGrp="1" noRot="1" noChangeAspect="1"/>
+          </p:cNvSpPr>
+          <p:nvPr>
+            <p:ph type="sldImg"/>
+          </p:nvPr>
+        </p:nvSpPr>
+        <p:spPr/>
+      </p:sp>
+      <p:sp>
+        <p:nvSpPr>
+          <p:cNvPr id="3" name="Notes Placeholder 2"/>
+          <p:cNvSpPr>
+            <a:spLocks noGrp="1"/>
+          </p:cNvSpPr>
+          <p:nvPr>
+            <p:ph type="body" idx="1"/>
+          </p:nvPr>
+        </p:nvSpPr>
+        <p:spPr/>
+        <p:txBody>
+          <a:bodyPr/>
+          <a:lstStyle/>
+          <a:p>
+            <a:r>
+              <a:rPr lang="en-US" dirty="0" smtClean="0"/>
+              <a:t>Y axis is raw</a:t>
+            </a:r>
+            <a:r>
+              <a:rPr lang="en-US" baseline="0" dirty="0" smtClean="0"/>
+              <a:t> amplitudes from AFP measurements.</a:t>
+            </a:r>
+            <a:endParaRPr lang="en-US" dirty="0"/>
+          </a:p>
+        </p:txBody>
+      </p:sp>
+      <p:sp>
+        <p:nvSpPr>
+          <p:cNvPr id="4" name="Slide Number Placeholder 3"/>
+          <p:cNvSpPr>
+            <a:spLocks noGrp="1"/>
+          </p:cNvSpPr>
+          <p:nvPr>
+            <p:ph type="sldNum" sz="quarter" idx="10"/>
+          </p:nvPr>
+        </p:nvSpPr>
+        <p:spPr/>
+        <p:txBody>
+          <a:bodyPr/>
+          <a:lstStyle/>
+          <a:p>
+            <a:fld id="{01076859-2DFE-F144-B26F-6FE911E490DF}" type="slidenum">
+              <a:rPr lang="en-US" smtClean="0"/>
+              <a:t>17</a:t>
+            </a:fld>
+            <a:endParaRPr lang="en-US"/>
+          </a:p>
+        </p:txBody>
+      </p:sp>
+    </p:spTree>
+    <p:extLst>
+      <p:ext uri="{BB962C8B-B14F-4D97-AF65-F5344CB8AC3E}">
+        <p14:creationId xmlns:p14="http://schemas.microsoft.com/office/powerpoint/2010/main" val="4278254208"/>
       </p:ext>
     </p:extLst>
   </p:cSld>
@@ -6838,7 +7043,7 @@
           <a:graphicData uri="http://schemas.openxmlformats.org/presentationml/2006/ole">
             <mc:AlternateContent xmlns:mc="http://schemas.openxmlformats.org/markup-compatibility/2006">
               <mc:Choice xmlns:v="urn:schemas-microsoft-com:vml" Requires="v">
-                <p:oleObj spid="_x0000_s3084" name="Equation" r:id="rId3" imgW="558800" imgH="241300" progId="Equation.3">
+                <p:oleObj spid="_x0000_s3123" name="Equation" r:id="rId3" imgW="558800" imgH="241300" progId="Equation.3">
                   <p:embed/>
                 </p:oleObj>
               </mc:Choice>
@@ -6895,7 +7100,7 @@
           <a:graphicData uri="http://schemas.openxmlformats.org/presentationml/2006/ole">
             <mc:AlternateContent xmlns:mc="http://schemas.openxmlformats.org/markup-compatibility/2006">
               <mc:Choice xmlns:v="urn:schemas-microsoft-com:vml" Requires="v">
-                <p:oleObj spid="_x0000_s3085" name="Equation" r:id="rId5" imgW="990600" imgH="228600" progId="Equation.3">
+                <p:oleObj spid="_x0000_s3124" name="Equation" r:id="rId5" imgW="990600" imgH="228600" progId="Equation.3">
                   <p:embed/>
                 </p:oleObj>
               </mc:Choice>
@@ -6969,25 +7174,25 @@
           <p:nvPr>
             <p:extLst>
               <p:ext uri="{D42A27DB-BD31-4B8C-83A1-F6EECF244321}">
-                <p14:modId xmlns:p14="http://schemas.microsoft.com/office/powerpoint/2010/main" val="2215379781"/>
+                <p14:modId xmlns:p14="http://schemas.microsoft.com/office/powerpoint/2010/main" val="2125822285"/>
               </p:ext>
             </p:extLst>
           </p:nvPr>
         </p:nvGraphicFramePr>
         <p:xfrm>
-          <a:off x="5276849" y="4562799"/>
-          <a:ext cx="2722273" cy="490500"/>
+          <a:off x="5240338" y="4562475"/>
+          <a:ext cx="2795587" cy="490538"/>
         </p:xfrm>
         <a:graphic>
           <a:graphicData uri="http://schemas.openxmlformats.org/presentationml/2006/ole">
             <mc:AlternateContent xmlns:mc="http://schemas.openxmlformats.org/markup-compatibility/2006">
               <mc:Choice xmlns:v="urn:schemas-microsoft-com:vml" Requires="v">
-                <p:oleObj spid="_x0000_s3086" name="Equation" r:id="rId7" imgW="1409700" imgH="254000" progId="Equation.3">
+                <p:oleObj spid="_x0000_s3125" name="Equation" r:id="rId7" imgW="1447800" imgH="254000" progId="Equation.3">
                   <p:embed/>
                 </p:oleObj>
               </mc:Choice>
               <mc:Fallback>
-                <p:oleObj name="Equation" r:id="rId7" imgW="1409700" imgH="254000" progId="Equation.3">
+                <p:oleObj name="Equation" r:id="rId7" imgW="1447800" imgH="254000" progId="Equation.3">
                   <p:embed/>
                   <p:pic>
                     <p:nvPicPr>
@@ -7003,8 +7208,8 @@
                     </p:blipFill>
                     <p:spPr>
                       <a:xfrm>
-                        <a:off x="5276849" y="4562799"/>
-                        <a:ext cx="2722273" cy="490500"/>
+                        <a:off x="5240338" y="4562475"/>
+                        <a:ext cx="2795587" cy="490538"/>
                       </a:xfrm>
                       <a:prstGeom prst="rect">
                         <a:avLst/>
@@ -7350,7 +7555,7 @@
           <a:graphicData uri="http://schemas.openxmlformats.org/presentationml/2006/ole">
             <mc:AlternateContent xmlns:mc="http://schemas.openxmlformats.org/markup-compatibility/2006">
               <mc:Choice xmlns:v="urn:schemas-microsoft-com:vml" Requires="v">
-                <p:oleObj spid="_x0000_s4099" name="Equation" r:id="rId3" imgW="889000" imgH="533400" progId="Equation.3">
+                <p:oleObj spid="_x0000_s4125" name="Equation" r:id="rId3" imgW="889000" imgH="533400" progId="Equation.3">
                   <p:embed/>
                 </p:oleObj>
               </mc:Choice>
@@ -7407,7 +7612,7 @@
           <a:graphicData uri="http://schemas.openxmlformats.org/presentationml/2006/ole">
             <mc:AlternateContent xmlns:mc="http://schemas.openxmlformats.org/markup-compatibility/2006">
               <mc:Choice xmlns:v="urn:schemas-microsoft-com:vml" Requires="v">
-                <p:oleObj spid="_x0000_s4100" name="Equation" r:id="rId5" imgW="2247900" imgH="444500" progId="Equation.3">
+                <p:oleObj spid="_x0000_s4126" name="Equation" r:id="rId5" imgW="2247900" imgH="444500" progId="Equation.3">
                   <p:embed/>
                 </p:oleObj>
               </mc:Choice>
@@ -7472,6 +7677,36 @@
           </a:prstGeom>
         </p:spPr>
       </p:pic>
+      <p:sp>
+        <p:nvSpPr>
+          <p:cNvPr id="7" name="TextBox 6"/>
+          <p:cNvSpPr txBox="1"/>
+          <p:nvPr/>
+        </p:nvSpPr>
+        <p:spPr>
+          <a:xfrm>
+            <a:off x="1355938" y="6126163"/>
+            <a:ext cx="6419252" cy="369332"/>
+          </a:xfrm>
+          <a:prstGeom prst="rect">
+            <a:avLst/>
+          </a:prstGeom>
+          <a:noFill/>
+        </p:spPr>
+        <p:txBody>
+          <a:bodyPr wrap="square" rtlCol="0">
+            <a:spAutoFit/>
+          </a:bodyPr>
+          <a:lstStyle/>
+          <a:p>
+            <a:r>
+              <a:rPr lang="en-US" dirty="0" smtClean="0"/>
+              <a:t>Measurements and theory agree extremely well</a:t>
+            </a:r>
+            <a:endParaRPr lang="en-US" dirty="0"/>
+          </a:p>
+        </p:txBody>
+      </p:sp>
     </p:spTree>
     <p:extLst>
       <p:ext uri="{BB962C8B-B14F-4D97-AF65-F5344CB8AC3E}">
@@ -7482,6 +7717,1406 @@
   <p:clrMapOvr>
     <a:masterClrMapping/>
   </p:clrMapOvr>
+</p:sld>
+</file>
+
+<file path=ppt/slides/slide14.xml><?xml version="1.0" encoding="utf-8"?>
+<p:sld xmlns:a="http://schemas.openxmlformats.org/drawingml/2006/main" xmlns:r="http://schemas.openxmlformats.org/officeDocument/2006/relationships" xmlns:p="http://schemas.openxmlformats.org/presentationml/2006/main">
+  <p:cSld>
+    <p:spTree>
+      <p:nvGrpSpPr>
+        <p:cNvPr id="1" name=""/>
+        <p:cNvGrpSpPr/>
+        <p:nvPr/>
+      </p:nvGrpSpPr>
+      <p:grpSpPr>
+        <a:xfrm>
+          <a:off x="0" y="0"/>
+          <a:ext cx="0" cy="0"/>
+          <a:chOff x="0" y="0"/>
+          <a:chExt cx="0" cy="0"/>
+        </a:xfrm>
+      </p:grpSpPr>
+      <p:sp>
+        <p:nvSpPr>
+          <p:cNvPr id="2" name="Title 1"/>
+          <p:cNvSpPr>
+            <a:spLocks noGrp="1"/>
+          </p:cNvSpPr>
+          <p:nvPr>
+            <p:ph type="title"/>
+          </p:nvPr>
+        </p:nvSpPr>
+        <p:spPr/>
+        <p:txBody>
+          <a:bodyPr>
+            <a:normAutofit fontScale="90000"/>
+          </a:bodyPr>
+          <a:lstStyle/>
+          <a:p>
+            <a:r>
+              <a:rPr lang="en-US" dirty="0" smtClean="0"/>
+              <a:t>Pulsed nuclear magnetic resonance (</a:t>
+            </a:r>
+            <a:r>
+              <a:rPr lang="en-US" dirty="0" err="1" smtClean="0"/>
+              <a:t>pnmr</a:t>
+            </a:r>
+            <a:r>
+              <a:rPr lang="en-US" dirty="0" smtClean="0"/>
+              <a:t>)</a:t>
+            </a:r>
+            <a:endParaRPr lang="en-US" dirty="0"/>
+          </a:p>
+        </p:txBody>
+      </p:sp>
+      <p:sp>
+        <p:nvSpPr>
+          <p:cNvPr id="3" name="Content Placeholder 2"/>
+          <p:cNvSpPr>
+            <a:spLocks noGrp="1"/>
+          </p:cNvSpPr>
+          <p:nvPr>
+            <p:ph idx="1"/>
+          </p:nvPr>
+        </p:nvSpPr>
+        <p:spPr>
+          <a:xfrm>
+            <a:off x="457200" y="1769761"/>
+            <a:ext cx="8229600" cy="4373563"/>
+          </a:xfrm>
+        </p:spPr>
+        <p:txBody>
+          <a:bodyPr/>
+          <a:lstStyle/>
+          <a:p>
+            <a:r>
+              <a:rPr lang="en-US" dirty="0" smtClean="0"/>
+              <a:t>A short pulse of RF field is applied on a small region of the target</a:t>
+            </a:r>
+          </a:p>
+          <a:p>
+            <a:r>
+              <a:rPr lang="en-US" dirty="0" smtClean="0"/>
+              <a:t>The frequency of the pulse is equal to the </a:t>
+            </a:r>
+            <a:r>
+              <a:rPr lang="en-US" dirty="0" err="1" smtClean="0"/>
+              <a:t>Larmor</a:t>
+            </a:r>
+            <a:r>
+              <a:rPr lang="en-US" dirty="0" smtClean="0"/>
+              <a:t> frequency, so in the rotating frame</a:t>
+            </a:r>
+          </a:p>
+          <a:p>
+            <a:endParaRPr lang="en-US" dirty="0"/>
+          </a:p>
+        </p:txBody>
+      </p:sp>
+      <p:graphicFrame>
+        <p:nvGraphicFramePr>
+          <p:cNvPr id="4" name="Object 3"/>
+          <p:cNvGraphicFramePr>
+            <a:graphicFrameLocks noChangeAspect="1"/>
+          </p:cNvGraphicFramePr>
+          <p:nvPr>
+            <p:extLst>
+              <p:ext uri="{D42A27DB-BD31-4B8C-83A1-F6EECF244321}">
+                <p14:modId xmlns:p14="http://schemas.microsoft.com/office/powerpoint/2010/main" val="3548607104"/>
+              </p:ext>
+            </p:extLst>
+          </p:nvPr>
+        </p:nvGraphicFramePr>
+        <p:xfrm>
+          <a:off x="907734" y="3481388"/>
+          <a:ext cx="3532188" cy="490537"/>
+        </p:xfrm>
+        <a:graphic>
+          <a:graphicData uri="http://schemas.openxmlformats.org/presentationml/2006/ole">
+            <mc:AlternateContent xmlns:mc="http://schemas.openxmlformats.org/markup-compatibility/2006">
+              <mc:Choice xmlns:v="urn:schemas-microsoft-com:vml" Requires="v">
+                <p:oleObj spid="_x0000_s5132" name="Equation" r:id="rId3" imgW="1828800" imgH="254000" progId="Equation.3">
+                  <p:embed/>
+                </p:oleObj>
+              </mc:Choice>
+              <mc:Fallback>
+                <p:oleObj name="Equation" r:id="rId3" imgW="1828800" imgH="254000" progId="Equation.3">
+                  <p:embed/>
+                  <p:pic>
+                    <p:nvPicPr>
+                      <p:cNvPr id="0" name=""/>
+                      <p:cNvPicPr/>
+                      <p:nvPr/>
+                    </p:nvPicPr>
+                    <p:blipFill>
+                      <a:blip r:embed="rId4"/>
+                      <a:stretch>
+                        <a:fillRect/>
+                      </a:stretch>
+                    </p:blipFill>
+                    <p:spPr>
+                      <a:xfrm>
+                        <a:off x="907734" y="3481388"/>
+                        <a:ext cx="3532188" cy="490537"/>
+                      </a:xfrm>
+                      <a:prstGeom prst="rect">
+                        <a:avLst/>
+                      </a:prstGeom>
+                    </p:spPr>
+                  </p:pic>
+                </p:oleObj>
+              </mc:Fallback>
+            </mc:AlternateContent>
+          </a:graphicData>
+        </a:graphic>
+      </p:graphicFrame>
+      <p:pic>
+        <p:nvPicPr>
+          <p:cNvPr id="5" name="Picture 4" descr="Typical FID.pdf"/>
+          <p:cNvPicPr>
+            <a:picLocks noChangeAspect="1"/>
+          </p:cNvPicPr>
+          <p:nvPr/>
+        </p:nvPicPr>
+        <p:blipFill rotWithShape="1">
+          <a:blip r:embed="rId5">
+            <a:extLst>
+              <a:ext uri="{28A0092B-C50C-407E-A947-70E740481C1C}">
+                <a14:useLocalDpi xmlns:a14="http://schemas.microsoft.com/office/drawing/2010/main" val="0"/>
+              </a:ext>
+            </a:extLst>
+          </a:blip>
+          <a:srcRect t="36393" b="36689"/>
+          <a:stretch/>
+        </p:blipFill>
+        <p:spPr>
+          <a:xfrm>
+            <a:off x="912768" y="4098503"/>
+            <a:ext cx="7088638" cy="2469322"/>
+          </a:xfrm>
+          <a:prstGeom prst="rect">
+            <a:avLst/>
+          </a:prstGeom>
+        </p:spPr>
+      </p:pic>
+    </p:spTree>
+    <p:extLst>
+      <p:ext uri="{BB962C8B-B14F-4D97-AF65-F5344CB8AC3E}">
+        <p14:creationId xmlns:p14="http://schemas.microsoft.com/office/powerpoint/2010/main" val="1604180475"/>
+      </p:ext>
+    </p:extLst>
+  </p:cSld>
+  <p:clrMapOvr>
+    <a:masterClrMapping/>
+  </p:clrMapOvr>
+</p:sld>
+</file>
+
+<file path=ppt/slides/slide15.xml><?xml version="1.0" encoding="utf-8"?>
+<p:sld xmlns:a="http://schemas.openxmlformats.org/drawingml/2006/main" xmlns:r="http://schemas.openxmlformats.org/officeDocument/2006/relationships" xmlns:p="http://schemas.openxmlformats.org/presentationml/2006/main">
+  <p:cSld>
+    <p:spTree>
+      <p:nvGrpSpPr>
+        <p:cNvPr id="1" name=""/>
+        <p:cNvGrpSpPr/>
+        <p:nvPr/>
+      </p:nvGrpSpPr>
+      <p:grpSpPr>
+        <a:xfrm>
+          <a:off x="0" y="0"/>
+          <a:ext cx="0" cy="0"/>
+          <a:chOff x="0" y="0"/>
+          <a:chExt cx="0" cy="0"/>
+        </a:xfrm>
+      </p:grpSpPr>
+      <p:sp>
+        <p:nvSpPr>
+          <p:cNvPr id="2" name="Title 1"/>
+          <p:cNvSpPr>
+            <a:spLocks noGrp="1"/>
+          </p:cNvSpPr>
+          <p:nvPr>
+            <p:ph type="title"/>
+          </p:nvPr>
+        </p:nvSpPr>
+        <p:spPr/>
+        <p:txBody>
+          <a:bodyPr>
+            <a:normAutofit fontScale="90000"/>
+          </a:bodyPr>
+          <a:lstStyle/>
+          <a:p>
+            <a:r>
+              <a:rPr lang="en-US" dirty="0" smtClean="0"/>
+              <a:t>Electron paramagnetic resonance (</a:t>
+            </a:r>
+            <a:r>
+              <a:rPr lang="en-US" dirty="0" err="1" smtClean="0"/>
+              <a:t>epr</a:t>
+            </a:r>
+            <a:r>
+              <a:rPr lang="en-US" dirty="0" smtClean="0"/>
+              <a:t>)</a:t>
+            </a:r>
+            <a:endParaRPr lang="en-US" dirty="0"/>
+          </a:p>
+        </p:txBody>
+      </p:sp>
+      <p:sp>
+        <p:nvSpPr>
+          <p:cNvPr id="3" name="Content Placeholder 2"/>
+          <p:cNvSpPr>
+            <a:spLocks noGrp="1"/>
+          </p:cNvSpPr>
+          <p:nvPr>
+            <p:ph idx="1"/>
+          </p:nvPr>
+        </p:nvSpPr>
+        <p:spPr/>
+        <p:txBody>
+          <a:bodyPr>
+            <a:normAutofit/>
+          </a:bodyPr>
+          <a:lstStyle/>
+          <a:p>
+            <a:r>
+              <a:rPr lang="en-US" sz="1800" dirty="0" smtClean="0"/>
+              <a:t>The shift of Zeeman splitting of alkali metal is largely caused by Fermi-contact interaction</a:t>
+            </a:r>
+          </a:p>
+          <a:p>
+            <a:r>
+              <a:rPr lang="en-US" sz="1800" dirty="0" smtClean="0"/>
+              <a:t>The effective field causing the shift is produced by polarized </a:t>
+            </a:r>
+            <a:r>
+              <a:rPr lang="en-US" sz="1800" baseline="30000" dirty="0" smtClean="0"/>
+              <a:t>3</a:t>
+            </a:r>
+            <a:r>
+              <a:rPr lang="en-US" sz="1800" dirty="0" smtClean="0"/>
+              <a:t>He multiplied by an enhancement factor </a:t>
+            </a:r>
+          </a:p>
+          <a:p>
+            <a:r>
+              <a:rPr lang="en-US" sz="1800" dirty="0" smtClean="0"/>
+              <a:t>By flipping </a:t>
+            </a:r>
+            <a:r>
+              <a:rPr lang="en-US" sz="1800" baseline="30000" dirty="0" smtClean="0"/>
+              <a:t>3</a:t>
+            </a:r>
+            <a:r>
+              <a:rPr lang="en-US" sz="1800" dirty="0" smtClean="0"/>
+              <a:t>He spins, we can isolate the effective field from holding field and other ambient fields</a:t>
+            </a:r>
+          </a:p>
+          <a:p>
+            <a:r>
+              <a:rPr lang="en-US" sz="1800" dirty="0" smtClean="0"/>
+              <a:t>Thus </a:t>
+            </a:r>
+            <a:r>
+              <a:rPr lang="en-US" sz="1800" baseline="30000" dirty="0" smtClean="0"/>
+              <a:t>3</a:t>
+            </a:r>
+            <a:r>
+              <a:rPr lang="en-US" sz="1800" dirty="0" smtClean="0"/>
+              <a:t>He polarization can be calculated using the frequency shift</a:t>
+            </a:r>
+            <a:endParaRPr lang="en-US" sz="1800" dirty="0"/>
+          </a:p>
+        </p:txBody>
+      </p:sp>
+      <p:graphicFrame>
+        <p:nvGraphicFramePr>
+          <p:cNvPr id="4" name="Object 3"/>
+          <p:cNvGraphicFramePr>
+            <a:graphicFrameLocks noChangeAspect="1"/>
+          </p:cNvGraphicFramePr>
+          <p:nvPr>
+            <p:extLst>
+              <p:ext uri="{D42A27DB-BD31-4B8C-83A1-F6EECF244321}">
+                <p14:modId xmlns:p14="http://schemas.microsoft.com/office/powerpoint/2010/main" val="2424487898"/>
+              </p:ext>
+            </p:extLst>
+          </p:nvPr>
+        </p:nvGraphicFramePr>
+        <p:xfrm>
+          <a:off x="3158067" y="2076530"/>
+          <a:ext cx="789567" cy="311042"/>
+        </p:xfrm>
+        <a:graphic>
+          <a:graphicData uri="http://schemas.openxmlformats.org/presentationml/2006/ole">
+            <mc:AlternateContent xmlns:mc="http://schemas.openxmlformats.org/markup-compatibility/2006">
+              <mc:Choice xmlns:v="urn:schemas-microsoft-com:vml" Requires="v">
+                <p:oleObj spid="_x0000_s6163" name="Equation" r:id="rId3" imgW="419100" imgH="165100" progId="Equation.3">
+                  <p:embed/>
+                </p:oleObj>
+              </mc:Choice>
+              <mc:Fallback>
+                <p:oleObj name="Equation" r:id="rId3" imgW="419100" imgH="165100" progId="Equation.3">
+                  <p:embed/>
+                  <p:pic>
+                    <p:nvPicPr>
+                      <p:cNvPr id="0" name=""/>
+                      <p:cNvPicPr/>
+                      <p:nvPr/>
+                    </p:nvPicPr>
+                    <p:blipFill>
+                      <a:blip r:embed="rId4"/>
+                      <a:stretch>
+                        <a:fillRect/>
+                      </a:stretch>
+                    </p:blipFill>
+                    <p:spPr>
+                      <a:xfrm>
+                        <a:off x="3158067" y="2076530"/>
+                        <a:ext cx="789567" cy="311042"/>
+                      </a:xfrm>
+                      <a:prstGeom prst="rect">
+                        <a:avLst/>
+                      </a:prstGeom>
+                    </p:spPr>
+                  </p:pic>
+                </p:oleObj>
+              </mc:Fallback>
+            </mc:AlternateContent>
+          </a:graphicData>
+        </a:graphic>
+      </p:graphicFrame>
+      <p:graphicFrame>
+        <p:nvGraphicFramePr>
+          <p:cNvPr id="5" name="Object 4"/>
+          <p:cNvGraphicFramePr>
+            <a:graphicFrameLocks noChangeAspect="1"/>
+          </p:cNvGraphicFramePr>
+          <p:nvPr>
+            <p:extLst>
+              <p:ext uri="{D42A27DB-BD31-4B8C-83A1-F6EECF244321}">
+                <p14:modId xmlns:p14="http://schemas.microsoft.com/office/powerpoint/2010/main" val="912550228"/>
+              </p:ext>
+            </p:extLst>
+          </p:nvPr>
+        </p:nvGraphicFramePr>
+        <p:xfrm>
+          <a:off x="5169649" y="2634607"/>
+          <a:ext cx="339920" cy="412760"/>
+        </p:xfrm>
+        <a:graphic>
+          <a:graphicData uri="http://schemas.openxmlformats.org/presentationml/2006/ole">
+            <mc:AlternateContent xmlns:mc="http://schemas.openxmlformats.org/markup-compatibility/2006">
+              <mc:Choice xmlns:v="urn:schemas-microsoft-com:vml" Requires="v">
+                <p:oleObj spid="_x0000_s6164" name="Equation" r:id="rId5" imgW="177800" imgH="215900" progId="Equation.3">
+                  <p:embed/>
+                </p:oleObj>
+              </mc:Choice>
+              <mc:Fallback>
+                <p:oleObj name="Equation" r:id="rId5" imgW="177800" imgH="215900" progId="Equation.3">
+                  <p:embed/>
+                  <p:pic>
+                    <p:nvPicPr>
+                      <p:cNvPr id="0" name=""/>
+                      <p:cNvPicPr/>
+                      <p:nvPr/>
+                    </p:nvPicPr>
+                    <p:blipFill>
+                      <a:blip r:embed="rId6"/>
+                      <a:stretch>
+                        <a:fillRect/>
+                      </a:stretch>
+                    </p:blipFill>
+                    <p:spPr>
+                      <a:xfrm>
+                        <a:off x="5169649" y="2634607"/>
+                        <a:ext cx="339920" cy="412760"/>
+                      </a:xfrm>
+                      <a:prstGeom prst="rect">
+                        <a:avLst/>
+                      </a:prstGeom>
+                    </p:spPr>
+                  </p:pic>
+                </p:oleObj>
+              </mc:Fallback>
+            </mc:AlternateContent>
+          </a:graphicData>
+        </a:graphic>
+      </p:graphicFrame>
+      <p:pic>
+        <p:nvPicPr>
+          <p:cNvPr id="6" name="Picture 5" descr="epr.png"/>
+          <p:cNvPicPr>
+            <a:picLocks noChangeAspect="1"/>
+          </p:cNvPicPr>
+          <p:nvPr/>
+        </p:nvPicPr>
+        <p:blipFill>
+          <a:blip r:embed="rId7">
+            <a:extLst>
+              <a:ext uri="{28A0092B-C50C-407E-A947-70E740481C1C}">
+                <a14:useLocalDpi xmlns:a14="http://schemas.microsoft.com/office/drawing/2010/main" val="0"/>
+              </a:ext>
+            </a:extLst>
+          </a:blip>
+          <a:stretch>
+            <a:fillRect/>
+          </a:stretch>
+        </p:blipFill>
+        <p:spPr>
+          <a:xfrm>
+            <a:off x="1973834" y="3913870"/>
+            <a:ext cx="5166296" cy="2755358"/>
+          </a:xfrm>
+          <a:prstGeom prst="rect">
+            <a:avLst/>
+          </a:prstGeom>
+        </p:spPr>
+      </p:pic>
+    </p:spTree>
+    <p:extLst>
+      <p:ext uri="{BB962C8B-B14F-4D97-AF65-F5344CB8AC3E}">
+        <p14:creationId xmlns:p14="http://schemas.microsoft.com/office/powerpoint/2010/main" val="1049129481"/>
+      </p:ext>
+    </p:extLst>
+  </p:cSld>
+  <p:clrMapOvr>
+    <a:masterClrMapping/>
+  </p:clrMapOvr>
+  <p:timing>
+    <p:tnLst>
+      <p:par>
+        <p:cTn xmlns:p14="http://schemas.microsoft.com/office/powerpoint/2010/main" id="1" dur="indefinite" restart="never" nodeType="tmRoot"/>
+      </p:par>
+    </p:tnLst>
+  </p:timing>
+</p:sld>
+</file>
+
+<file path=ppt/slides/slide16.xml><?xml version="1.0" encoding="utf-8"?>
+<p:sld xmlns:a="http://schemas.openxmlformats.org/drawingml/2006/main" xmlns:r="http://schemas.openxmlformats.org/officeDocument/2006/relationships" xmlns:p="http://schemas.openxmlformats.org/presentationml/2006/main">
+  <p:cSld>
+    <p:spTree>
+      <p:nvGrpSpPr>
+        <p:cNvPr id="1" name=""/>
+        <p:cNvGrpSpPr/>
+        <p:nvPr/>
+      </p:nvGrpSpPr>
+      <p:grpSpPr>
+        <a:xfrm>
+          <a:off x="0" y="0"/>
+          <a:ext cx="0" cy="0"/>
+          <a:chOff x="0" y="0"/>
+          <a:chExt cx="0" cy="0"/>
+        </a:xfrm>
+      </p:grpSpPr>
+      <p:sp>
+        <p:nvSpPr>
+          <p:cNvPr id="2" name="Title 1"/>
+          <p:cNvSpPr>
+            <a:spLocks noGrp="1"/>
+          </p:cNvSpPr>
+          <p:nvPr>
+            <p:ph type="title"/>
+          </p:nvPr>
+        </p:nvSpPr>
+        <p:spPr/>
+        <p:txBody>
+          <a:bodyPr/>
+          <a:lstStyle/>
+          <a:p>
+            <a:r>
+              <a:rPr lang="en-US" dirty="0" err="1" smtClean="0"/>
+              <a:t>Spinup</a:t>
+            </a:r>
+            <a:endParaRPr lang="en-US" dirty="0"/>
+          </a:p>
+        </p:txBody>
+      </p:sp>
+      <p:pic>
+        <p:nvPicPr>
+          <p:cNvPr id="4" name="Picture 3" descr="Spinup.png"/>
+          <p:cNvPicPr>
+            <a:picLocks noChangeAspect="1"/>
+          </p:cNvPicPr>
+          <p:nvPr/>
+        </p:nvPicPr>
+        <p:blipFill>
+          <a:blip r:embed="rId4">
+            <a:extLst>
+              <a:ext uri="{28A0092B-C50C-407E-A947-70E740481C1C}">
+                <a14:useLocalDpi xmlns:a14="http://schemas.microsoft.com/office/drawing/2010/main" val="0"/>
+              </a:ext>
+            </a:extLst>
+          </a:blip>
+          <a:stretch>
+            <a:fillRect/>
+          </a:stretch>
+        </p:blipFill>
+        <p:spPr>
+          <a:xfrm>
+            <a:off x="282166" y="2042170"/>
+            <a:ext cx="4801046" cy="3947050"/>
+          </a:xfrm>
+          <a:prstGeom prst="rect">
+            <a:avLst/>
+          </a:prstGeom>
+        </p:spPr>
+      </p:pic>
+      <p:graphicFrame>
+        <p:nvGraphicFramePr>
+          <p:cNvPr id="5" name="Object 4"/>
+          <p:cNvGraphicFramePr>
+            <a:graphicFrameLocks noChangeAspect="1"/>
+          </p:cNvGraphicFramePr>
+          <p:nvPr>
+            <p:extLst>
+              <p:ext uri="{D42A27DB-BD31-4B8C-83A1-F6EECF244321}">
+                <p14:modId xmlns:p14="http://schemas.microsoft.com/office/powerpoint/2010/main" val="1903045697"/>
+              </p:ext>
+            </p:extLst>
+          </p:nvPr>
+        </p:nvGraphicFramePr>
+        <p:xfrm>
+          <a:off x="5151601" y="3535185"/>
+          <a:ext cx="3807888" cy="787839"/>
+        </p:xfrm>
+        <a:graphic>
+          <a:graphicData uri="http://schemas.openxmlformats.org/presentationml/2006/ole">
+            <mc:AlternateContent xmlns:mc="http://schemas.openxmlformats.org/markup-compatibility/2006">
+              <mc:Choice xmlns:v="urn:schemas-microsoft-com:vml" Requires="v">
+                <p:oleObj spid="_x0000_s7176" name="Equation" r:id="rId5" imgW="2578100" imgH="533400" progId="Equation.3">
+                  <p:embed/>
+                </p:oleObj>
+              </mc:Choice>
+              <mc:Fallback>
+                <p:oleObj name="Equation" r:id="rId5" imgW="2578100" imgH="533400" progId="Equation.3">
+                  <p:embed/>
+                  <p:pic>
+                    <p:nvPicPr>
+                      <p:cNvPr id="0" name=""/>
+                      <p:cNvPicPr/>
+                      <p:nvPr/>
+                    </p:nvPicPr>
+                    <p:blipFill>
+                      <a:blip r:embed="rId6"/>
+                      <a:stretch>
+                        <a:fillRect/>
+                      </a:stretch>
+                    </p:blipFill>
+                    <p:spPr>
+                      <a:xfrm>
+                        <a:off x="5151601" y="3535185"/>
+                        <a:ext cx="3807888" cy="787839"/>
+                      </a:xfrm>
+                      <a:prstGeom prst="rect">
+                        <a:avLst/>
+                      </a:prstGeom>
+                    </p:spPr>
+                  </p:pic>
+                </p:oleObj>
+              </mc:Fallback>
+            </mc:AlternateContent>
+          </a:graphicData>
+        </a:graphic>
+      </p:graphicFrame>
+      <p:sp>
+        <p:nvSpPr>
+          <p:cNvPr id="6" name="TextBox 5"/>
+          <p:cNvSpPr txBox="1"/>
+          <p:nvPr/>
+        </p:nvSpPr>
+        <p:spPr>
+          <a:xfrm>
+            <a:off x="5151601" y="2728613"/>
+            <a:ext cx="3807888" cy="646331"/>
+          </a:xfrm>
+          <a:prstGeom prst="rect">
+            <a:avLst/>
+          </a:prstGeom>
+          <a:noFill/>
+        </p:spPr>
+        <p:txBody>
+          <a:bodyPr wrap="square" rtlCol="0">
+            <a:spAutoFit/>
+          </a:bodyPr>
+          <a:lstStyle/>
+          <a:p>
+            <a:r>
+              <a:rPr lang="en-US" dirty="0" smtClean="0"/>
+              <a:t>Time evolution of polarization in a double-chambered cell:</a:t>
+            </a:r>
+            <a:endParaRPr lang="en-US" dirty="0"/>
+          </a:p>
+        </p:txBody>
+      </p:sp>
+    </p:spTree>
+    <p:extLst>
+      <p:ext uri="{BB962C8B-B14F-4D97-AF65-F5344CB8AC3E}">
+        <p14:creationId xmlns:p14="http://schemas.microsoft.com/office/powerpoint/2010/main" val="3512133907"/>
+      </p:ext>
+    </p:extLst>
+  </p:cSld>
+  <p:clrMapOvr>
+    <a:masterClrMapping/>
+  </p:clrMapOvr>
+  <p:timing>
+    <p:tnLst>
+      <p:par>
+        <p:cTn xmlns:p14="http://schemas.microsoft.com/office/powerpoint/2010/main" id="1" dur="indefinite" restart="never" nodeType="tmRoot"/>
+      </p:par>
+    </p:tnLst>
+  </p:timing>
+</p:sld>
+</file>
+
+<file path=ppt/slides/slide17.xml><?xml version="1.0" encoding="utf-8"?>
+<p:sld xmlns:a="http://schemas.openxmlformats.org/drawingml/2006/main" xmlns:r="http://schemas.openxmlformats.org/officeDocument/2006/relationships" xmlns:p="http://schemas.openxmlformats.org/presentationml/2006/main">
+  <p:cSld>
+    <p:spTree>
+      <p:nvGrpSpPr>
+        <p:cNvPr id="1" name=""/>
+        <p:cNvGrpSpPr/>
+        <p:nvPr/>
+      </p:nvGrpSpPr>
+      <p:grpSpPr>
+        <a:xfrm>
+          <a:off x="0" y="0"/>
+          <a:ext cx="0" cy="0"/>
+          <a:chOff x="0" y="0"/>
+          <a:chExt cx="0" cy="0"/>
+        </a:xfrm>
+      </p:grpSpPr>
+      <p:sp>
+        <p:nvSpPr>
+          <p:cNvPr id="2" name="Title 1"/>
+          <p:cNvSpPr>
+            <a:spLocks noGrp="1"/>
+          </p:cNvSpPr>
+          <p:nvPr>
+            <p:ph type="title"/>
+          </p:nvPr>
+        </p:nvSpPr>
+        <p:spPr/>
+        <p:txBody>
+          <a:bodyPr/>
+          <a:lstStyle/>
+          <a:p>
+            <a:r>
+              <a:rPr lang="en-US" dirty="0" err="1" smtClean="0"/>
+              <a:t>spindown</a:t>
+            </a:r>
+            <a:endParaRPr lang="en-US" dirty="0"/>
+          </a:p>
+        </p:txBody>
+      </p:sp>
+      <p:pic>
+        <p:nvPicPr>
+          <p:cNvPr id="4" name="Picture 3"/>
+          <p:cNvPicPr>
+            <a:picLocks noChangeAspect="1" noChangeArrowheads="1"/>
+          </p:cNvPicPr>
+          <p:nvPr/>
+        </p:nvPicPr>
+        <p:blipFill>
+          <a:blip r:embed="rId4" cstate="print">
+            <a:extLst>
+              <a:ext uri="{28A0092B-C50C-407E-A947-70E740481C1C}">
+                <a14:useLocalDpi xmlns:a14="http://schemas.microsoft.com/office/drawing/2010/main" val="0"/>
+              </a:ext>
+            </a:extLst>
+          </a:blip>
+          <a:srcRect/>
+          <a:stretch>
+            <a:fillRect/>
+          </a:stretch>
+        </p:blipFill>
+        <p:spPr bwMode="auto">
+          <a:xfrm>
+            <a:off x="426128" y="1987993"/>
+            <a:ext cx="4943356" cy="4138235"/>
+          </a:xfrm>
+          <a:prstGeom prst="rect">
+            <a:avLst/>
+          </a:prstGeom>
+          <a:noFill/>
+          <a:ln>
+            <a:noFill/>
+          </a:ln>
+          <a:extLst>
+            <a:ext uri="{909E8E84-426E-40dd-AFC4-6F175D3DCCD1}">
+              <a14:hiddenFill xmlns:a14="http://schemas.microsoft.com/office/drawing/2010/main">
+                <a:solidFill>
+                  <a:schemeClr val="accent1"/>
+                </a:solidFill>
+              </a14:hiddenFill>
+            </a:ext>
+            <a:ext uri="{91240B29-F687-4f45-9708-019B960494DF}">
+              <a14:hiddenLine xmlns:a14="http://schemas.microsoft.com/office/drawing/2010/main" w="9525">
+                <a:solidFill>
+                  <a:schemeClr val="tx1"/>
+                </a:solidFill>
+                <a:miter lim="800000"/>
+                <a:headEnd/>
+                <a:tailEnd/>
+              </a14:hiddenLine>
+            </a:ext>
+          </a:extLst>
+        </p:spPr>
+      </p:pic>
+      <p:graphicFrame>
+        <p:nvGraphicFramePr>
+          <p:cNvPr id="5" name="Object 4"/>
+          <p:cNvGraphicFramePr>
+            <a:graphicFrameLocks noChangeAspect="1"/>
+          </p:cNvGraphicFramePr>
+          <p:nvPr>
+            <p:extLst>
+              <p:ext uri="{D42A27DB-BD31-4B8C-83A1-F6EECF244321}">
+                <p14:modId xmlns:p14="http://schemas.microsoft.com/office/powerpoint/2010/main" val="964526088"/>
+              </p:ext>
+            </p:extLst>
+          </p:nvPr>
+        </p:nvGraphicFramePr>
+        <p:xfrm>
+          <a:off x="5627098" y="2972944"/>
+          <a:ext cx="1743829" cy="454912"/>
+        </p:xfrm>
+        <a:graphic>
+          <a:graphicData uri="http://schemas.openxmlformats.org/presentationml/2006/ole">
+            <mc:AlternateContent xmlns:mc="http://schemas.openxmlformats.org/markup-compatibility/2006">
+              <mc:Choice xmlns:v="urn:schemas-microsoft-com:vml" Requires="v">
+                <p:oleObj spid="_x0000_s8198" name="Equation" r:id="rId5" imgW="876300" imgH="228600" progId="Equation.3">
+                  <p:embed/>
+                </p:oleObj>
+              </mc:Choice>
+              <mc:Fallback>
+                <p:oleObj name="Equation" r:id="rId5" imgW="876300" imgH="228600" progId="Equation.3">
+                  <p:embed/>
+                  <p:pic>
+                    <p:nvPicPr>
+                      <p:cNvPr id="0" name=""/>
+                      <p:cNvPicPr/>
+                      <p:nvPr/>
+                    </p:nvPicPr>
+                    <p:blipFill>
+                      <a:blip r:embed="rId6"/>
+                      <a:stretch>
+                        <a:fillRect/>
+                      </a:stretch>
+                    </p:blipFill>
+                    <p:spPr>
+                      <a:xfrm>
+                        <a:off x="5627098" y="2972944"/>
+                        <a:ext cx="1743829" cy="454912"/>
+                      </a:xfrm>
+                      <a:prstGeom prst="rect">
+                        <a:avLst/>
+                      </a:prstGeom>
+                    </p:spPr>
+                  </p:pic>
+                </p:oleObj>
+              </mc:Fallback>
+            </mc:AlternateContent>
+          </a:graphicData>
+        </a:graphic>
+      </p:graphicFrame>
+      <p:sp>
+        <p:nvSpPr>
+          <p:cNvPr id="6" name="TextBox 5"/>
+          <p:cNvSpPr txBox="1"/>
+          <p:nvPr/>
+        </p:nvSpPr>
+        <p:spPr>
+          <a:xfrm>
+            <a:off x="5492407" y="2162297"/>
+            <a:ext cx="3484246" cy="646331"/>
+          </a:xfrm>
+          <a:prstGeom prst="rect">
+            <a:avLst/>
+          </a:prstGeom>
+          <a:noFill/>
+        </p:spPr>
+        <p:txBody>
+          <a:bodyPr wrap="square" rtlCol="0">
+            <a:spAutoFit/>
+          </a:bodyPr>
+          <a:lstStyle/>
+          <a:p>
+            <a:r>
+              <a:rPr lang="en-US" dirty="0" smtClean="0"/>
+              <a:t>Exponential decay of nuclear polarization:</a:t>
+            </a:r>
+            <a:endParaRPr lang="en-US" dirty="0"/>
+          </a:p>
+        </p:txBody>
+      </p:sp>
+      <p:sp>
+        <p:nvSpPr>
+          <p:cNvPr id="7" name="TextBox 6"/>
+          <p:cNvSpPr txBox="1"/>
+          <p:nvPr/>
+        </p:nvSpPr>
+        <p:spPr>
+          <a:xfrm>
+            <a:off x="5558441" y="3861245"/>
+            <a:ext cx="3349555" cy="369332"/>
+          </a:xfrm>
+          <a:prstGeom prst="rect">
+            <a:avLst/>
+          </a:prstGeom>
+          <a:noFill/>
+        </p:spPr>
+        <p:txBody>
+          <a:bodyPr wrap="square" rtlCol="0">
+            <a:spAutoFit/>
+          </a:bodyPr>
+          <a:lstStyle/>
+          <a:p>
+            <a:r>
+              <a:rPr lang="en-US" dirty="0" smtClean="0"/>
+              <a:t>T</a:t>
+            </a:r>
+            <a:r>
+              <a:rPr lang="en-US" baseline="-25000" dirty="0" smtClean="0"/>
+              <a:t>1</a:t>
+            </a:r>
+            <a:r>
+              <a:rPr lang="en-US" dirty="0" smtClean="0"/>
+              <a:t> is the so-called life time.</a:t>
+            </a:r>
+            <a:endParaRPr lang="en-US" dirty="0"/>
+          </a:p>
+        </p:txBody>
+      </p:sp>
+    </p:spTree>
+    <p:extLst>
+      <p:ext uri="{BB962C8B-B14F-4D97-AF65-F5344CB8AC3E}">
+        <p14:creationId xmlns:p14="http://schemas.microsoft.com/office/powerpoint/2010/main" val="2119024933"/>
+      </p:ext>
+    </p:extLst>
+  </p:cSld>
+  <p:clrMapOvr>
+    <a:masterClrMapping/>
+  </p:clrMapOvr>
+</p:sld>
+</file>
+
+<file path=ppt/slides/slide18.xml><?xml version="1.0" encoding="utf-8"?>
+<p:sld xmlns:a="http://schemas.openxmlformats.org/drawingml/2006/main" xmlns:r="http://schemas.openxmlformats.org/officeDocument/2006/relationships" xmlns:p="http://schemas.openxmlformats.org/presentationml/2006/main">
+  <p:cSld>
+    <p:spTree>
+      <p:nvGrpSpPr>
+        <p:cNvPr id="1" name=""/>
+        <p:cNvGrpSpPr/>
+        <p:nvPr/>
+      </p:nvGrpSpPr>
+      <p:grpSpPr>
+        <a:xfrm>
+          <a:off x="0" y="0"/>
+          <a:ext cx="0" cy="0"/>
+          <a:chOff x="0" y="0"/>
+          <a:chExt cx="0" cy="0"/>
+        </a:xfrm>
+      </p:grpSpPr>
+      <p:sp>
+        <p:nvSpPr>
+          <p:cNvPr id="2" name="Title 1"/>
+          <p:cNvSpPr>
+            <a:spLocks noGrp="1"/>
+          </p:cNvSpPr>
+          <p:nvPr>
+            <p:ph type="title"/>
+          </p:nvPr>
+        </p:nvSpPr>
+        <p:spPr/>
+        <p:txBody>
+          <a:bodyPr/>
+          <a:lstStyle/>
+          <a:p>
+            <a:r>
+              <a:rPr lang="en-US" dirty="0" smtClean="0"/>
+              <a:t>Initial </a:t>
+            </a:r>
+            <a:r>
+              <a:rPr lang="en-US" dirty="0" err="1" smtClean="0"/>
+              <a:t>spinup</a:t>
+            </a:r>
+            <a:endParaRPr lang="en-US" dirty="0"/>
+          </a:p>
+        </p:txBody>
+      </p:sp>
+      <p:pic>
+        <p:nvPicPr>
+          <p:cNvPr id="4" name="Picture 9"/>
+          <p:cNvPicPr>
+            <a:picLocks noChangeAspect="1" noChangeArrowheads="1"/>
+          </p:cNvPicPr>
+          <p:nvPr/>
+        </p:nvPicPr>
+        <p:blipFill>
+          <a:blip r:embed="rId3">
+            <a:extLst>
+              <a:ext uri="{28A0092B-C50C-407E-A947-70E740481C1C}">
+                <a14:useLocalDpi xmlns:a14="http://schemas.microsoft.com/office/drawing/2010/main" val="0"/>
+              </a:ext>
+            </a:extLst>
+          </a:blip>
+          <a:srcRect/>
+          <a:stretch>
+            <a:fillRect/>
+          </a:stretch>
+        </p:blipFill>
+        <p:spPr bwMode="auto">
+          <a:xfrm>
+            <a:off x="4384853" y="1913961"/>
+            <a:ext cx="4500368" cy="3329250"/>
+          </a:xfrm>
+          <a:prstGeom prst="rect">
+            <a:avLst/>
+          </a:prstGeom>
+          <a:noFill/>
+          <a:extLst>
+            <a:ext uri="{909E8E84-426E-40dd-AFC4-6F175D3DCCD1}">
+              <a14:hiddenFill xmlns:a14="http://schemas.microsoft.com/office/drawing/2010/main">
+                <a:solidFill>
+                  <a:srgbClr val="FFFFFF"/>
+                </a:solidFill>
+              </a14:hiddenFill>
+            </a:ext>
+          </a:extLst>
+        </p:spPr>
+      </p:pic>
+      <p:sp>
+        <p:nvSpPr>
+          <p:cNvPr id="5" name="TextBox 4"/>
+          <p:cNvSpPr txBox="1"/>
+          <p:nvPr/>
+        </p:nvSpPr>
+        <p:spPr>
+          <a:xfrm>
+            <a:off x="257457" y="1913961"/>
+            <a:ext cx="4127395" cy="584776"/>
+          </a:xfrm>
+          <a:prstGeom prst="rect">
+            <a:avLst/>
+          </a:prstGeom>
+          <a:noFill/>
+        </p:spPr>
+        <p:txBody>
+          <a:bodyPr wrap="square" rtlCol="0">
+            <a:spAutoFit/>
+          </a:bodyPr>
+          <a:lstStyle/>
+          <a:p>
+            <a:r>
+              <a:rPr lang="en-US" sz="1600" dirty="0" smtClean="0"/>
+              <a:t>By performing a Taylor expansion on the time evolution of polarization:</a:t>
+            </a:r>
+            <a:endParaRPr lang="en-US" sz="1600" dirty="0"/>
+          </a:p>
+        </p:txBody>
+      </p:sp>
+      <p:graphicFrame>
+        <p:nvGraphicFramePr>
+          <p:cNvPr id="6" name="Object 5"/>
+          <p:cNvGraphicFramePr>
+            <a:graphicFrameLocks noChangeAspect="1"/>
+          </p:cNvGraphicFramePr>
+          <p:nvPr>
+            <p:extLst>
+              <p:ext uri="{D42A27DB-BD31-4B8C-83A1-F6EECF244321}">
+                <p14:modId xmlns:p14="http://schemas.microsoft.com/office/powerpoint/2010/main" val="1668176736"/>
+              </p:ext>
+            </p:extLst>
+          </p:nvPr>
+        </p:nvGraphicFramePr>
+        <p:xfrm>
+          <a:off x="4514850" y="3346450"/>
+          <a:ext cx="114300" cy="165100"/>
+        </p:xfrm>
+        <a:graphic>
+          <a:graphicData uri="http://schemas.openxmlformats.org/presentationml/2006/ole">
+            <mc:AlternateContent xmlns:mc="http://schemas.openxmlformats.org/markup-compatibility/2006">
+              <mc:Choice xmlns:v="urn:schemas-microsoft-com:vml" Requires="v">
+                <p:oleObj spid="_x0000_s9231" name="Equation" r:id="rId4" imgW="114300" imgH="165100" progId="Equation.3">
+                  <p:embed/>
+                </p:oleObj>
+              </mc:Choice>
+              <mc:Fallback>
+                <p:oleObj name="Equation" r:id="rId4" imgW="114300" imgH="165100" progId="Equation.3">
+                  <p:embed/>
+                  <p:pic>
+                    <p:nvPicPr>
+                      <p:cNvPr id="0" name=""/>
+                      <p:cNvPicPr/>
+                      <p:nvPr/>
+                    </p:nvPicPr>
+                    <p:blipFill>
+                      <a:blip r:embed="rId5"/>
+                      <a:stretch>
+                        <a:fillRect/>
+                      </a:stretch>
+                    </p:blipFill>
+                    <p:spPr>
+                      <a:xfrm>
+                        <a:off x="4514850" y="3346450"/>
+                        <a:ext cx="114300" cy="165100"/>
+                      </a:xfrm>
+                      <a:prstGeom prst="rect">
+                        <a:avLst/>
+                      </a:prstGeom>
+                    </p:spPr>
+                  </p:pic>
+                </p:oleObj>
+              </mc:Fallback>
+            </mc:AlternateContent>
+          </a:graphicData>
+        </a:graphic>
+      </p:graphicFrame>
+      <p:graphicFrame>
+        <p:nvGraphicFramePr>
+          <p:cNvPr id="7" name="Object 6"/>
+          <p:cNvGraphicFramePr>
+            <a:graphicFrameLocks noChangeAspect="1"/>
+          </p:cNvGraphicFramePr>
+          <p:nvPr>
+            <p:extLst>
+              <p:ext uri="{D42A27DB-BD31-4B8C-83A1-F6EECF244321}">
+                <p14:modId xmlns:p14="http://schemas.microsoft.com/office/powerpoint/2010/main" val="2587966374"/>
+              </p:ext>
+            </p:extLst>
+          </p:nvPr>
+        </p:nvGraphicFramePr>
+        <p:xfrm>
+          <a:off x="473971" y="2705642"/>
+          <a:ext cx="3859071" cy="1066577"/>
+        </p:xfrm>
+        <a:graphic>
+          <a:graphicData uri="http://schemas.openxmlformats.org/presentationml/2006/ole">
+            <mc:AlternateContent xmlns:mc="http://schemas.openxmlformats.org/markup-compatibility/2006">
+              <mc:Choice xmlns:v="urn:schemas-microsoft-com:vml" Requires="v">
+                <p:oleObj spid="_x0000_s9232" name="Equation" r:id="rId6" imgW="2387600" imgH="660400" progId="Equation.3">
+                  <p:embed/>
+                </p:oleObj>
+              </mc:Choice>
+              <mc:Fallback>
+                <p:oleObj name="Equation" r:id="rId6" imgW="2387600" imgH="660400" progId="Equation.3">
+                  <p:embed/>
+                  <p:pic>
+                    <p:nvPicPr>
+                      <p:cNvPr id="0" name=""/>
+                      <p:cNvPicPr/>
+                      <p:nvPr/>
+                    </p:nvPicPr>
+                    <p:blipFill>
+                      <a:blip r:embed="rId7"/>
+                      <a:stretch>
+                        <a:fillRect/>
+                      </a:stretch>
+                    </p:blipFill>
+                    <p:spPr>
+                      <a:xfrm>
+                        <a:off x="473971" y="2705642"/>
+                        <a:ext cx="3859071" cy="1066577"/>
+                      </a:xfrm>
+                      <a:prstGeom prst="rect">
+                        <a:avLst/>
+                      </a:prstGeom>
+                    </p:spPr>
+                  </p:pic>
+                </p:oleObj>
+              </mc:Fallback>
+            </mc:AlternateContent>
+          </a:graphicData>
+        </a:graphic>
+      </p:graphicFrame>
+      <p:graphicFrame>
+        <p:nvGraphicFramePr>
+          <p:cNvPr id="8" name="Object 7"/>
+          <p:cNvGraphicFramePr>
+            <a:graphicFrameLocks noChangeAspect="1"/>
+          </p:cNvGraphicFramePr>
+          <p:nvPr>
+            <p:extLst>
+              <p:ext uri="{D42A27DB-BD31-4B8C-83A1-F6EECF244321}">
+                <p14:modId xmlns:p14="http://schemas.microsoft.com/office/powerpoint/2010/main" val="1771197726"/>
+              </p:ext>
+            </p:extLst>
+          </p:nvPr>
+        </p:nvGraphicFramePr>
+        <p:xfrm>
+          <a:off x="1460262" y="3858024"/>
+          <a:ext cx="1732202" cy="596647"/>
+        </p:xfrm>
+        <a:graphic>
+          <a:graphicData uri="http://schemas.openxmlformats.org/presentationml/2006/ole">
+            <mc:AlternateContent xmlns:mc="http://schemas.openxmlformats.org/markup-compatibility/2006">
+              <mc:Choice xmlns:v="urn:schemas-microsoft-com:vml" Requires="v">
+                <p:oleObj spid="_x0000_s9233" name="Equation" r:id="rId8" imgW="1143000" imgH="393700" progId="Equation.3">
+                  <p:embed/>
+                </p:oleObj>
+              </mc:Choice>
+              <mc:Fallback>
+                <p:oleObj name="Equation" r:id="rId8" imgW="1143000" imgH="393700" progId="Equation.3">
+                  <p:embed/>
+                  <p:pic>
+                    <p:nvPicPr>
+                      <p:cNvPr id="0" name=""/>
+                      <p:cNvPicPr/>
+                      <p:nvPr/>
+                    </p:nvPicPr>
+                    <p:blipFill>
+                      <a:blip r:embed="rId9"/>
+                      <a:stretch>
+                        <a:fillRect/>
+                      </a:stretch>
+                    </p:blipFill>
+                    <p:spPr>
+                      <a:xfrm>
+                        <a:off x="1460262" y="3858024"/>
+                        <a:ext cx="1732202" cy="596647"/>
+                      </a:xfrm>
+                      <a:prstGeom prst="rect">
+                        <a:avLst/>
+                      </a:prstGeom>
+                    </p:spPr>
+                  </p:pic>
+                </p:oleObj>
+              </mc:Fallback>
+            </mc:AlternateContent>
+          </a:graphicData>
+        </a:graphic>
+      </p:graphicFrame>
+    </p:spTree>
+    <p:extLst>
+      <p:ext uri="{BB962C8B-B14F-4D97-AF65-F5344CB8AC3E}">
+        <p14:creationId xmlns:p14="http://schemas.microsoft.com/office/powerpoint/2010/main" val="1940890897"/>
+      </p:ext>
+    </p:extLst>
+  </p:cSld>
+  <p:clrMapOvr>
+    <a:masterClrMapping/>
+  </p:clrMapOvr>
+  <p:timing>
+    <p:tnLst>
+      <p:par>
+        <p:cTn xmlns:p14="http://schemas.microsoft.com/office/powerpoint/2010/main" id="1" dur="indefinite" restart="never" nodeType="tmRoot"/>
+      </p:par>
+    </p:tnLst>
+  </p:timing>
+</p:sld>
+</file>
+
+<file path=ppt/slides/slide19.xml><?xml version="1.0" encoding="utf-8"?>
+<p:sld xmlns:a="http://schemas.openxmlformats.org/drawingml/2006/main" xmlns:r="http://schemas.openxmlformats.org/officeDocument/2006/relationships" xmlns:p="http://schemas.openxmlformats.org/presentationml/2006/main">
+  <p:cSld>
+    <p:spTree>
+      <p:nvGrpSpPr>
+        <p:cNvPr id="1" name=""/>
+        <p:cNvGrpSpPr/>
+        <p:nvPr/>
+      </p:nvGrpSpPr>
+      <p:grpSpPr>
+        <a:xfrm>
+          <a:off x="0" y="0"/>
+          <a:ext cx="0" cy="0"/>
+          <a:chOff x="0" y="0"/>
+          <a:chExt cx="0" cy="0"/>
+        </a:xfrm>
+      </p:grpSpPr>
+      <p:sp>
+        <p:nvSpPr>
+          <p:cNvPr id="2" name="Title 1"/>
+          <p:cNvSpPr>
+            <a:spLocks noGrp="1"/>
+          </p:cNvSpPr>
+          <p:nvPr>
+            <p:ph type="title"/>
+          </p:nvPr>
+        </p:nvSpPr>
+        <p:spPr/>
+        <p:txBody>
+          <a:bodyPr>
+            <a:normAutofit fontScale="90000"/>
+          </a:bodyPr>
+          <a:lstStyle/>
+          <a:p>
+            <a:r>
+              <a:rPr lang="en-US" dirty="0" smtClean="0"/>
+              <a:t>The k-</a:t>
+            </a:r>
+            <a:r>
+              <a:rPr lang="en-US" baseline="30000" dirty="0" smtClean="0"/>
+              <a:t>3</a:t>
+            </a:r>
+            <a:r>
+              <a:rPr lang="en-US" dirty="0" smtClean="0"/>
+              <a:t>he spin-exchange rate constant</a:t>
+            </a:r>
+            <a:endParaRPr lang="en-US" dirty="0"/>
+          </a:p>
+        </p:txBody>
+      </p:sp>
+      <p:sp>
+        <p:nvSpPr>
+          <p:cNvPr id="3" name="Content Placeholder 2"/>
+          <p:cNvSpPr>
+            <a:spLocks noGrp="1"/>
+          </p:cNvSpPr>
+          <p:nvPr>
+            <p:ph idx="1"/>
+          </p:nvPr>
+        </p:nvSpPr>
+        <p:spPr/>
+        <p:txBody>
+          <a:bodyPr/>
+          <a:lstStyle/>
+          <a:p>
+            <a:r>
+              <a:rPr lang="en-US" sz="2000" dirty="0"/>
+              <a:t>The quantity </a:t>
+            </a:r>
+            <a:r>
+              <a:rPr lang="en-US" sz="2000" dirty="0" err="1"/>
+              <a:t>m</a:t>
+            </a:r>
+            <a:r>
+              <a:rPr lang="en-US" sz="2000" baseline="-25000" dirty="0" err="1"/>
+              <a:t>pc</a:t>
+            </a:r>
+            <a:r>
+              <a:rPr lang="en-US" sz="2000" dirty="0"/>
+              <a:t> can also be measured with a technique based on Faraday rotation</a:t>
+            </a:r>
+          </a:p>
+          <a:p>
+            <a:r>
+              <a:rPr lang="en-US" sz="2000" dirty="0" smtClean="0"/>
+              <a:t>Both </a:t>
+            </a:r>
+            <a:r>
+              <a:rPr lang="en-US" sz="2000" dirty="0" err="1" smtClean="0"/>
+              <a:t>mpc</a:t>
+            </a:r>
+            <a:r>
+              <a:rPr lang="en-US" sz="2000" dirty="0" smtClean="0"/>
+              <a:t> values should agree, fitting the ratio to one gives </a:t>
+            </a:r>
+          </a:p>
+          <a:p>
+            <a:pPr marL="114300" indent="0">
+              <a:buNone/>
+            </a:pPr>
+            <a:endParaRPr lang="en-US" dirty="0"/>
+          </a:p>
+        </p:txBody>
+      </p:sp>
+      <p:graphicFrame>
+        <p:nvGraphicFramePr>
+          <p:cNvPr id="5" name="Object 4"/>
+          <p:cNvGraphicFramePr>
+            <a:graphicFrameLocks noChangeAspect="1"/>
+          </p:cNvGraphicFramePr>
+          <p:nvPr>
+            <p:extLst>
+              <p:ext uri="{D42A27DB-BD31-4B8C-83A1-F6EECF244321}">
+                <p14:modId xmlns:p14="http://schemas.microsoft.com/office/powerpoint/2010/main" val="3131183119"/>
+              </p:ext>
+            </p:extLst>
+          </p:nvPr>
+        </p:nvGraphicFramePr>
+        <p:xfrm>
+          <a:off x="2423200" y="2865905"/>
+          <a:ext cx="3978887" cy="494110"/>
+        </p:xfrm>
+        <a:graphic>
+          <a:graphicData uri="http://schemas.openxmlformats.org/presentationml/2006/ole">
+            <mc:AlternateContent xmlns:mc="http://schemas.openxmlformats.org/markup-compatibility/2006">
+              <mc:Choice xmlns:v="urn:schemas-microsoft-com:vml" Requires="v">
+                <p:oleObj spid="_x0000_s10243" name="Equation" r:id="rId3" imgW="1943100" imgH="241300" progId="Equation.3">
+                  <p:embed/>
+                </p:oleObj>
+              </mc:Choice>
+              <mc:Fallback>
+                <p:oleObj name="Equation" r:id="rId3" imgW="1943100" imgH="241300" progId="Equation.3">
+                  <p:embed/>
+                  <p:pic>
+                    <p:nvPicPr>
+                      <p:cNvPr id="0" name=""/>
+                      <p:cNvPicPr/>
+                      <p:nvPr/>
+                    </p:nvPicPr>
+                    <p:blipFill>
+                      <a:blip r:embed="rId4"/>
+                      <a:stretch>
+                        <a:fillRect/>
+                      </a:stretch>
+                    </p:blipFill>
+                    <p:spPr>
+                      <a:xfrm>
+                        <a:off x="2423200" y="2865905"/>
+                        <a:ext cx="3978887" cy="494110"/>
+                      </a:xfrm>
+                      <a:prstGeom prst="rect">
+                        <a:avLst/>
+                      </a:prstGeom>
+                    </p:spPr>
+                  </p:pic>
+                </p:oleObj>
+              </mc:Fallback>
+            </mc:AlternateContent>
+          </a:graphicData>
+        </a:graphic>
+      </p:graphicFrame>
+      <p:pic>
+        <p:nvPicPr>
+          <p:cNvPr id="6" name="Picture 5" descr="m_ratio.png"/>
+          <p:cNvPicPr>
+            <a:picLocks noChangeAspect="1"/>
+          </p:cNvPicPr>
+          <p:nvPr/>
+        </p:nvPicPr>
+        <p:blipFill>
+          <a:blip r:embed="rId5">
+            <a:extLst>
+              <a:ext uri="{28A0092B-C50C-407E-A947-70E740481C1C}">
+                <a14:useLocalDpi xmlns:a14="http://schemas.microsoft.com/office/drawing/2010/main" val="0"/>
+              </a:ext>
+            </a:extLst>
+          </a:blip>
+          <a:stretch>
+            <a:fillRect/>
+          </a:stretch>
+        </p:blipFill>
+        <p:spPr>
+          <a:xfrm>
+            <a:off x="1235792" y="3360016"/>
+            <a:ext cx="6659007" cy="3299814"/>
+          </a:xfrm>
+          <a:prstGeom prst="rect">
+            <a:avLst/>
+          </a:prstGeom>
+        </p:spPr>
+      </p:pic>
+    </p:spTree>
+    <p:extLst>
+      <p:ext uri="{BB962C8B-B14F-4D97-AF65-F5344CB8AC3E}">
+        <p14:creationId xmlns:p14="http://schemas.microsoft.com/office/powerpoint/2010/main" val="3774486403"/>
+      </p:ext>
+    </p:extLst>
+  </p:cSld>
+  <p:clrMapOvr>
+    <a:masterClrMapping/>
+  </p:clrMapOvr>
+  <p:timing>
+    <p:tnLst>
+      <p:par>
+        <p:cTn xmlns:p14="http://schemas.microsoft.com/office/powerpoint/2010/main" id="1" dur="indefinite" restart="never" nodeType="tmRoot"/>
+      </p:par>
+    </p:tnLst>
+  </p:timing>
 </p:sld>
 </file>
 
@@ -7600,6 +9235,78 @@
     <p:extLst>
       <p:ext uri="{BB962C8B-B14F-4D97-AF65-F5344CB8AC3E}">
         <p14:creationId xmlns:p14="http://schemas.microsoft.com/office/powerpoint/2010/main" val="3886310350"/>
+      </p:ext>
+    </p:extLst>
+  </p:cSld>
+  <p:clrMapOvr>
+    <a:masterClrMapping/>
+  </p:clrMapOvr>
+</p:sld>
+</file>
+
+<file path=ppt/slides/slide20.xml><?xml version="1.0" encoding="utf-8"?>
+<p:sld xmlns:a="http://schemas.openxmlformats.org/drawingml/2006/main" xmlns:r="http://schemas.openxmlformats.org/officeDocument/2006/relationships" xmlns:p="http://schemas.openxmlformats.org/presentationml/2006/main">
+  <p:cSld>
+    <p:spTree>
+      <p:nvGrpSpPr>
+        <p:cNvPr id="1" name=""/>
+        <p:cNvGrpSpPr/>
+        <p:nvPr/>
+      </p:nvGrpSpPr>
+      <p:grpSpPr>
+        <a:xfrm>
+          <a:off x="0" y="0"/>
+          <a:ext cx="0" cy="0"/>
+          <a:chOff x="0" y="0"/>
+          <a:chExt cx="0" cy="0"/>
+        </a:xfrm>
+      </p:grpSpPr>
+      <p:sp>
+        <p:nvSpPr>
+          <p:cNvPr id="2" name="Title 1"/>
+          <p:cNvSpPr>
+            <a:spLocks noGrp="1"/>
+          </p:cNvSpPr>
+          <p:nvPr>
+            <p:ph type="title"/>
+          </p:nvPr>
+        </p:nvSpPr>
+        <p:spPr/>
+        <p:txBody>
+          <a:bodyPr/>
+          <a:lstStyle/>
+          <a:p>
+            <a:r>
+              <a:rPr lang="en-US" dirty="0" smtClean="0"/>
+              <a:t>The x factor</a:t>
+            </a:r>
+            <a:endParaRPr lang="en-US" dirty="0"/>
+          </a:p>
+        </p:txBody>
+      </p:sp>
+      <p:sp>
+        <p:nvSpPr>
+          <p:cNvPr id="3" name="Content Placeholder 2"/>
+          <p:cNvSpPr>
+            <a:spLocks noGrp="1"/>
+          </p:cNvSpPr>
+          <p:nvPr>
+            <p:ph idx="1"/>
+          </p:nvPr>
+        </p:nvSpPr>
+        <p:spPr/>
+        <p:txBody>
+          <a:bodyPr/>
+          <a:lstStyle/>
+          <a:p>
+            <a:endParaRPr lang="en-US"/>
+          </a:p>
+        </p:txBody>
+      </p:sp>
+    </p:spTree>
+    <p:extLst>
+      <p:ext uri="{BB962C8B-B14F-4D97-AF65-F5344CB8AC3E}">
+        <p14:creationId xmlns:p14="http://schemas.microsoft.com/office/powerpoint/2010/main" val="244184032"/>
       </p:ext>
     </p:extLst>
   </p:cSld>
@@ -8371,7 +10078,7 @@
           <a:graphicData uri="http://schemas.openxmlformats.org/presentationml/2006/ole">
             <mc:AlternateContent xmlns:mc="http://schemas.openxmlformats.org/markup-compatibility/2006">
               <mc:Choice xmlns:v="urn:schemas-microsoft-com:vml" Requires="v">
-                <p:oleObj spid="_x0000_s2078" name="Equation" r:id="rId4" imgW="114300" imgH="165100" progId="Equation.3">
+                <p:oleObj spid="_x0000_s2090" name="Equation" r:id="rId4" imgW="114300" imgH="165100" progId="Equation.3">
                   <p:embed/>
                 </p:oleObj>
               </mc:Choice>
@@ -9596,7 +11303,7 @@
           <a:graphicData uri="http://schemas.openxmlformats.org/presentationml/2006/ole">
             <mc:AlternateContent xmlns:mc="http://schemas.openxmlformats.org/markup-compatibility/2006">
               <mc:Choice xmlns:v="urn:schemas-microsoft-com:vml" Requires="v">
-                <p:oleObj spid="_x0000_s1076" name="Equation" r:id="rId4" imgW="1384300" imgH="228600" progId="Equation.3">
+                <p:oleObj spid="_x0000_s1124" name="Equation" r:id="rId4" imgW="1384300" imgH="228600" progId="Equation.3">
                   <p:embed/>
                 </p:oleObj>
               </mc:Choice>
@@ -9653,7 +11360,7 @@
           <a:graphicData uri="http://schemas.openxmlformats.org/presentationml/2006/ole">
             <mc:AlternateContent xmlns:mc="http://schemas.openxmlformats.org/markup-compatibility/2006">
               <mc:Choice xmlns:v="urn:schemas-microsoft-com:vml" Requires="v">
-                <p:oleObj spid="_x0000_s1077" name="Equation" r:id="rId6" imgW="1155700" imgH="406400" progId="Equation.3">
+                <p:oleObj spid="_x0000_s1125" name="Equation" r:id="rId6" imgW="1155700" imgH="406400" progId="Equation.3">
                   <p:embed/>
                 </p:oleObj>
               </mc:Choice>
@@ -9710,7 +11417,7 @@
           <a:graphicData uri="http://schemas.openxmlformats.org/presentationml/2006/ole">
             <mc:AlternateContent xmlns:mc="http://schemas.openxmlformats.org/markup-compatibility/2006">
               <mc:Choice xmlns:v="urn:schemas-microsoft-com:vml" Requires="v">
-                <p:oleObj spid="_x0000_s1078" name="Equation" r:id="rId8" imgW="1485900" imgH="482600" progId="Equation.3">
+                <p:oleObj spid="_x0000_s1126" name="Equation" r:id="rId8" imgW="1485900" imgH="482600" progId="Equation.3">
                   <p:embed/>
                 </p:oleObj>
               </mc:Choice>
@@ -9767,7 +11474,7 @@
           <a:graphicData uri="http://schemas.openxmlformats.org/presentationml/2006/ole">
             <mc:AlternateContent xmlns:mc="http://schemas.openxmlformats.org/markup-compatibility/2006">
               <mc:Choice xmlns:v="urn:schemas-microsoft-com:vml" Requires="v">
-                <p:oleObj spid="_x0000_s1079" name="Equation" r:id="rId10" imgW="825500" imgH="215900" progId="Equation.3">
+                <p:oleObj spid="_x0000_s1127" name="Equation" r:id="rId10" imgW="825500" imgH="215900" progId="Equation.3">
                   <p:embed/>
                 </p:oleObj>
               </mc:Choice>

</xml_diff>

<commit_message>
Finish X factor slides.
</commit_message>
<xml_diff>
--- a/Defense.pptx
+++ b/Defense.pptx
@@ -5,7 +5,7 @@
     <p:sldMasterId id="2147483829" r:id="rId1"/>
   </p:sldMasterIdLst>
   <p:notesMasterIdLst>
-    <p:notesMasterId r:id="rId22"/>
+    <p:notesMasterId r:id="rId26"/>
   </p:notesMasterIdLst>
   <p:sldIdLst>
     <p:sldId id="256" r:id="rId2"/>
@@ -28,6 +28,10 @@
     <p:sldId id="274" r:id="rId19"/>
     <p:sldId id="275" r:id="rId20"/>
     <p:sldId id="276" r:id="rId21"/>
+    <p:sldId id="277" r:id="rId22"/>
+    <p:sldId id="278" r:id="rId23"/>
+    <p:sldId id="279" r:id="rId24"/>
+    <p:sldId id="280" r:id="rId25"/>
   </p:sldIdLst>
   <p:sldSz cx="9144000" cy="6858000" type="screen4x3"/>
   <p:notesSz cx="7010400" cy="9296400"/>
@@ -7043,7 +7047,7 @@
           <a:graphicData uri="http://schemas.openxmlformats.org/presentationml/2006/ole">
             <mc:AlternateContent xmlns:mc="http://schemas.openxmlformats.org/markup-compatibility/2006">
               <mc:Choice xmlns:v="urn:schemas-microsoft-com:vml" Requires="v">
-                <p:oleObj spid="_x0000_s3123" name="Equation" r:id="rId3" imgW="558800" imgH="241300" progId="Equation.3">
+                <p:oleObj spid="_x0000_s3147" name="Equation" r:id="rId3" imgW="558800" imgH="241300" progId="Equation.3">
                   <p:embed/>
                 </p:oleObj>
               </mc:Choice>
@@ -7100,7 +7104,7 @@
           <a:graphicData uri="http://schemas.openxmlformats.org/presentationml/2006/ole">
             <mc:AlternateContent xmlns:mc="http://schemas.openxmlformats.org/markup-compatibility/2006">
               <mc:Choice xmlns:v="urn:schemas-microsoft-com:vml" Requires="v">
-                <p:oleObj spid="_x0000_s3124" name="Equation" r:id="rId5" imgW="990600" imgH="228600" progId="Equation.3">
+                <p:oleObj spid="_x0000_s3148" name="Equation" r:id="rId5" imgW="990600" imgH="228600" progId="Equation.3">
                   <p:embed/>
                 </p:oleObj>
               </mc:Choice>
@@ -7187,7 +7191,7 @@
           <a:graphicData uri="http://schemas.openxmlformats.org/presentationml/2006/ole">
             <mc:AlternateContent xmlns:mc="http://schemas.openxmlformats.org/markup-compatibility/2006">
               <mc:Choice xmlns:v="urn:schemas-microsoft-com:vml" Requires="v">
-                <p:oleObj spid="_x0000_s3125" name="Equation" r:id="rId7" imgW="1447800" imgH="254000" progId="Equation.3">
+                <p:oleObj spid="_x0000_s3149" name="Equation" r:id="rId7" imgW="1447800" imgH="254000" progId="Equation.3">
                   <p:embed/>
                 </p:oleObj>
               </mc:Choice>
@@ -7555,7 +7559,7 @@
           <a:graphicData uri="http://schemas.openxmlformats.org/presentationml/2006/ole">
             <mc:AlternateContent xmlns:mc="http://schemas.openxmlformats.org/markup-compatibility/2006">
               <mc:Choice xmlns:v="urn:schemas-microsoft-com:vml" Requires="v">
-                <p:oleObj spid="_x0000_s4125" name="Equation" r:id="rId3" imgW="889000" imgH="533400" progId="Equation.3">
+                <p:oleObj spid="_x0000_s4143" name="Equation" r:id="rId3" imgW="889000" imgH="533400" progId="Equation.3">
                   <p:embed/>
                 </p:oleObj>
               </mc:Choice>
@@ -7612,7 +7616,7 @@
           <a:graphicData uri="http://schemas.openxmlformats.org/presentationml/2006/ole">
             <mc:AlternateContent xmlns:mc="http://schemas.openxmlformats.org/markup-compatibility/2006">
               <mc:Choice xmlns:v="urn:schemas-microsoft-com:vml" Requires="v">
-                <p:oleObj spid="_x0000_s4126" name="Equation" r:id="rId5" imgW="2247900" imgH="444500" progId="Equation.3">
+                <p:oleObj spid="_x0000_s4144" name="Equation" r:id="rId5" imgW="2247900" imgH="444500" progId="Equation.3">
                   <p:embed/>
                 </p:oleObj>
               </mc:Choice>
@@ -7836,7 +7840,7 @@
           <a:graphicData uri="http://schemas.openxmlformats.org/presentationml/2006/ole">
             <mc:AlternateContent xmlns:mc="http://schemas.openxmlformats.org/markup-compatibility/2006">
               <mc:Choice xmlns:v="urn:schemas-microsoft-com:vml" Requires="v">
-                <p:oleObj spid="_x0000_s5132" name="Equation" r:id="rId3" imgW="1828800" imgH="254000" progId="Equation.3">
+                <p:oleObj spid="_x0000_s5140" name="Equation" r:id="rId3" imgW="1828800" imgH="254000" progId="Equation.3">
                   <p:embed/>
                 </p:oleObj>
               </mc:Choice>
@@ -8052,7 +8056,7 @@
           <a:graphicData uri="http://schemas.openxmlformats.org/presentationml/2006/ole">
             <mc:AlternateContent xmlns:mc="http://schemas.openxmlformats.org/markup-compatibility/2006">
               <mc:Choice xmlns:v="urn:schemas-microsoft-com:vml" Requires="v">
-                <p:oleObj spid="_x0000_s6163" name="Equation" r:id="rId3" imgW="419100" imgH="165100" progId="Equation.3">
+                <p:oleObj spid="_x0000_s6179" name="Equation" r:id="rId3" imgW="419100" imgH="165100" progId="Equation.3">
                   <p:embed/>
                 </p:oleObj>
               </mc:Choice>
@@ -8109,7 +8113,7 @@
           <a:graphicData uri="http://schemas.openxmlformats.org/presentationml/2006/ole">
             <mc:AlternateContent xmlns:mc="http://schemas.openxmlformats.org/markup-compatibility/2006">
               <mc:Choice xmlns:v="urn:schemas-microsoft-com:vml" Requires="v">
-                <p:oleObj spid="_x0000_s6164" name="Equation" r:id="rId5" imgW="177800" imgH="215900" progId="Equation.3">
+                <p:oleObj spid="_x0000_s6180" name="Equation" r:id="rId5" imgW="177800" imgH="215900" progId="Equation.3">
                   <p:embed/>
                 </p:oleObj>
               </mc:Choice>
@@ -8286,7 +8290,7 @@
           <a:graphicData uri="http://schemas.openxmlformats.org/presentationml/2006/ole">
             <mc:AlternateContent xmlns:mc="http://schemas.openxmlformats.org/markup-compatibility/2006">
               <mc:Choice xmlns:v="urn:schemas-microsoft-com:vml" Requires="v">
-                <p:oleObj spid="_x0000_s7176" name="Equation" r:id="rId5" imgW="2578100" imgH="533400" progId="Equation.3">
+                <p:oleObj spid="_x0000_s7184" name="Equation" r:id="rId5" imgW="2578100" imgH="533400" progId="Equation.3">
                   <p:embed/>
                 </p:oleObj>
               </mc:Choice>
@@ -8434,8 +8438,8 @@
         </p:blipFill>
         <p:spPr bwMode="auto">
           <a:xfrm>
-            <a:off x="426128" y="1987993"/>
-            <a:ext cx="4943356" cy="4138235"/>
+            <a:off x="426128" y="2318527"/>
+            <a:ext cx="4671513" cy="3910667"/>
           </a:xfrm>
           <a:prstGeom prst="rect">
             <a:avLst/>
@@ -8487,7 +8491,7 @@
           <a:graphicData uri="http://schemas.openxmlformats.org/presentationml/2006/ole">
             <mc:AlternateContent xmlns:mc="http://schemas.openxmlformats.org/markup-compatibility/2006">
               <mc:Choice xmlns:v="urn:schemas-microsoft-com:vml" Requires="v">
-                <p:oleObj spid="_x0000_s8198" name="Equation" r:id="rId5" imgW="876300" imgH="228600" progId="Equation.3">
+                <p:oleObj spid="_x0000_s8207" name="Equation" r:id="rId5" imgW="876300" imgH="228600" progId="Equation.3">
                   <p:embed/>
                 </p:oleObj>
               </mc:Choice>
@@ -8590,6 +8594,44 @@
           </a:p>
         </p:txBody>
       </p:sp>
+      <p:sp>
+        <p:nvSpPr>
+          <p:cNvPr id="8" name="TextBox 7"/>
+          <p:cNvSpPr txBox="1"/>
+          <p:nvPr/>
+        </p:nvSpPr>
+        <p:spPr>
+          <a:xfrm>
+            <a:off x="1390266" y="1733270"/>
+            <a:ext cx="5303605" cy="369332"/>
+          </a:xfrm>
+          <a:prstGeom prst="rect">
+            <a:avLst/>
+          </a:prstGeom>
+          <a:noFill/>
+        </p:spPr>
+        <p:txBody>
+          <a:bodyPr wrap="square" rtlCol="0">
+            <a:spAutoFit/>
+          </a:bodyPr>
+          <a:lstStyle/>
+          <a:p>
+            <a:r>
+              <a:rPr lang="en-US" dirty="0" smtClean="0"/>
+              <a:t>A </a:t>
+            </a:r>
+            <a:r>
+              <a:rPr lang="en-US" dirty="0" err="1" smtClean="0"/>
+              <a:t>spindown</a:t>
+            </a:r>
+            <a:r>
+              <a:rPr lang="en-US" dirty="0" smtClean="0"/>
+              <a:t> curve at room temperature</a:t>
+            </a:r>
+            <a:endParaRPr lang="en-US" dirty="0"/>
+          </a:p>
+        </p:txBody>
+      </p:sp>
     </p:spTree>
     <p:extLst>
       <p:ext uri="{BB962C8B-B14F-4D97-AF65-F5344CB8AC3E}">
@@ -8740,7 +8782,7 @@
           <a:graphicData uri="http://schemas.openxmlformats.org/presentationml/2006/ole">
             <mc:AlternateContent xmlns:mc="http://schemas.openxmlformats.org/markup-compatibility/2006">
               <mc:Choice xmlns:v="urn:schemas-microsoft-com:vml" Requires="v">
-                <p:oleObj spid="_x0000_s9231" name="Equation" r:id="rId4" imgW="114300" imgH="165100" progId="Equation.3">
+                <p:oleObj spid="_x0000_s9255" name="Equation" r:id="rId4" imgW="114300" imgH="165100" progId="Equation.3">
                   <p:embed/>
                 </p:oleObj>
               </mc:Choice>
@@ -8797,7 +8839,7 @@
           <a:graphicData uri="http://schemas.openxmlformats.org/presentationml/2006/ole">
             <mc:AlternateContent xmlns:mc="http://schemas.openxmlformats.org/markup-compatibility/2006">
               <mc:Choice xmlns:v="urn:schemas-microsoft-com:vml" Requires="v">
-                <p:oleObj spid="_x0000_s9232" name="Equation" r:id="rId6" imgW="2387600" imgH="660400" progId="Equation.3">
+                <p:oleObj spid="_x0000_s9256" name="Equation" r:id="rId6" imgW="2387600" imgH="660400" progId="Equation.3">
                   <p:embed/>
                 </p:oleObj>
               </mc:Choice>
@@ -8854,7 +8896,7 @@
           <a:graphicData uri="http://schemas.openxmlformats.org/presentationml/2006/ole">
             <mc:AlternateContent xmlns:mc="http://schemas.openxmlformats.org/markup-compatibility/2006">
               <mc:Choice xmlns:v="urn:schemas-microsoft-com:vml" Requires="v">
-                <p:oleObj spid="_x0000_s9233" name="Equation" r:id="rId8" imgW="1143000" imgH="393700" progId="Equation.3">
+                <p:oleObj spid="_x0000_s9257" name="Equation" r:id="rId8" imgW="1143000" imgH="393700" progId="Equation.3">
                   <p:embed/>
                 </p:oleObj>
               </mc:Choice>
@@ -9035,7 +9077,7 @@
           <a:graphicData uri="http://schemas.openxmlformats.org/presentationml/2006/ole">
             <mc:AlternateContent xmlns:mc="http://schemas.openxmlformats.org/markup-compatibility/2006">
               <mc:Choice xmlns:v="urn:schemas-microsoft-com:vml" Requires="v">
-                <p:oleObj spid="_x0000_s10243" name="Equation" r:id="rId3" imgW="1943100" imgH="241300" progId="Equation.3">
+                <p:oleObj spid="_x0000_s10252" name="Equation" r:id="rId3" imgW="1943100" imgH="241300" progId="Equation.3">
                   <p:embed/>
                 </p:oleObj>
               </mc:Choice>
@@ -9273,12 +9315,22 @@
         </p:nvSpPr>
         <p:spPr/>
         <p:txBody>
-          <a:bodyPr/>
+          <a:bodyPr>
+            <a:normAutofit fontScale="90000"/>
+          </a:bodyPr>
           <a:lstStyle/>
           <a:p>
             <a:r>
               <a:rPr lang="en-US" dirty="0" smtClean="0"/>
-              <a:t>The x factor</a:t>
+              <a:t>Maximum achievable </a:t>
+            </a:r>
+            <a:r>
+              <a:rPr lang="en-US" baseline="30000" dirty="0" smtClean="0"/>
+              <a:t>3</a:t>
+            </a:r>
+            <a:r>
+              <a:rPr lang="en-US" dirty="0" smtClean="0"/>
+              <a:t>He polarization</a:t>
             </a:r>
             <a:endParaRPr lang="en-US" dirty="0"/>
           </a:p>
@@ -9296,10 +9348,113 @@
         </p:nvSpPr>
         <p:spPr/>
         <p:txBody>
-          <a:bodyPr/>
-          <a:lstStyle/>
-          <a:p>
-            <a:endParaRPr lang="en-US"/>
+          <a:bodyPr>
+            <a:normAutofit lnSpcReduction="10000"/>
+          </a:bodyPr>
+          <a:lstStyle/>
+          <a:p>
+            <a:r>
+              <a:rPr lang="en-US" sz="2000" dirty="0" smtClean="0"/>
+              <a:t>The so-called X factor characterizes a poorly understood temperature-dependent spin-relaxation mechanism that limits the maximum polarization</a:t>
+            </a:r>
+          </a:p>
+          <a:p>
+            <a:endParaRPr lang="en-US" sz="2000" dirty="0"/>
+          </a:p>
+          <a:p>
+            <a:endParaRPr lang="en-US" sz="2000" dirty="0" smtClean="0"/>
+          </a:p>
+          <a:p>
+            <a:endParaRPr lang="en-US" sz="2000" dirty="0"/>
+          </a:p>
+          <a:p>
+            <a:endParaRPr lang="en-US" sz="2000" dirty="0" smtClean="0"/>
+          </a:p>
+          <a:p>
+            <a:endParaRPr lang="en-US" sz="2000" dirty="0"/>
+          </a:p>
+          <a:p>
+            <a:endParaRPr lang="en-US" sz="2000" dirty="0" smtClean="0"/>
+          </a:p>
+          <a:p>
+            <a:endParaRPr lang="en-US" sz="2000" dirty="0"/>
+          </a:p>
+          <a:p>
+            <a:r>
+              <a:rPr lang="en-US" sz="2000" dirty="0" smtClean="0"/>
+              <a:t>The relaxation mechanism described by the X factor has been observed to be roughly proportional to the spin-exchange rate, so it cannot be overwhelmed with infinite laser power.</a:t>
+            </a:r>
+            <a:endParaRPr lang="en-US" sz="2000" dirty="0"/>
+          </a:p>
+        </p:txBody>
+      </p:sp>
+      <p:pic>
+        <p:nvPicPr>
+          <p:cNvPr id="4" name="Picture 3"/>
+          <p:cNvPicPr>
+            <a:picLocks noChangeAspect="1"/>
+          </p:cNvPicPr>
+          <p:nvPr/>
+        </p:nvPicPr>
+        <p:blipFill>
+          <a:blip r:embed="rId2"/>
+          <a:stretch>
+            <a:fillRect/>
+          </a:stretch>
+        </p:blipFill>
+        <p:spPr>
+          <a:xfrm>
+            <a:off x="909680" y="4152729"/>
+            <a:ext cx="6693871" cy="820895"/>
+          </a:xfrm>
+          <a:prstGeom prst="rect">
+            <a:avLst/>
+          </a:prstGeom>
+        </p:spPr>
+      </p:pic>
+      <p:sp>
+        <p:nvSpPr>
+          <p:cNvPr id="5" name="TextBox 4"/>
+          <p:cNvSpPr txBox="1"/>
+          <p:nvPr/>
+        </p:nvSpPr>
+        <p:spPr>
+          <a:xfrm>
+            <a:off x="909680" y="3157640"/>
+            <a:ext cx="5355098" cy="646331"/>
+          </a:xfrm>
+          <a:prstGeom prst="rect">
+            <a:avLst/>
+          </a:prstGeom>
+          <a:noFill/>
+        </p:spPr>
+        <p:txBody>
+          <a:bodyPr wrap="square" rtlCol="0">
+            <a:spAutoFit/>
+          </a:bodyPr>
+          <a:lstStyle/>
+          <a:p>
+            <a:pPr algn="ctr"/>
+            <a:r>
+              <a:rPr lang="en-US" dirty="0" smtClean="0"/>
+              <a:t>Babcock, </a:t>
+            </a:r>
+            <a:r>
+              <a:rPr lang="en-US" dirty="0" err="1" smtClean="0"/>
+              <a:t>Chann</a:t>
+            </a:r>
+            <a:r>
+              <a:rPr lang="en-US" dirty="0" smtClean="0"/>
+              <a:t>, Walker, Chen and Gentile</a:t>
+            </a:r>
+          </a:p>
+          <a:p>
+            <a:pPr algn="ctr"/>
+            <a:r>
+              <a:rPr lang="en-US" dirty="0" smtClean="0"/>
+              <a:t>PRL vol. 96, pg. 083003 (2006) </a:t>
+            </a:r>
+            <a:endParaRPr lang="en-US" dirty="0"/>
           </a:p>
         </p:txBody>
       </p:sp>
@@ -9307,6 +9462,971 @@
     <p:extLst>
       <p:ext uri="{BB962C8B-B14F-4D97-AF65-F5344CB8AC3E}">
         <p14:creationId xmlns:p14="http://schemas.microsoft.com/office/powerpoint/2010/main" val="244184032"/>
+      </p:ext>
+    </p:extLst>
+  </p:cSld>
+  <p:clrMapOvr>
+    <a:masterClrMapping/>
+  </p:clrMapOvr>
+</p:sld>
+</file>
+
+<file path=ppt/slides/slide21.xml><?xml version="1.0" encoding="utf-8"?>
+<p:sld xmlns:a="http://schemas.openxmlformats.org/drawingml/2006/main" xmlns:r="http://schemas.openxmlformats.org/officeDocument/2006/relationships" xmlns:p="http://schemas.openxmlformats.org/presentationml/2006/main">
+  <p:cSld>
+    <p:spTree>
+      <p:nvGrpSpPr>
+        <p:cNvPr id="1" name=""/>
+        <p:cNvGrpSpPr/>
+        <p:nvPr/>
+      </p:nvGrpSpPr>
+      <p:grpSpPr>
+        <a:xfrm>
+          <a:off x="0" y="0"/>
+          <a:ext cx="0" cy="0"/>
+          <a:chOff x="0" y="0"/>
+          <a:chExt cx="0" cy="0"/>
+        </a:xfrm>
+      </p:grpSpPr>
+      <p:sp>
+        <p:nvSpPr>
+          <p:cNvPr id="2" name="Title 1"/>
+          <p:cNvSpPr>
+            <a:spLocks noGrp="1"/>
+          </p:cNvSpPr>
+          <p:nvPr>
+            <p:ph type="title"/>
+          </p:nvPr>
+        </p:nvSpPr>
+        <p:spPr/>
+        <p:txBody>
+          <a:bodyPr>
+            <a:normAutofit fontScale="90000"/>
+          </a:bodyPr>
+          <a:lstStyle/>
+          <a:p>
+            <a:r>
+              <a:rPr lang="en-US" dirty="0" smtClean="0"/>
+              <a:t>The x factor</a:t>
+            </a:r>
+            <a:br>
+              <a:rPr lang="en-US" dirty="0" smtClean="0"/>
+            </a:br>
+            <a:r>
+              <a:rPr lang="en-US" dirty="0" smtClean="0"/>
+              <a:t>hot relaxation method</a:t>
+            </a:r>
+            <a:endParaRPr lang="en-US" dirty="0"/>
+          </a:p>
+        </p:txBody>
+      </p:sp>
+      <p:sp>
+        <p:nvSpPr>
+          <p:cNvPr id="3" name="Content Placeholder 2"/>
+          <p:cNvSpPr>
+            <a:spLocks noGrp="1"/>
+          </p:cNvSpPr>
+          <p:nvPr>
+            <p:ph idx="1"/>
+          </p:nvPr>
+        </p:nvSpPr>
+        <p:spPr/>
+        <p:txBody>
+          <a:bodyPr/>
+          <a:lstStyle/>
+          <a:p>
+            <a:r>
+              <a:rPr lang="en-US" sz="1800" dirty="0" smtClean="0"/>
+              <a:t>“The hot relaxation method” is a method of measuring the X factor by looking at spin-relaxation rates at different temperatures [1].</a:t>
+            </a:r>
+          </a:p>
+          <a:p>
+            <a:endParaRPr lang="en-US" dirty="0"/>
+          </a:p>
+        </p:txBody>
+      </p:sp>
+      <p:sp>
+        <p:nvSpPr>
+          <p:cNvPr id="4" name="Text Box 4"/>
+          <p:cNvSpPr txBox="1">
+            <a:spLocks noChangeArrowheads="1"/>
+          </p:cNvSpPr>
+          <p:nvPr/>
+        </p:nvSpPr>
+        <p:spPr bwMode="auto">
+          <a:xfrm>
+            <a:off x="457200" y="6126163"/>
+            <a:ext cx="8260672" cy="523220"/>
+          </a:xfrm>
+          <a:prstGeom prst="rect">
+            <a:avLst/>
+          </a:prstGeom>
+          <a:noFill/>
+          <a:ln>
+            <a:noFill/>
+          </a:ln>
+          <a:effectLst/>
+          <a:extLst>
+            <a:ext uri="{909E8E84-426E-40dd-AFC4-6F175D3DCCD1}">
+              <a14:hiddenFill xmlns:a14="http://schemas.microsoft.com/office/drawing/2010/main">
+                <a:solidFill>
+                  <a:schemeClr val="accent1"/>
+                </a:solidFill>
+              </a14:hiddenFill>
+            </a:ext>
+            <a:ext uri="{91240B29-F687-4f45-9708-019B960494DF}">
+              <a14:hiddenLine xmlns:a14="http://schemas.microsoft.com/office/drawing/2010/main" w="9525">
+                <a:solidFill>
+                  <a:schemeClr val="tx1"/>
+                </a:solidFill>
+                <a:miter lim="800000"/>
+                <a:headEnd/>
+                <a:tailEnd/>
+              </a14:hiddenLine>
+            </a:ext>
+            <a:ext uri="{AF507438-7753-43e0-B8FC-AC1667EBCBE1}">
+              <a14:hiddenEffects xmlns:a14="http://schemas.microsoft.com/office/drawing/2010/main">
+                <a:effectLst>
+                  <a:outerShdw blurRad="63500" dist="38099" dir="2700000" algn="ctr" rotWithShape="0">
+                    <a:schemeClr val="bg2">
+                      <a:alpha val="74998"/>
+                    </a:schemeClr>
+                  </a:outerShdw>
+                </a:effectLst>
+              </a14:hiddenEffects>
+            </a:ext>
+          </a:extLst>
+        </p:spPr>
+        <p:txBody>
+          <a:bodyPr wrap="square">
+            <a:spAutoFit/>
+          </a:bodyPr>
+          <a:lstStyle/>
+          <a:p>
+            <a:r>
+              <a:rPr lang="en-US" altLang="zh-CN" sz="1400" dirty="0"/>
+              <a:t>[1]E. Babcock, B. </a:t>
+            </a:r>
+            <a:r>
+              <a:rPr lang="en-US" altLang="zh-CN" sz="1400" dirty="0" err="1"/>
+              <a:t>Chann</a:t>
+            </a:r>
+            <a:r>
+              <a:rPr lang="en-US" altLang="zh-CN" sz="1400" dirty="0"/>
+              <a:t>, T. G. Walker, W. C. Chen, and T. R. Gentile, Phys. Rev. </a:t>
+            </a:r>
+            <a:r>
+              <a:rPr lang="en-US" altLang="zh-CN" sz="1400" dirty="0" err="1"/>
+              <a:t>Lett</a:t>
+            </a:r>
+            <a:r>
+              <a:rPr lang="en-US" altLang="zh-CN" sz="1400" dirty="0"/>
+              <a:t>. 96, 083003 (2006).</a:t>
+            </a:r>
+          </a:p>
+        </p:txBody>
+      </p:sp>
+      <p:pic>
+        <p:nvPicPr>
+          <p:cNvPr id="5" name="Picture 4"/>
+          <p:cNvPicPr>
+            <a:picLocks noChangeAspect="1"/>
+          </p:cNvPicPr>
+          <p:nvPr/>
+        </p:nvPicPr>
+        <p:blipFill>
+          <a:blip r:embed="rId2"/>
+          <a:stretch>
+            <a:fillRect/>
+          </a:stretch>
+        </p:blipFill>
+        <p:spPr>
+          <a:xfrm>
+            <a:off x="4902401" y="3422513"/>
+            <a:ext cx="2838461" cy="770235"/>
+          </a:xfrm>
+          <a:prstGeom prst="rect">
+            <a:avLst/>
+          </a:prstGeom>
+        </p:spPr>
+      </p:pic>
+      <p:sp>
+        <p:nvSpPr>
+          <p:cNvPr id="6" name="Donut 5"/>
+          <p:cNvSpPr/>
+          <p:nvPr/>
+        </p:nvSpPr>
+        <p:spPr>
+          <a:xfrm>
+            <a:off x="5749863" y="3233858"/>
+            <a:ext cx="1990999" cy="617799"/>
+          </a:xfrm>
+          <a:prstGeom prst="donut">
+            <a:avLst>
+              <a:gd name="adj" fmla="val 6819"/>
+            </a:avLst>
+          </a:prstGeom>
+          <a:ln/>
+        </p:spPr>
+        <p:style>
+          <a:lnRef idx="1">
+            <a:schemeClr val="dk1"/>
+          </a:lnRef>
+          <a:fillRef idx="3">
+            <a:schemeClr val="dk1"/>
+          </a:fillRef>
+          <a:effectRef idx="2">
+            <a:schemeClr val="dk1"/>
+          </a:effectRef>
+          <a:fontRef idx="minor">
+            <a:schemeClr val="lt1"/>
+          </a:fontRef>
+        </p:style>
+        <p:txBody>
+          <a:bodyPr rtlCol="0" anchor="ctr"/>
+          <a:lstStyle/>
+          <a:p>
+            <a:pPr algn="ctr"/>
+            <a:endParaRPr lang="en-US">
+              <a:ln w="6350" cmpd="sng">
+                <a:solidFill>
+                  <a:schemeClr val="tx1"/>
+                </a:solidFill>
+              </a:ln>
+              <a:solidFill>
+                <a:schemeClr val="tx1"/>
+              </a:solidFill>
+            </a:endParaRPr>
+          </a:p>
+        </p:txBody>
+      </p:sp>
+      <p:cxnSp>
+        <p:nvCxnSpPr>
+          <p:cNvPr id="8" name="Straight Arrow Connector 7"/>
+          <p:cNvCxnSpPr/>
+          <p:nvPr/>
+        </p:nvCxnSpPr>
+        <p:spPr>
+          <a:xfrm>
+            <a:off x="5200623" y="3003190"/>
+            <a:ext cx="616178" cy="230668"/>
+          </a:xfrm>
+          <a:prstGeom prst="straightConnector1">
+            <a:avLst/>
+          </a:prstGeom>
+          <a:ln>
+            <a:tailEnd type="arrow"/>
+          </a:ln>
+        </p:spPr>
+        <p:style>
+          <a:lnRef idx="2">
+            <a:schemeClr val="dk1"/>
+          </a:lnRef>
+          <a:fillRef idx="0">
+            <a:schemeClr val="dk1"/>
+          </a:fillRef>
+          <a:effectRef idx="1">
+            <a:schemeClr val="dk1"/>
+          </a:effectRef>
+          <a:fontRef idx="minor">
+            <a:schemeClr val="tx1"/>
+          </a:fontRef>
+        </p:style>
+      </p:cxnSp>
+      <p:sp>
+        <p:nvSpPr>
+          <p:cNvPr id="11" name="TextBox 10"/>
+          <p:cNvSpPr txBox="1"/>
+          <p:nvPr/>
+        </p:nvSpPr>
+        <p:spPr>
+          <a:xfrm>
+            <a:off x="4462580" y="2436875"/>
+            <a:ext cx="4224219" cy="584776"/>
+          </a:xfrm>
+          <a:prstGeom prst="rect">
+            <a:avLst/>
+          </a:prstGeom>
+          <a:noFill/>
+        </p:spPr>
+        <p:txBody>
+          <a:bodyPr wrap="square" rtlCol="0">
+            <a:spAutoFit/>
+          </a:bodyPr>
+          <a:lstStyle/>
+          <a:p>
+            <a:r>
+              <a:rPr lang="en-US" sz="1600" dirty="0" smtClean="0"/>
+              <a:t>Measured with </a:t>
+            </a:r>
+            <a:r>
+              <a:rPr lang="en-US" sz="1600" dirty="0" err="1" smtClean="0"/>
+              <a:t>spinups</a:t>
+            </a:r>
+            <a:r>
+              <a:rPr lang="en-US" sz="1600" dirty="0" smtClean="0"/>
+              <a:t> and cold </a:t>
+            </a:r>
+            <a:r>
+              <a:rPr lang="en-US" sz="1600" dirty="0" err="1" smtClean="0"/>
+              <a:t>spindowns</a:t>
+            </a:r>
+            <a:r>
+              <a:rPr lang="en-US" sz="1600" dirty="0" smtClean="0"/>
+              <a:t>.</a:t>
+            </a:r>
+            <a:endParaRPr lang="en-US" sz="1600" dirty="0"/>
+          </a:p>
+        </p:txBody>
+      </p:sp>
+      <p:sp>
+        <p:nvSpPr>
+          <p:cNvPr id="12" name="Donut 11"/>
+          <p:cNvSpPr/>
+          <p:nvPr/>
+        </p:nvSpPr>
+        <p:spPr>
+          <a:xfrm>
+            <a:off x="4771528" y="3508318"/>
+            <a:ext cx="978335" cy="617799"/>
+          </a:xfrm>
+          <a:prstGeom prst="donut">
+            <a:avLst>
+              <a:gd name="adj" fmla="val 6819"/>
+            </a:avLst>
+          </a:prstGeom>
+          <a:ln/>
+        </p:spPr>
+        <p:style>
+          <a:lnRef idx="1">
+            <a:schemeClr val="dk1"/>
+          </a:lnRef>
+          <a:fillRef idx="3">
+            <a:schemeClr val="dk1"/>
+          </a:fillRef>
+          <a:effectRef idx="2">
+            <a:schemeClr val="dk1"/>
+          </a:effectRef>
+          <a:fontRef idx="minor">
+            <a:schemeClr val="lt1"/>
+          </a:fontRef>
+        </p:style>
+        <p:txBody>
+          <a:bodyPr rtlCol="0" anchor="ctr"/>
+          <a:lstStyle/>
+          <a:p>
+            <a:pPr algn="ctr"/>
+            <a:endParaRPr lang="en-US">
+              <a:ln w="6350" cmpd="sng">
+                <a:solidFill>
+                  <a:schemeClr val="tx1"/>
+                </a:solidFill>
+              </a:ln>
+              <a:solidFill>
+                <a:schemeClr val="tx1"/>
+              </a:solidFill>
+            </a:endParaRPr>
+          </a:p>
+        </p:txBody>
+      </p:sp>
+      <p:cxnSp>
+        <p:nvCxnSpPr>
+          <p:cNvPr id="14" name="Straight Arrow Connector 13"/>
+          <p:cNvCxnSpPr/>
+          <p:nvPr/>
+        </p:nvCxnSpPr>
+        <p:spPr>
+          <a:xfrm flipV="1">
+            <a:off x="4902401" y="4192748"/>
+            <a:ext cx="298222" cy="440746"/>
+          </a:xfrm>
+          <a:prstGeom prst="straightConnector1">
+            <a:avLst/>
+          </a:prstGeom>
+          <a:ln>
+            <a:tailEnd type="arrow"/>
+          </a:ln>
+        </p:spPr>
+        <p:style>
+          <a:lnRef idx="2">
+            <a:schemeClr val="dk1"/>
+          </a:lnRef>
+          <a:fillRef idx="0">
+            <a:schemeClr val="dk1"/>
+          </a:fillRef>
+          <a:effectRef idx="1">
+            <a:schemeClr val="dk1"/>
+          </a:effectRef>
+          <a:fontRef idx="minor">
+            <a:schemeClr val="tx1"/>
+          </a:fontRef>
+        </p:style>
+      </p:cxnSp>
+      <p:sp>
+        <p:nvSpPr>
+          <p:cNvPr id="15" name="TextBox 14"/>
+          <p:cNvSpPr txBox="1"/>
+          <p:nvPr/>
+        </p:nvSpPr>
+        <p:spPr>
+          <a:xfrm>
+            <a:off x="4327202" y="4633494"/>
+            <a:ext cx="4359597" cy="584776"/>
+          </a:xfrm>
+          <a:prstGeom prst="rect">
+            <a:avLst/>
+          </a:prstGeom>
+          <a:noFill/>
+        </p:spPr>
+        <p:txBody>
+          <a:bodyPr wrap="square" rtlCol="0">
+            <a:spAutoFit/>
+          </a:bodyPr>
+          <a:lstStyle/>
+          <a:p>
+            <a:r>
+              <a:rPr lang="en-US" sz="1600" dirty="0" smtClean="0"/>
+              <a:t>Determined with measured alkali densities and known spin-exchange coefficients</a:t>
+            </a:r>
+            <a:endParaRPr lang="en-US" sz="1600" dirty="0"/>
+          </a:p>
+        </p:txBody>
+      </p:sp>
+      <p:pic>
+        <p:nvPicPr>
+          <p:cNvPr id="16" name="Picture 15"/>
+          <p:cNvPicPr>
+            <a:picLocks noChangeAspect="1"/>
+          </p:cNvPicPr>
+          <p:nvPr/>
+        </p:nvPicPr>
+        <p:blipFill>
+          <a:blip r:embed="rId3"/>
+          <a:stretch>
+            <a:fillRect/>
+          </a:stretch>
+        </p:blipFill>
+        <p:spPr>
+          <a:xfrm>
+            <a:off x="4902401" y="5338397"/>
+            <a:ext cx="2656094" cy="463863"/>
+          </a:xfrm>
+          <a:prstGeom prst="rect">
+            <a:avLst/>
+          </a:prstGeom>
+        </p:spPr>
+      </p:pic>
+      <p:pic>
+        <p:nvPicPr>
+          <p:cNvPr id="17" name="Picture 16" descr="hotrelaxation.png"/>
+          <p:cNvPicPr>
+            <a:picLocks noChangeAspect="1"/>
+          </p:cNvPicPr>
+          <p:nvPr/>
+        </p:nvPicPr>
+        <p:blipFill>
+          <a:blip r:embed="rId4">
+            <a:extLst>
+              <a:ext uri="{28A0092B-C50C-407E-A947-70E740481C1C}">
+                <a14:useLocalDpi xmlns:a14="http://schemas.microsoft.com/office/drawing/2010/main" val="0"/>
+              </a:ext>
+            </a:extLst>
+          </a:blip>
+          <a:stretch>
+            <a:fillRect/>
+          </a:stretch>
+        </p:blipFill>
+        <p:spPr>
+          <a:xfrm>
+            <a:off x="1016312" y="2408117"/>
+            <a:ext cx="2948519" cy="3569261"/>
+          </a:xfrm>
+          <a:prstGeom prst="rect">
+            <a:avLst/>
+          </a:prstGeom>
+        </p:spPr>
+      </p:pic>
+    </p:spTree>
+    <p:extLst>
+      <p:ext uri="{BB962C8B-B14F-4D97-AF65-F5344CB8AC3E}">
+        <p14:creationId xmlns:p14="http://schemas.microsoft.com/office/powerpoint/2010/main" val="2543141694"/>
+      </p:ext>
+    </p:extLst>
+  </p:cSld>
+  <p:clrMapOvr>
+    <a:masterClrMapping/>
+  </p:clrMapOvr>
+</p:sld>
+</file>
+
+<file path=ppt/slides/slide22.xml><?xml version="1.0" encoding="utf-8"?>
+<p:sld xmlns:a="http://schemas.openxmlformats.org/drawingml/2006/main" xmlns:r="http://schemas.openxmlformats.org/officeDocument/2006/relationships" xmlns:p="http://schemas.openxmlformats.org/presentationml/2006/main">
+  <p:cSld>
+    <p:spTree>
+      <p:nvGrpSpPr>
+        <p:cNvPr id="1" name=""/>
+        <p:cNvGrpSpPr/>
+        <p:nvPr/>
+      </p:nvGrpSpPr>
+      <p:grpSpPr>
+        <a:xfrm>
+          <a:off x="0" y="0"/>
+          <a:ext cx="0" cy="0"/>
+          <a:chOff x="0" y="0"/>
+          <a:chExt cx="0" cy="0"/>
+        </a:xfrm>
+      </p:grpSpPr>
+      <p:sp>
+        <p:nvSpPr>
+          <p:cNvPr id="2" name="Title 1"/>
+          <p:cNvSpPr>
+            <a:spLocks noGrp="1"/>
+          </p:cNvSpPr>
+          <p:nvPr>
+            <p:ph type="title"/>
+          </p:nvPr>
+        </p:nvSpPr>
+        <p:spPr/>
+        <p:txBody>
+          <a:bodyPr>
+            <a:normAutofit fontScale="90000"/>
+          </a:bodyPr>
+          <a:lstStyle/>
+          <a:p>
+            <a:r>
+              <a:rPr lang="en-US" dirty="0" smtClean="0"/>
+              <a:t>The x factor</a:t>
+            </a:r>
+            <a:br>
+              <a:rPr lang="en-US" dirty="0" smtClean="0"/>
+            </a:br>
+            <a:r>
+              <a:rPr lang="en-US" dirty="0" smtClean="0"/>
+              <a:t>Single temperature methods</a:t>
+            </a:r>
+            <a:endParaRPr lang="en-US" dirty="0"/>
+          </a:p>
+        </p:txBody>
+      </p:sp>
+      <p:sp>
+        <p:nvSpPr>
+          <p:cNvPr id="3" name="Content Placeholder 2"/>
+          <p:cNvSpPr>
+            <a:spLocks noGrp="1"/>
+          </p:cNvSpPr>
+          <p:nvPr>
+            <p:ph idx="1"/>
+          </p:nvPr>
+        </p:nvSpPr>
+        <p:spPr/>
+        <p:txBody>
+          <a:bodyPr/>
+          <a:lstStyle/>
+          <a:p>
+            <a:r>
+              <a:rPr lang="en-US" dirty="0" smtClean="0"/>
+              <a:t>X factor can also be determined with data from a single temperature using various methods.</a:t>
+            </a:r>
+            <a:endParaRPr lang="en-US" dirty="0"/>
+          </a:p>
+        </p:txBody>
+      </p:sp>
+      <p:pic>
+        <p:nvPicPr>
+          <p:cNvPr id="4" name="Picture 3"/>
+          <p:cNvPicPr>
+            <a:picLocks noChangeAspect="1"/>
+          </p:cNvPicPr>
+          <p:nvPr/>
+        </p:nvPicPr>
+        <p:blipFill>
+          <a:blip r:embed="rId2"/>
+          <a:stretch>
+            <a:fillRect/>
+          </a:stretch>
+        </p:blipFill>
+        <p:spPr>
+          <a:xfrm>
+            <a:off x="1407428" y="2666857"/>
+            <a:ext cx="6367760" cy="3853670"/>
+          </a:xfrm>
+          <a:prstGeom prst="rect">
+            <a:avLst/>
+          </a:prstGeom>
+        </p:spPr>
+      </p:pic>
+    </p:spTree>
+    <p:extLst>
+      <p:ext uri="{BB962C8B-B14F-4D97-AF65-F5344CB8AC3E}">
+        <p14:creationId xmlns:p14="http://schemas.microsoft.com/office/powerpoint/2010/main" val="3921888394"/>
+      </p:ext>
+    </p:extLst>
+  </p:cSld>
+  <p:clrMapOvr>
+    <a:masterClrMapping/>
+  </p:clrMapOvr>
+</p:sld>
+</file>
+
+<file path=ppt/slides/slide23.xml><?xml version="1.0" encoding="utf-8"?>
+<p:sld xmlns:a="http://schemas.openxmlformats.org/drawingml/2006/main" xmlns:r="http://schemas.openxmlformats.org/officeDocument/2006/relationships" xmlns:p="http://schemas.openxmlformats.org/presentationml/2006/main">
+  <p:cSld>
+    <p:spTree>
+      <p:nvGrpSpPr>
+        <p:cNvPr id="1" name=""/>
+        <p:cNvGrpSpPr/>
+        <p:nvPr/>
+      </p:nvGrpSpPr>
+      <p:grpSpPr>
+        <a:xfrm>
+          <a:off x="0" y="0"/>
+          <a:ext cx="0" cy="0"/>
+          <a:chOff x="0" y="0"/>
+          <a:chExt cx="0" cy="0"/>
+        </a:xfrm>
+      </p:grpSpPr>
+      <p:sp>
+        <p:nvSpPr>
+          <p:cNvPr id="2" name="Title 1"/>
+          <p:cNvSpPr>
+            <a:spLocks noGrp="1"/>
+          </p:cNvSpPr>
+          <p:nvPr>
+            <p:ph type="title"/>
+          </p:nvPr>
+        </p:nvSpPr>
+        <p:spPr/>
+        <p:txBody>
+          <a:bodyPr/>
+          <a:lstStyle/>
+          <a:p>
+            <a:r>
+              <a:rPr lang="en-US" dirty="0" smtClean="0"/>
+              <a:t>Errors and weighted average</a:t>
+            </a:r>
+            <a:endParaRPr lang="en-US" dirty="0"/>
+          </a:p>
+        </p:txBody>
+      </p:sp>
+      <p:sp>
+        <p:nvSpPr>
+          <p:cNvPr id="3" name="Content Placeholder 2"/>
+          <p:cNvSpPr>
+            <a:spLocks noGrp="1"/>
+          </p:cNvSpPr>
+          <p:nvPr>
+            <p:ph idx="1"/>
+          </p:nvPr>
+        </p:nvSpPr>
+        <p:spPr/>
+        <p:txBody>
+          <a:bodyPr/>
+          <a:lstStyle/>
+          <a:p>
+            <a:r>
+              <a:rPr lang="en-US" dirty="0" smtClean="0"/>
+              <a:t>Error for each determination of X:</a:t>
+            </a:r>
+          </a:p>
+          <a:p>
+            <a:endParaRPr lang="en-US" dirty="0"/>
+          </a:p>
+          <a:p>
+            <a:endParaRPr lang="en-US" dirty="0" smtClean="0"/>
+          </a:p>
+          <a:p>
+            <a:r>
+              <a:rPr lang="en-US" dirty="0" smtClean="0"/>
+              <a:t>To combine different determinations of X, a weighted average was obtained for which the weights are varied until the combined error is minimized</a:t>
+            </a:r>
+            <a:endParaRPr lang="en-US" dirty="0"/>
+          </a:p>
+        </p:txBody>
+      </p:sp>
+      <p:graphicFrame>
+        <p:nvGraphicFramePr>
+          <p:cNvPr id="4" name="Object 6"/>
+          <p:cNvGraphicFramePr>
+            <a:graphicFrameLocks noChangeAspect="1"/>
+          </p:cNvGraphicFramePr>
+          <p:nvPr>
+            <p:extLst>
+              <p:ext uri="{D42A27DB-BD31-4B8C-83A1-F6EECF244321}">
+                <p14:modId xmlns:p14="http://schemas.microsoft.com/office/powerpoint/2010/main" val="370940264"/>
+              </p:ext>
+            </p:extLst>
+          </p:nvPr>
+        </p:nvGraphicFramePr>
+        <p:xfrm>
+          <a:off x="1066800" y="2243479"/>
+          <a:ext cx="1828800" cy="811213"/>
+        </p:xfrm>
+        <a:graphic>
+          <a:graphicData uri="http://schemas.openxmlformats.org/presentationml/2006/ole">
+            <mc:AlternateContent xmlns:mc="http://schemas.openxmlformats.org/markup-compatibility/2006">
+              <mc:Choice xmlns:v="urn:schemas-microsoft-com:vml" Requires="v">
+                <p:oleObj spid="_x0000_s12293" name="公式" r:id="rId3" imgW="1231560" imgH="545760" progId="Equation.3">
+                  <p:embed/>
+                </p:oleObj>
+              </mc:Choice>
+              <mc:Fallback>
+                <p:oleObj name="公式" r:id="rId3" imgW="1231560" imgH="545760" progId="Equation.3">
+                  <p:embed/>
+                  <p:pic>
+                    <p:nvPicPr>
+                      <p:cNvPr id="0" name=""/>
+                      <p:cNvPicPr>
+                        <a:picLocks noChangeAspect="1" noChangeArrowheads="1"/>
+                      </p:cNvPicPr>
+                      <p:nvPr/>
+                    </p:nvPicPr>
+                    <p:blipFill>
+                      <a:blip r:embed="rId4">
+                        <a:extLst>
+                          <a:ext uri="{28A0092B-C50C-407E-A947-70E740481C1C}">
+                            <a14:useLocalDpi xmlns:a14="http://schemas.microsoft.com/office/drawing/2010/main" val="0"/>
+                          </a:ext>
+                        </a:extLst>
+                      </a:blip>
+                      <a:srcRect/>
+                      <a:stretch>
+                        <a:fillRect/>
+                      </a:stretch>
+                    </p:blipFill>
+                    <p:spPr bwMode="auto">
+                      <a:xfrm>
+                        <a:off x="1066800" y="2243479"/>
+                        <a:ext cx="1828800" cy="811213"/>
+                      </a:xfrm>
+                      <a:prstGeom prst="rect">
+                        <a:avLst/>
+                      </a:prstGeom>
+                      <a:noFill/>
+                      <a:ln>
+                        <a:noFill/>
+                      </a:ln>
+                      <a:effectLst/>
+                      <a:extLst>
+                        <a:ext uri="{909E8E84-426E-40dd-AFC4-6F175D3DCCD1}">
+                          <a14:hiddenFill xmlns:a14="http://schemas.microsoft.com/office/drawing/2010/main">
+                            <a:solidFill>
+                              <a:srgbClr val="FFFFFF"/>
+                            </a:solidFill>
+                          </a14:hiddenFill>
+                        </a:ext>
+                        <a:ext uri="{91240B29-F687-4f45-9708-019B960494DF}">
+                          <a14:hiddenLine xmlns:a14="http://schemas.microsoft.com/office/drawing/2010/main" w="9525">
+                            <a:solidFill>
+                              <a:srgbClr val="000000"/>
+                            </a:solidFill>
+                            <a:miter lim="800000"/>
+                            <a:headEnd/>
+                            <a:tailEnd/>
+                          </a14:hiddenLine>
+                        </a:ext>
+                        <a:ext uri="{AF507438-7753-43e0-B8FC-AC1667EBCBE1}">
+                          <a14:hiddenEffects xmlns:a14="http://schemas.microsoft.com/office/drawing/2010/main">
+                            <a:effectLst>
+                              <a:outerShdw blurRad="63500" dist="38099" dir="2700000" algn="ctr" rotWithShape="0">
+                                <a:srgbClr val="808080">
+                                  <a:alpha val="74998"/>
+                                </a:srgbClr>
+                              </a:outerShdw>
+                            </a:effectLst>
+                          </a14:hiddenEffects>
+                        </a:ext>
+                      </a:extLst>
+                    </p:spPr>
+                  </p:pic>
+                </p:oleObj>
+              </mc:Fallback>
+            </mc:AlternateContent>
+          </a:graphicData>
+        </a:graphic>
+      </p:graphicFrame>
+      <p:graphicFrame>
+        <p:nvGraphicFramePr>
+          <p:cNvPr id="5" name="Object 9"/>
+          <p:cNvGraphicFramePr>
+            <a:graphicFrameLocks noChangeAspect="1"/>
+          </p:cNvGraphicFramePr>
+          <p:nvPr>
+            <p:extLst>
+              <p:ext uri="{D42A27DB-BD31-4B8C-83A1-F6EECF244321}">
+                <p14:modId xmlns:p14="http://schemas.microsoft.com/office/powerpoint/2010/main" val="3427066709"/>
+              </p:ext>
+            </p:extLst>
+          </p:nvPr>
+        </p:nvGraphicFramePr>
+        <p:xfrm>
+          <a:off x="1066800" y="4876799"/>
+          <a:ext cx="2522502" cy="1587437"/>
+        </p:xfrm>
+        <a:graphic>
+          <a:graphicData uri="http://schemas.openxmlformats.org/presentationml/2006/ole">
+            <mc:AlternateContent xmlns:mc="http://schemas.openxmlformats.org/markup-compatibility/2006">
+              <mc:Choice xmlns:v="urn:schemas-microsoft-com:vml" Requires="v">
+                <p:oleObj spid="_x0000_s12294" name="公式" r:id="rId5" imgW="1574640" imgH="990360" progId="Equation.3">
+                  <p:embed/>
+                </p:oleObj>
+              </mc:Choice>
+              <mc:Fallback>
+                <p:oleObj name="公式" r:id="rId5" imgW="1574640" imgH="990360" progId="Equation.3">
+                  <p:embed/>
+                  <p:pic>
+                    <p:nvPicPr>
+                      <p:cNvPr id="0" name=""/>
+                      <p:cNvPicPr>
+                        <a:picLocks noChangeAspect="1" noChangeArrowheads="1"/>
+                      </p:cNvPicPr>
+                      <p:nvPr/>
+                    </p:nvPicPr>
+                    <p:blipFill>
+                      <a:blip r:embed="rId6">
+                        <a:extLst>
+                          <a:ext uri="{28A0092B-C50C-407E-A947-70E740481C1C}">
+                            <a14:useLocalDpi xmlns:a14="http://schemas.microsoft.com/office/drawing/2010/main" val="0"/>
+                          </a:ext>
+                        </a:extLst>
+                      </a:blip>
+                      <a:srcRect/>
+                      <a:stretch>
+                        <a:fillRect/>
+                      </a:stretch>
+                    </p:blipFill>
+                    <p:spPr bwMode="auto">
+                      <a:xfrm>
+                        <a:off x="1066800" y="4876799"/>
+                        <a:ext cx="2522502" cy="1587437"/>
+                      </a:xfrm>
+                      <a:prstGeom prst="rect">
+                        <a:avLst/>
+                      </a:prstGeom>
+                      <a:noFill/>
+                      <a:ln>
+                        <a:noFill/>
+                      </a:ln>
+                      <a:effectLst/>
+                    </p:spPr>
+                  </p:pic>
+                </p:oleObj>
+              </mc:Fallback>
+            </mc:AlternateContent>
+          </a:graphicData>
+        </a:graphic>
+      </p:graphicFrame>
+    </p:spTree>
+    <p:extLst>
+      <p:ext uri="{BB962C8B-B14F-4D97-AF65-F5344CB8AC3E}">
+        <p14:creationId xmlns:p14="http://schemas.microsoft.com/office/powerpoint/2010/main" val="4168765525"/>
+      </p:ext>
+    </p:extLst>
+  </p:cSld>
+  <p:clrMapOvr>
+    <a:masterClrMapping/>
+  </p:clrMapOvr>
+</p:sld>
+</file>
+
+<file path=ppt/slides/slide24.xml><?xml version="1.0" encoding="utf-8"?>
+<p:sld xmlns:a="http://schemas.openxmlformats.org/drawingml/2006/main" xmlns:r="http://schemas.openxmlformats.org/officeDocument/2006/relationships" xmlns:p="http://schemas.openxmlformats.org/presentationml/2006/main">
+  <p:cSld>
+    <p:spTree>
+      <p:nvGrpSpPr>
+        <p:cNvPr id="1" name=""/>
+        <p:cNvGrpSpPr/>
+        <p:nvPr/>
+      </p:nvGrpSpPr>
+      <p:grpSpPr>
+        <a:xfrm>
+          <a:off x="0" y="0"/>
+          <a:ext cx="0" cy="0"/>
+          <a:chOff x="0" y="0"/>
+          <a:chExt cx="0" cy="0"/>
+        </a:xfrm>
+      </p:grpSpPr>
+      <p:sp>
+        <p:nvSpPr>
+          <p:cNvPr id="2" name="Title 1"/>
+          <p:cNvSpPr>
+            <a:spLocks noGrp="1"/>
+          </p:cNvSpPr>
+          <p:nvPr>
+            <p:ph type="title"/>
+          </p:nvPr>
+        </p:nvSpPr>
+        <p:spPr/>
+        <p:txBody>
+          <a:bodyPr>
+            <a:normAutofit fontScale="90000"/>
+          </a:bodyPr>
+          <a:lstStyle/>
+          <a:p>
+            <a:r>
+              <a:rPr lang="en-US" dirty="0" smtClean="0"/>
+              <a:t>Possible temperature dependence</a:t>
+            </a:r>
+            <a:endParaRPr lang="en-US" dirty="0"/>
+          </a:p>
+        </p:txBody>
+      </p:sp>
+      <p:sp>
+        <p:nvSpPr>
+          <p:cNvPr id="3" name="Content Placeholder 2"/>
+          <p:cNvSpPr>
+            <a:spLocks noGrp="1"/>
+          </p:cNvSpPr>
+          <p:nvPr>
+            <p:ph idx="1"/>
+          </p:nvPr>
+        </p:nvSpPr>
+        <p:spPr/>
+        <p:txBody>
+          <a:bodyPr/>
+          <a:lstStyle/>
+          <a:p>
+            <a:r>
+              <a:rPr lang="en-US" dirty="0" smtClean="0"/>
+              <a:t>Our evidence suggests there may be temperature dependence in the X factor.</a:t>
+            </a:r>
+            <a:endParaRPr lang="en-US" dirty="0"/>
+          </a:p>
+        </p:txBody>
+      </p:sp>
+      <p:pic>
+        <p:nvPicPr>
+          <p:cNvPr id="4" name="Picture 3" descr="XvsT.png"/>
+          <p:cNvPicPr>
+            <a:picLocks noChangeAspect="1"/>
+          </p:cNvPicPr>
+          <p:nvPr/>
+        </p:nvPicPr>
+        <p:blipFill>
+          <a:blip r:embed="rId2">
+            <a:extLst>
+              <a:ext uri="{28A0092B-C50C-407E-A947-70E740481C1C}">
+                <a14:useLocalDpi xmlns:a14="http://schemas.microsoft.com/office/drawing/2010/main" val="0"/>
+              </a:ext>
+            </a:extLst>
+          </a:blip>
+          <a:stretch>
+            <a:fillRect/>
+          </a:stretch>
+        </p:blipFill>
+        <p:spPr>
+          <a:xfrm>
+            <a:off x="892518" y="2633261"/>
+            <a:ext cx="6917000" cy="4013680"/>
+          </a:xfrm>
+          <a:prstGeom prst="rect">
+            <a:avLst/>
+          </a:prstGeom>
+        </p:spPr>
+      </p:pic>
+    </p:spTree>
+    <p:extLst>
+      <p:ext uri="{BB962C8B-B14F-4D97-AF65-F5344CB8AC3E}">
+        <p14:creationId xmlns:p14="http://schemas.microsoft.com/office/powerpoint/2010/main" val="3663479197"/>
       </p:ext>
     </p:extLst>
   </p:cSld>
@@ -10078,7 +11198,7 @@
           <a:graphicData uri="http://schemas.openxmlformats.org/presentationml/2006/ole">
             <mc:AlternateContent xmlns:mc="http://schemas.openxmlformats.org/markup-compatibility/2006">
               <mc:Choice xmlns:v="urn:schemas-microsoft-com:vml" Requires="v">
-                <p:oleObj spid="_x0000_s2090" name="Equation" r:id="rId4" imgW="114300" imgH="165100" progId="Equation.3">
+                <p:oleObj spid="_x0000_s2098" name="Equation" r:id="rId4" imgW="114300" imgH="165100" progId="Equation.3">
                   <p:embed/>
                 </p:oleObj>
               </mc:Choice>
@@ -11303,7 +12423,7 @@
           <a:graphicData uri="http://schemas.openxmlformats.org/presentationml/2006/ole">
             <mc:AlternateContent xmlns:mc="http://schemas.openxmlformats.org/markup-compatibility/2006">
               <mc:Choice xmlns:v="urn:schemas-microsoft-com:vml" Requires="v">
-                <p:oleObj spid="_x0000_s1124" name="Equation" r:id="rId4" imgW="1384300" imgH="228600" progId="Equation.3">
+                <p:oleObj spid="_x0000_s1156" name="Equation" r:id="rId4" imgW="1384300" imgH="228600" progId="Equation.3">
                   <p:embed/>
                 </p:oleObj>
               </mc:Choice>
@@ -11360,7 +12480,7 @@
           <a:graphicData uri="http://schemas.openxmlformats.org/presentationml/2006/ole">
             <mc:AlternateContent xmlns:mc="http://schemas.openxmlformats.org/markup-compatibility/2006">
               <mc:Choice xmlns:v="urn:schemas-microsoft-com:vml" Requires="v">
-                <p:oleObj spid="_x0000_s1125" name="Equation" r:id="rId6" imgW="1155700" imgH="406400" progId="Equation.3">
+                <p:oleObj spid="_x0000_s1157" name="Equation" r:id="rId6" imgW="1155700" imgH="406400" progId="Equation.3">
                   <p:embed/>
                 </p:oleObj>
               </mc:Choice>
@@ -11417,7 +12537,7 @@
           <a:graphicData uri="http://schemas.openxmlformats.org/presentationml/2006/ole">
             <mc:AlternateContent xmlns:mc="http://schemas.openxmlformats.org/markup-compatibility/2006">
               <mc:Choice xmlns:v="urn:schemas-microsoft-com:vml" Requires="v">
-                <p:oleObj spid="_x0000_s1126" name="Equation" r:id="rId8" imgW="1485900" imgH="482600" progId="Equation.3">
+                <p:oleObj spid="_x0000_s1158" name="Equation" r:id="rId8" imgW="1485900" imgH="482600" progId="Equation.3">
                   <p:embed/>
                 </p:oleObj>
               </mc:Choice>
@@ -11474,7 +12594,7 @@
           <a:graphicData uri="http://schemas.openxmlformats.org/presentationml/2006/ole">
             <mc:AlternateContent xmlns:mc="http://schemas.openxmlformats.org/markup-compatibility/2006">
               <mc:Choice xmlns:v="urn:schemas-microsoft-com:vml" Requires="v">
-                <p:oleObj spid="_x0000_s1127" name="Equation" r:id="rId10" imgW="825500" imgH="215900" progId="Equation.3">
+                <p:oleObj spid="_x0000_s1159" name="Equation" r:id="rId10" imgW="825500" imgH="215900" progId="Equation.3">
                   <p:embed/>
                 </p:oleObj>
               </mc:Choice>

</xml_diff>